<commit_message>
Small change to inputid definition
</commit_message>
<xml_diff>
--- a/Day 1/slides/Shiny_Day_1.pptx
+++ b/Day 1/slides/Shiny_Day_1.pptx
@@ -166,2998 +166,6 @@
 <p188:authorLst xmlns:a="http://schemas.openxmlformats.org/drawingml/2006/main" xmlns:r="http://schemas.openxmlformats.org/officeDocument/2006/relationships" xmlns:p188="http://schemas.microsoft.com/office/powerpoint/2018/8/main">
   <p188:author id="{7B0A6FA3-CF82-3BC2-4669-89778CD24ABB}" name="Julia Moeller" initials="JM" userId="S::Julia.Moeller@phs.scot::0bcb1583-c1a4-48b5-87e6-2cc074d2d571" providerId="AD"/>
 </p188:authorLst>
-</file>
-
-<file path=ppt/revisionInfo.xml><?xml version="1.0" encoding="utf-8"?>
-<p1510:revInfo xmlns:a="http://schemas.openxmlformats.org/drawingml/2006/main" xmlns:r="http://schemas.openxmlformats.org/officeDocument/2006/relationships" xmlns:p1510="http://schemas.microsoft.com/office/powerpoint/2015/10/main">
-  <p1510:revLst>
-    <p1510:client id="{C92DF3DE-23A5-4E98-85FA-AAD4EAE96412}" v="4" dt="2023-09-29T13:26:45.848"/>
-  </p1510:revLst>
-</p1510:revInfo>
-</file>
-
-<file path=ppt/changesInfos/changesInfo1.xml><?xml version="1.0" encoding="utf-8"?>
-<pc:chgInfo xmlns:a="http://schemas.openxmlformats.org/drawingml/2006/main" xmlns:r="http://schemas.openxmlformats.org/officeDocument/2006/relationships" xmlns:ac="http://schemas.microsoft.com/office/drawing/2013/main/command" xmlns:pc="http://schemas.microsoft.com/office/powerpoint/2013/main/command">
-  <pc:docChgLst>
-    <pc:chgData name="Julia Moeller" userId="0bcb1583-c1a4-48b5-87e6-2cc074d2d571" providerId="ADAL" clId="{C92DF3DE-23A5-4E98-85FA-AAD4EAE96412}"/>
-    <pc:docChg chg="undo redo custSel addSld delSld modSld sldOrd">
-      <pc:chgData name="Julia Moeller" userId="0bcb1583-c1a4-48b5-87e6-2cc074d2d571" providerId="ADAL" clId="{C92DF3DE-23A5-4E98-85FA-AAD4EAE96412}" dt="2023-09-29T13:48:23.886" v="11487" actId="20577"/>
-      <pc:docMkLst>
-        <pc:docMk/>
-      </pc:docMkLst>
-      <pc:sldChg chg="modSp mod modCm">
-        <pc:chgData name="Julia Moeller" userId="0bcb1583-c1a4-48b5-87e6-2cc074d2d571" providerId="ADAL" clId="{C92DF3DE-23A5-4E98-85FA-AAD4EAE96412}" dt="2023-09-11T16:05:46.145" v="131" actId="255"/>
-        <pc:sldMkLst>
-          <pc:docMk/>
-          <pc:sldMk cId="3687092364" sldId="258"/>
-        </pc:sldMkLst>
-        <pc:spChg chg="mod">
-          <ac:chgData name="Julia Moeller" userId="0bcb1583-c1a4-48b5-87e6-2cc074d2d571" providerId="ADAL" clId="{C92DF3DE-23A5-4E98-85FA-AAD4EAE96412}" dt="2023-09-11T16:05:46.145" v="131" actId="255"/>
-          <ac:spMkLst>
-            <pc:docMk/>
-            <pc:sldMk cId="3687092364" sldId="258"/>
-            <ac:spMk id="3" creationId="{00000000-0000-0000-0000-000000000000}"/>
-          </ac:spMkLst>
-        </pc:spChg>
-        <pc:extLst>
-          <p:ext xmlns:p="http://schemas.openxmlformats.org/presentationml/2006/main" uri="{D6D511B9-2390-475A-947B-AFAB55BFBCF1}">
-            <pc226:cmChg xmlns:pc226="http://schemas.microsoft.com/office/powerpoint/2022/06/main/command" chg="mod">
-              <pc226:chgData name="Julia Moeller" userId="0bcb1583-c1a4-48b5-87e6-2cc074d2d571" providerId="ADAL" clId="{C92DF3DE-23A5-4E98-85FA-AAD4EAE96412}" dt="2023-09-11T15:49:57.642" v="33"/>
-              <pc2:cmMkLst xmlns:pc2="http://schemas.microsoft.com/office/powerpoint/2019/9/main/command">
-                <pc:docMk/>
-                <pc:sldMk cId="3687092364" sldId="258"/>
-                <pc2:cmMk id="{5008940D-5BA1-469E-9CF4-045B69D575B9}"/>
-              </pc2:cmMkLst>
-            </pc226:cmChg>
-            <pc226:cmChg xmlns:pc226="http://schemas.microsoft.com/office/powerpoint/2022/06/main/command" chg="mod">
-              <pc226:chgData name="Julia Moeller" userId="0bcb1583-c1a4-48b5-87e6-2cc074d2d571" providerId="ADAL" clId="{C92DF3DE-23A5-4E98-85FA-AAD4EAE96412}" dt="2023-09-11T15:47:58.808" v="0"/>
-              <pc2:cmMkLst xmlns:pc2="http://schemas.microsoft.com/office/powerpoint/2019/9/main/command">
-                <pc:docMk/>
-                <pc:sldMk cId="3687092364" sldId="258"/>
-                <pc2:cmMk id="{A238DE84-1C7B-4EDC-8A2B-35C3538647AD}"/>
-              </pc2:cmMkLst>
-            </pc226:cmChg>
-            <pc226:cmChg xmlns:pc226="http://schemas.microsoft.com/office/powerpoint/2022/06/main/command" chg="mod">
-              <pc226:chgData name="Julia Moeller" userId="0bcb1583-c1a4-48b5-87e6-2cc074d2d571" providerId="ADAL" clId="{C92DF3DE-23A5-4E98-85FA-AAD4EAE96412}" dt="2023-09-11T15:50:00.463" v="34"/>
-              <pc2:cmMkLst xmlns:pc2="http://schemas.microsoft.com/office/powerpoint/2019/9/main/command">
-                <pc:docMk/>
-                <pc:sldMk cId="3687092364" sldId="258"/>
-                <pc2:cmMk id="{7DBD6FF2-7B99-429A-9CC7-06EE6767D334}"/>
-              </pc2:cmMkLst>
-            </pc226:cmChg>
-            <pc226:cmChg xmlns:pc226="http://schemas.microsoft.com/office/powerpoint/2022/06/main/command" chg="mod">
-              <pc226:chgData name="Julia Moeller" userId="0bcb1583-c1a4-48b5-87e6-2cc074d2d571" providerId="ADAL" clId="{C92DF3DE-23A5-4E98-85FA-AAD4EAE96412}" dt="2023-09-11T15:49:02.300" v="5"/>
-              <pc2:cmMkLst xmlns:pc2="http://schemas.microsoft.com/office/powerpoint/2019/9/main/command">
-                <pc:docMk/>
-                <pc:sldMk cId="3687092364" sldId="258"/>
-                <pc2:cmMk id="{F2D430FD-2905-4B36-ADD7-03C0FCD641FF}"/>
-              </pc2:cmMkLst>
-            </pc226:cmChg>
-          </p:ext>
-        </pc:extLst>
-      </pc:sldChg>
-      <pc:sldChg chg="modSp mod">
-        <pc:chgData name="Julia Moeller" userId="0bcb1583-c1a4-48b5-87e6-2cc074d2d571" providerId="ADAL" clId="{C92DF3DE-23A5-4E98-85FA-AAD4EAE96412}" dt="2023-09-29T13:27:32.042" v="11391" actId="20577"/>
-        <pc:sldMkLst>
-          <pc:docMk/>
-          <pc:sldMk cId="3345530997" sldId="259"/>
-        </pc:sldMkLst>
-        <pc:spChg chg="mod">
-          <ac:chgData name="Julia Moeller" userId="0bcb1583-c1a4-48b5-87e6-2cc074d2d571" providerId="ADAL" clId="{C92DF3DE-23A5-4E98-85FA-AAD4EAE96412}" dt="2023-09-29T13:27:32.042" v="11391" actId="20577"/>
-          <ac:spMkLst>
-            <pc:docMk/>
-            <pc:sldMk cId="3345530997" sldId="259"/>
-            <ac:spMk id="3" creationId="{00000000-0000-0000-0000-000000000000}"/>
-          </ac:spMkLst>
-        </pc:spChg>
-      </pc:sldChg>
-      <pc:sldChg chg="modSp mod modCm">
-        <pc:chgData name="Julia Moeller" userId="0bcb1583-c1a4-48b5-87e6-2cc074d2d571" providerId="ADAL" clId="{C92DF3DE-23A5-4E98-85FA-AAD4EAE96412}" dt="2023-09-15T14:33:33.854" v="11383" actId="14100"/>
-        <pc:sldMkLst>
-          <pc:docMk/>
-          <pc:sldMk cId="202094033" sldId="260"/>
-        </pc:sldMkLst>
-        <pc:spChg chg="mod">
-          <ac:chgData name="Julia Moeller" userId="0bcb1583-c1a4-48b5-87e6-2cc074d2d571" providerId="ADAL" clId="{C92DF3DE-23A5-4E98-85FA-AAD4EAE96412}" dt="2023-09-15T14:33:19.040" v="11381" actId="14100"/>
-          <ac:spMkLst>
-            <pc:docMk/>
-            <pc:sldMk cId="202094033" sldId="260"/>
-            <ac:spMk id="2" creationId="{00000000-0000-0000-0000-000000000000}"/>
-          </ac:spMkLst>
-        </pc:spChg>
-        <pc:spChg chg="mod">
-          <ac:chgData name="Julia Moeller" userId="0bcb1583-c1a4-48b5-87e6-2cc074d2d571" providerId="ADAL" clId="{C92DF3DE-23A5-4E98-85FA-AAD4EAE96412}" dt="2023-09-15T14:33:33.854" v="11383" actId="14100"/>
-          <ac:spMkLst>
-            <pc:docMk/>
-            <pc:sldMk cId="202094033" sldId="260"/>
-            <ac:spMk id="3" creationId="{00000000-0000-0000-0000-000000000000}"/>
-          </ac:spMkLst>
-        </pc:spChg>
-        <pc:extLst>
-          <p:ext xmlns:p="http://schemas.openxmlformats.org/presentationml/2006/main" uri="{D6D511B9-2390-475A-947B-AFAB55BFBCF1}">
-            <pc226:cmChg xmlns:pc226="http://schemas.microsoft.com/office/powerpoint/2022/06/main/command" chg="mod">
-              <pc226:chgData name="Julia Moeller" userId="0bcb1583-c1a4-48b5-87e6-2cc074d2d571" providerId="ADAL" clId="{C92DF3DE-23A5-4E98-85FA-AAD4EAE96412}" dt="2023-09-15T13:45:38.244" v="11371"/>
-              <pc2:cmMkLst xmlns:pc2="http://schemas.microsoft.com/office/powerpoint/2019/9/main/command">
-                <pc:docMk/>
-                <pc:sldMk cId="202094033" sldId="260"/>
-                <pc2:cmMk id="{247FEBB0-70ED-458C-991C-E274EBEDCD83}"/>
-              </pc2:cmMkLst>
-            </pc226:cmChg>
-            <pc226:cmChg xmlns:pc226="http://schemas.microsoft.com/office/powerpoint/2022/06/main/command" chg="mod">
-              <pc226:chgData name="Julia Moeller" userId="0bcb1583-c1a4-48b5-87e6-2cc074d2d571" providerId="ADAL" clId="{C92DF3DE-23A5-4E98-85FA-AAD4EAE96412}" dt="2023-09-11T15:51:25.466" v="47"/>
-              <pc2:cmMkLst xmlns:pc2="http://schemas.microsoft.com/office/powerpoint/2019/9/main/command">
-                <pc:docMk/>
-                <pc:sldMk cId="202094033" sldId="260"/>
-                <pc2:cmMk id="{5D6042C8-D686-4A4E-94A4-1DBE80062F5C}"/>
-              </pc2:cmMkLst>
-            </pc226:cmChg>
-          </p:ext>
-        </pc:extLst>
-      </pc:sldChg>
-      <pc:sldChg chg="modSp mod">
-        <pc:chgData name="Julia Moeller" userId="0bcb1583-c1a4-48b5-87e6-2cc074d2d571" providerId="ADAL" clId="{C92DF3DE-23A5-4E98-85FA-AAD4EAE96412}" dt="2023-09-14T19:14:44.183" v="8146" actId="255"/>
-        <pc:sldMkLst>
-          <pc:docMk/>
-          <pc:sldMk cId="504484499" sldId="261"/>
-        </pc:sldMkLst>
-        <pc:spChg chg="mod">
-          <ac:chgData name="Julia Moeller" userId="0bcb1583-c1a4-48b5-87e6-2cc074d2d571" providerId="ADAL" clId="{C92DF3DE-23A5-4E98-85FA-AAD4EAE96412}" dt="2023-09-14T19:14:44.183" v="8146" actId="255"/>
-          <ac:spMkLst>
-            <pc:docMk/>
-            <pc:sldMk cId="504484499" sldId="261"/>
-            <ac:spMk id="3" creationId="{00000000-0000-0000-0000-000000000000}"/>
-          </ac:spMkLst>
-        </pc:spChg>
-      </pc:sldChg>
-      <pc:sldChg chg="modSp mod modCm">
-        <pc:chgData name="Julia Moeller" userId="0bcb1583-c1a4-48b5-87e6-2cc074d2d571" providerId="ADAL" clId="{C92DF3DE-23A5-4E98-85FA-AAD4EAE96412}" dt="2023-09-15T14:32:47.925" v="11379" actId="27636"/>
-        <pc:sldMkLst>
-          <pc:docMk/>
-          <pc:sldMk cId="2634020970" sldId="262"/>
-        </pc:sldMkLst>
-        <pc:spChg chg="mod">
-          <ac:chgData name="Julia Moeller" userId="0bcb1583-c1a4-48b5-87e6-2cc074d2d571" providerId="ADAL" clId="{C92DF3DE-23A5-4E98-85FA-AAD4EAE96412}" dt="2023-09-15T14:32:47.925" v="11379" actId="27636"/>
-          <ac:spMkLst>
-            <pc:docMk/>
-            <pc:sldMk cId="2634020970" sldId="262"/>
-            <ac:spMk id="3" creationId="{00000000-0000-0000-0000-000000000000}"/>
-          </ac:spMkLst>
-        </pc:spChg>
-        <pc:extLst>
-          <p:ext xmlns:p="http://schemas.openxmlformats.org/presentationml/2006/main" uri="{D6D511B9-2390-475A-947B-AFAB55BFBCF1}">
-            <pc226:cmChg xmlns:pc226="http://schemas.microsoft.com/office/powerpoint/2022/06/main/command" chg="mod">
-              <pc226:chgData name="Julia Moeller" userId="0bcb1583-c1a4-48b5-87e6-2cc074d2d571" providerId="ADAL" clId="{C92DF3DE-23A5-4E98-85FA-AAD4EAE96412}" dt="2023-09-15T13:43:45.854" v="11351"/>
-              <pc2:cmMkLst xmlns:pc2="http://schemas.microsoft.com/office/powerpoint/2019/9/main/command">
-                <pc:docMk/>
-                <pc:sldMk cId="2634020970" sldId="262"/>
-                <pc2:cmMk id="{0931E9EC-2FEF-4A43-825C-1CE561A61179}"/>
-              </pc2:cmMkLst>
-            </pc226:cmChg>
-          </p:ext>
-        </pc:extLst>
-      </pc:sldChg>
-      <pc:sldChg chg="modSp mod modCm">
-        <pc:chgData name="Julia Moeller" userId="0bcb1583-c1a4-48b5-87e6-2cc074d2d571" providerId="ADAL" clId="{C92DF3DE-23A5-4E98-85FA-AAD4EAE96412}" dt="2023-09-15T13:43:40.058" v="11350"/>
-        <pc:sldMkLst>
-          <pc:docMk/>
-          <pc:sldMk cId="1769676663" sldId="263"/>
-        </pc:sldMkLst>
-        <pc:spChg chg="mod">
-          <ac:chgData name="Julia Moeller" userId="0bcb1583-c1a4-48b5-87e6-2cc074d2d571" providerId="ADAL" clId="{C92DF3DE-23A5-4E98-85FA-AAD4EAE96412}" dt="2023-09-12T11:44:34.299" v="872" actId="20577"/>
-          <ac:spMkLst>
-            <pc:docMk/>
-            <pc:sldMk cId="1769676663" sldId="263"/>
-            <ac:spMk id="3" creationId="{00000000-0000-0000-0000-000000000000}"/>
-          </ac:spMkLst>
-        </pc:spChg>
-        <pc:extLst>
-          <p:ext xmlns:p="http://schemas.openxmlformats.org/presentationml/2006/main" uri="{D6D511B9-2390-475A-947B-AFAB55BFBCF1}">
-            <pc226:cmChg xmlns:pc226="http://schemas.microsoft.com/office/powerpoint/2022/06/main/command" chg="mod">
-              <pc226:chgData name="Julia Moeller" userId="0bcb1583-c1a4-48b5-87e6-2cc074d2d571" providerId="ADAL" clId="{C92DF3DE-23A5-4E98-85FA-AAD4EAE96412}" dt="2023-09-15T13:43:40.058" v="11350"/>
-              <pc2:cmMkLst xmlns:pc2="http://schemas.microsoft.com/office/powerpoint/2019/9/main/command">
-                <pc:docMk/>
-                <pc:sldMk cId="1769676663" sldId="263"/>
-                <pc2:cmMk id="{2DB13F38-A465-4481-8CAB-CF7CB1950CAA}"/>
-              </pc2:cmMkLst>
-            </pc226:cmChg>
-          </p:ext>
-        </pc:extLst>
-      </pc:sldChg>
-      <pc:sldChg chg="modSp del mod">
-        <pc:chgData name="Julia Moeller" userId="0bcb1583-c1a4-48b5-87e6-2cc074d2d571" providerId="ADAL" clId="{C92DF3DE-23A5-4E98-85FA-AAD4EAE96412}" dt="2023-09-15T08:59:23.701" v="8214" actId="2696"/>
-        <pc:sldMkLst>
-          <pc:docMk/>
-          <pc:sldMk cId="3102536807" sldId="264"/>
-        </pc:sldMkLst>
-        <pc:spChg chg="mod">
-          <ac:chgData name="Julia Moeller" userId="0bcb1583-c1a4-48b5-87e6-2cc074d2d571" providerId="ADAL" clId="{C92DF3DE-23A5-4E98-85FA-AAD4EAE96412}" dt="2023-09-12T11:46:16.458" v="885" actId="14100"/>
-          <ac:spMkLst>
-            <pc:docMk/>
-            <pc:sldMk cId="3102536807" sldId="264"/>
-            <ac:spMk id="3" creationId="{00000000-0000-0000-0000-000000000000}"/>
-          </ac:spMkLst>
-        </pc:spChg>
-      </pc:sldChg>
-      <pc:sldChg chg="addSp modSp mod modCm">
-        <pc:chgData name="Julia Moeller" userId="0bcb1583-c1a4-48b5-87e6-2cc074d2d571" providerId="ADAL" clId="{C92DF3DE-23A5-4E98-85FA-AAD4EAE96412}" dt="2023-09-29T13:29:34.165" v="11406" actId="20577"/>
-        <pc:sldMkLst>
-          <pc:docMk/>
-          <pc:sldMk cId="2225474753" sldId="266"/>
-        </pc:sldMkLst>
-        <pc:spChg chg="mod">
-          <ac:chgData name="Julia Moeller" userId="0bcb1583-c1a4-48b5-87e6-2cc074d2d571" providerId="ADAL" clId="{C92DF3DE-23A5-4E98-85FA-AAD4EAE96412}" dt="2023-09-29T13:29:34.165" v="11406" actId="20577"/>
-          <ac:spMkLst>
-            <pc:docMk/>
-            <pc:sldMk cId="2225474753" sldId="266"/>
-            <ac:spMk id="3" creationId="{00000000-0000-0000-0000-000000000000}"/>
-          </ac:spMkLst>
-        </pc:spChg>
-        <pc:picChg chg="add mod">
-          <ac:chgData name="Julia Moeller" userId="0bcb1583-c1a4-48b5-87e6-2cc074d2d571" providerId="ADAL" clId="{C92DF3DE-23A5-4E98-85FA-AAD4EAE96412}" dt="2023-09-12T08:53:45.181" v="676" actId="14100"/>
-          <ac:picMkLst>
-            <pc:docMk/>
-            <pc:sldMk cId="2225474753" sldId="266"/>
-            <ac:picMk id="4" creationId="{E07EAA22-65DA-BE1E-DDF3-2AB8648BB0B3}"/>
-          </ac:picMkLst>
-        </pc:picChg>
-        <pc:picChg chg="add mod">
-          <ac:chgData name="Julia Moeller" userId="0bcb1583-c1a4-48b5-87e6-2cc074d2d571" providerId="ADAL" clId="{C92DF3DE-23A5-4E98-85FA-AAD4EAE96412}" dt="2023-09-12T08:53:45.181" v="676" actId="14100"/>
-          <ac:picMkLst>
-            <pc:docMk/>
-            <pc:sldMk cId="2225474753" sldId="266"/>
-            <ac:picMk id="5" creationId="{FE89DA2C-0BCC-B9B6-558C-0AAFB4779B17}"/>
-          </ac:picMkLst>
-        </pc:picChg>
-        <pc:extLst>
-          <p:ext xmlns:p="http://schemas.openxmlformats.org/presentationml/2006/main" uri="{D6D511B9-2390-475A-947B-AFAB55BFBCF1}">
-            <pc226:cmChg xmlns:pc226="http://schemas.microsoft.com/office/powerpoint/2022/06/main/command" chg="mod">
-              <pc226:chgData name="Julia Moeller" userId="0bcb1583-c1a4-48b5-87e6-2cc074d2d571" providerId="ADAL" clId="{C92DF3DE-23A5-4E98-85FA-AAD4EAE96412}" dt="2023-09-15T13:43:50.510" v="11352"/>
-              <pc2:cmMkLst xmlns:pc2="http://schemas.microsoft.com/office/powerpoint/2019/9/main/command">
-                <pc:docMk/>
-                <pc:sldMk cId="2225474753" sldId="266"/>
-                <pc2:cmMk id="{5CDD6356-F445-42F5-AD2B-BC6C6BAFBBB7}"/>
-              </pc2:cmMkLst>
-            </pc226:cmChg>
-          </p:ext>
-        </pc:extLst>
-      </pc:sldChg>
-      <pc:sldChg chg="addSp delSp modSp mod modCm">
-        <pc:chgData name="Julia Moeller" userId="0bcb1583-c1a4-48b5-87e6-2cc074d2d571" providerId="ADAL" clId="{C92DF3DE-23A5-4E98-85FA-AAD4EAE96412}" dt="2023-09-15T13:43:56.338" v="11353"/>
-        <pc:sldMkLst>
-          <pc:docMk/>
-          <pc:sldMk cId="1706080260" sldId="267"/>
-        </pc:sldMkLst>
-        <pc:spChg chg="add del mod">
-          <ac:chgData name="Julia Moeller" userId="0bcb1583-c1a4-48b5-87e6-2cc074d2d571" providerId="ADAL" clId="{C92DF3DE-23A5-4E98-85FA-AAD4EAE96412}" dt="2023-09-12T08:47:46.139" v="612" actId="478"/>
-          <ac:spMkLst>
-            <pc:docMk/>
-            <pc:sldMk cId="1706080260" sldId="267"/>
-            <ac:spMk id="4" creationId="{87A461C3-36D4-7D75-4D72-4543AA5F9B87}"/>
-          </ac:spMkLst>
-        </pc:spChg>
-        <pc:spChg chg="mod">
-          <ac:chgData name="Julia Moeller" userId="0bcb1583-c1a4-48b5-87e6-2cc074d2d571" providerId="ADAL" clId="{C92DF3DE-23A5-4E98-85FA-AAD4EAE96412}" dt="2023-09-12T12:34:47.710" v="905" actId="179"/>
-          <ac:spMkLst>
-            <pc:docMk/>
-            <pc:sldMk cId="1706080260" sldId="267"/>
-            <ac:spMk id="15" creationId="{00000000-0000-0000-0000-000000000000}"/>
-          </ac:spMkLst>
-        </pc:spChg>
-        <pc:picChg chg="del">
-          <ac:chgData name="Julia Moeller" userId="0bcb1583-c1a4-48b5-87e6-2cc074d2d571" providerId="ADAL" clId="{C92DF3DE-23A5-4E98-85FA-AAD4EAE96412}" dt="2023-09-12T08:37:37.882" v="571" actId="21"/>
-          <ac:picMkLst>
-            <pc:docMk/>
-            <pc:sldMk cId="1706080260" sldId="267"/>
-            <ac:picMk id="6" creationId="{00000000-0000-0000-0000-000000000000}"/>
-          </ac:picMkLst>
-        </pc:picChg>
-        <pc:picChg chg="del">
-          <ac:chgData name="Julia Moeller" userId="0bcb1583-c1a4-48b5-87e6-2cc074d2d571" providerId="ADAL" clId="{C92DF3DE-23A5-4E98-85FA-AAD4EAE96412}" dt="2023-09-12T08:37:37.882" v="571" actId="21"/>
-          <ac:picMkLst>
-            <pc:docMk/>
-            <pc:sldMk cId="1706080260" sldId="267"/>
-            <ac:picMk id="12" creationId="{00000000-0000-0000-0000-000000000000}"/>
-          </ac:picMkLst>
-        </pc:picChg>
-        <pc:picChg chg="mod">
-          <ac:chgData name="Julia Moeller" userId="0bcb1583-c1a4-48b5-87e6-2cc074d2d571" providerId="ADAL" clId="{C92DF3DE-23A5-4E98-85FA-AAD4EAE96412}" dt="2023-09-12T08:48:15.142" v="618" actId="1076"/>
-          <ac:picMkLst>
-            <pc:docMk/>
-            <pc:sldMk cId="1706080260" sldId="267"/>
-            <ac:picMk id="14" creationId="{00000000-0000-0000-0000-000000000000}"/>
-          </ac:picMkLst>
-        </pc:picChg>
-        <pc:cxnChg chg="del">
-          <ac:chgData name="Julia Moeller" userId="0bcb1583-c1a4-48b5-87e6-2cc074d2d571" providerId="ADAL" clId="{C92DF3DE-23A5-4E98-85FA-AAD4EAE96412}" dt="2023-09-12T08:40:45.453" v="604" actId="478"/>
-          <ac:cxnSpMkLst>
-            <pc:docMk/>
-            <pc:sldMk cId="1706080260" sldId="267"/>
-            <ac:cxnSpMk id="10" creationId="{00000000-0000-0000-0000-000000000000}"/>
-          </ac:cxnSpMkLst>
-        </pc:cxnChg>
-        <pc:extLst>
-          <p:ext xmlns:p="http://schemas.openxmlformats.org/presentationml/2006/main" uri="{D6D511B9-2390-475A-947B-AFAB55BFBCF1}">
-            <pc226:cmChg xmlns:pc226="http://schemas.microsoft.com/office/powerpoint/2022/06/main/command" chg="mod">
-              <pc226:chgData name="Julia Moeller" userId="0bcb1583-c1a4-48b5-87e6-2cc074d2d571" providerId="ADAL" clId="{C92DF3DE-23A5-4E98-85FA-AAD4EAE96412}" dt="2023-09-15T13:43:56.338" v="11353"/>
-              <pc2:cmMkLst xmlns:pc2="http://schemas.microsoft.com/office/powerpoint/2019/9/main/command">
-                <pc:docMk/>
-                <pc:sldMk cId="1706080260" sldId="267"/>
-                <pc2:cmMk id="{80926223-C0B3-4D62-9294-42924E625AD7}"/>
-              </pc2:cmMkLst>
-            </pc226:cmChg>
-            <pc226:cmChg xmlns:pc226="http://schemas.microsoft.com/office/powerpoint/2022/06/main/command" chg="mod">
-              <pc226:chgData name="Julia Moeller" userId="0bcb1583-c1a4-48b5-87e6-2cc074d2d571" providerId="ADAL" clId="{C92DF3DE-23A5-4E98-85FA-AAD4EAE96412}" dt="2023-09-12T11:37:06" v="696"/>
-              <pc2:cmMkLst xmlns:pc2="http://schemas.microsoft.com/office/powerpoint/2019/9/main/command">
-                <pc:docMk/>
-                <pc:sldMk cId="1706080260" sldId="267"/>
-                <pc2:cmMk id="{5BFD4FCC-46CC-4C7C-B44C-F86AE9626C7E}"/>
-              </pc2:cmMkLst>
-            </pc226:cmChg>
-          </p:ext>
-        </pc:extLst>
-      </pc:sldChg>
-      <pc:sldChg chg="addSp delSp modSp mod">
-        <pc:chgData name="Julia Moeller" userId="0bcb1583-c1a4-48b5-87e6-2cc074d2d571" providerId="ADAL" clId="{C92DF3DE-23A5-4E98-85FA-AAD4EAE96412}" dt="2023-09-14T19:17:08.325" v="8155" actId="113"/>
-        <pc:sldMkLst>
-          <pc:docMk/>
-          <pc:sldMk cId="2953695296" sldId="268"/>
-        </pc:sldMkLst>
-        <pc:spChg chg="mod">
-          <ac:chgData name="Julia Moeller" userId="0bcb1583-c1a4-48b5-87e6-2cc074d2d571" providerId="ADAL" clId="{C92DF3DE-23A5-4E98-85FA-AAD4EAE96412}" dt="2023-09-13T14:29:48.005" v="3747" actId="20577"/>
-          <ac:spMkLst>
-            <pc:docMk/>
-            <pc:sldMk cId="2953695296" sldId="268"/>
-            <ac:spMk id="2" creationId="{00000000-0000-0000-0000-000000000000}"/>
-          </ac:spMkLst>
-        </pc:spChg>
-        <pc:spChg chg="mod">
-          <ac:chgData name="Julia Moeller" userId="0bcb1583-c1a4-48b5-87e6-2cc074d2d571" providerId="ADAL" clId="{C92DF3DE-23A5-4E98-85FA-AAD4EAE96412}" dt="2023-09-14T19:17:08.325" v="8155" actId="113"/>
-          <ac:spMkLst>
-            <pc:docMk/>
-            <pc:sldMk cId="2953695296" sldId="268"/>
-            <ac:spMk id="3" creationId="{00000000-0000-0000-0000-000000000000}"/>
-          </ac:spMkLst>
-        </pc:spChg>
-        <pc:spChg chg="del">
-          <ac:chgData name="Julia Moeller" userId="0bcb1583-c1a4-48b5-87e6-2cc074d2d571" providerId="ADAL" clId="{C92DF3DE-23A5-4E98-85FA-AAD4EAE96412}" dt="2023-09-12T11:40:23.414" v="842" actId="478"/>
-          <ac:spMkLst>
-            <pc:docMk/>
-            <pc:sldMk cId="2953695296" sldId="268"/>
-            <ac:spMk id="6" creationId="{00000000-0000-0000-0000-000000000000}"/>
-          </ac:spMkLst>
-        </pc:spChg>
-        <pc:picChg chg="del mod">
-          <ac:chgData name="Julia Moeller" userId="0bcb1583-c1a4-48b5-87e6-2cc074d2d571" providerId="ADAL" clId="{C92DF3DE-23A5-4E98-85FA-AAD4EAE96412}" dt="2023-09-12T11:41:22.006" v="848" actId="478"/>
-          <ac:picMkLst>
-            <pc:docMk/>
-            <pc:sldMk cId="2953695296" sldId="268"/>
-            <ac:picMk id="4" creationId="{00000000-0000-0000-0000-000000000000}"/>
-          </ac:picMkLst>
-        </pc:picChg>
-        <pc:picChg chg="add mod">
-          <ac:chgData name="Julia Moeller" userId="0bcb1583-c1a4-48b5-87e6-2cc074d2d571" providerId="ADAL" clId="{C92DF3DE-23A5-4E98-85FA-AAD4EAE96412}" dt="2023-09-13T06:25:24.328" v="1088" actId="1076"/>
-          <ac:picMkLst>
-            <pc:docMk/>
-            <pc:sldMk cId="2953695296" sldId="268"/>
-            <ac:picMk id="7" creationId="{CCCEA295-F6C8-57AB-83C8-E8155F793EAE}"/>
-          </ac:picMkLst>
-        </pc:picChg>
-      </pc:sldChg>
-      <pc:sldChg chg="addSp delSp modSp mod modCm">
-        <pc:chgData name="Julia Moeller" userId="0bcb1583-c1a4-48b5-87e6-2cc074d2d571" providerId="ADAL" clId="{C92DF3DE-23A5-4E98-85FA-AAD4EAE96412}" dt="2023-09-14T19:18:22.577" v="8199" actId="20577"/>
-        <pc:sldMkLst>
-          <pc:docMk/>
-          <pc:sldMk cId="1311594560" sldId="269"/>
-        </pc:sldMkLst>
-        <pc:spChg chg="mod">
-          <ac:chgData name="Julia Moeller" userId="0bcb1583-c1a4-48b5-87e6-2cc074d2d571" providerId="ADAL" clId="{C92DF3DE-23A5-4E98-85FA-AAD4EAE96412}" dt="2023-09-13T14:30:14.497" v="3774" actId="20577"/>
-          <ac:spMkLst>
-            <pc:docMk/>
-            <pc:sldMk cId="1311594560" sldId="269"/>
-            <ac:spMk id="2" creationId="{00000000-0000-0000-0000-000000000000}"/>
-          </ac:spMkLst>
-        </pc:spChg>
-        <pc:spChg chg="mod">
-          <ac:chgData name="Julia Moeller" userId="0bcb1583-c1a4-48b5-87e6-2cc074d2d571" providerId="ADAL" clId="{C92DF3DE-23A5-4E98-85FA-AAD4EAE96412}" dt="2023-09-14T19:18:22.577" v="8199" actId="20577"/>
-          <ac:spMkLst>
-            <pc:docMk/>
-            <pc:sldMk cId="1311594560" sldId="269"/>
-            <ac:spMk id="3" creationId="{00000000-0000-0000-0000-000000000000}"/>
-          </ac:spMkLst>
-        </pc:spChg>
-        <pc:spChg chg="del mod">
-          <ac:chgData name="Julia Moeller" userId="0bcb1583-c1a4-48b5-87e6-2cc074d2d571" providerId="ADAL" clId="{C92DF3DE-23A5-4E98-85FA-AAD4EAE96412}" dt="2023-09-13T06:55:04.282" v="1429" actId="478"/>
-          <ac:spMkLst>
-            <pc:docMk/>
-            <pc:sldMk cId="1311594560" sldId="269"/>
-            <ac:spMk id="8" creationId="{00000000-0000-0000-0000-000000000000}"/>
-          </ac:spMkLst>
-        </pc:spChg>
-        <pc:spChg chg="del">
-          <ac:chgData name="Julia Moeller" userId="0bcb1583-c1a4-48b5-87e6-2cc074d2d571" providerId="ADAL" clId="{C92DF3DE-23A5-4E98-85FA-AAD4EAE96412}" dt="2023-09-13T06:31:06.640" v="1154" actId="478"/>
-          <ac:spMkLst>
-            <pc:docMk/>
-            <pc:sldMk cId="1311594560" sldId="269"/>
-            <ac:spMk id="9" creationId="{00000000-0000-0000-0000-000000000000}"/>
-          </ac:spMkLst>
-        </pc:spChg>
-        <pc:spChg chg="del mod">
-          <ac:chgData name="Julia Moeller" userId="0bcb1583-c1a4-48b5-87e6-2cc074d2d571" providerId="ADAL" clId="{C92DF3DE-23A5-4E98-85FA-AAD4EAE96412}" dt="2023-09-13T06:51:31.422" v="1354" actId="478"/>
-          <ac:spMkLst>
-            <pc:docMk/>
-            <pc:sldMk cId="1311594560" sldId="269"/>
-            <ac:spMk id="10" creationId="{00000000-0000-0000-0000-000000000000}"/>
-          </ac:spMkLst>
-        </pc:spChg>
-        <pc:spChg chg="mod">
-          <ac:chgData name="Julia Moeller" userId="0bcb1583-c1a4-48b5-87e6-2cc074d2d571" providerId="ADAL" clId="{C92DF3DE-23A5-4E98-85FA-AAD4EAE96412}" dt="2023-09-13T07:14:38.467" v="1566" actId="1076"/>
-          <ac:spMkLst>
-            <pc:docMk/>
-            <pc:sldMk cId="1311594560" sldId="269"/>
-            <ac:spMk id="16" creationId="{EEAFD3CE-705C-600A-DC8E-C11AC914EF6C}"/>
-          </ac:spMkLst>
-        </pc:spChg>
-        <pc:spChg chg="add mod">
-          <ac:chgData name="Julia Moeller" userId="0bcb1583-c1a4-48b5-87e6-2cc074d2d571" providerId="ADAL" clId="{C92DF3DE-23A5-4E98-85FA-AAD4EAE96412}" dt="2023-09-13T07:14:31.970" v="1565" actId="1076"/>
-          <ac:spMkLst>
-            <pc:docMk/>
-            <pc:sldMk cId="1311594560" sldId="269"/>
-            <ac:spMk id="17" creationId="{C57FF0E0-7DC3-5E6D-0604-64E7E805A801}"/>
-          </ac:spMkLst>
-        </pc:spChg>
-        <pc:spChg chg="add mod">
-          <ac:chgData name="Julia Moeller" userId="0bcb1583-c1a4-48b5-87e6-2cc074d2d571" providerId="ADAL" clId="{C92DF3DE-23A5-4E98-85FA-AAD4EAE96412}" dt="2023-09-13T07:14:41.708" v="1567" actId="1076"/>
-          <ac:spMkLst>
-            <pc:docMk/>
-            <pc:sldMk cId="1311594560" sldId="269"/>
-            <ac:spMk id="18" creationId="{E408356E-44CE-C414-3556-185BBF3B8CFF}"/>
-          </ac:spMkLst>
-        </pc:spChg>
-        <pc:spChg chg="add mod">
-          <ac:chgData name="Julia Moeller" userId="0bcb1583-c1a4-48b5-87e6-2cc074d2d571" providerId="ADAL" clId="{C92DF3DE-23A5-4E98-85FA-AAD4EAE96412}" dt="2023-09-13T08:25:14.322" v="2364" actId="14100"/>
-          <ac:spMkLst>
-            <pc:docMk/>
-            <pc:sldMk cId="1311594560" sldId="269"/>
-            <ac:spMk id="20" creationId="{D4ACC95C-D3AD-592E-9BF7-1152F53AFDD5}"/>
-          </ac:spMkLst>
-        </pc:spChg>
-        <pc:grpChg chg="del mod">
-          <ac:chgData name="Julia Moeller" userId="0bcb1583-c1a4-48b5-87e6-2cc074d2d571" providerId="ADAL" clId="{C92DF3DE-23A5-4E98-85FA-AAD4EAE96412}" dt="2023-09-13T06:20:49.933" v="986" actId="478"/>
-          <ac:grpSpMkLst>
-            <pc:docMk/>
-            <pc:sldMk cId="1311594560" sldId="269"/>
-            <ac:grpSpMk id="7" creationId="{00000000-0000-0000-0000-000000000000}"/>
-          </ac:grpSpMkLst>
-        </pc:grpChg>
-        <pc:grpChg chg="add mod">
-          <ac:chgData name="Julia Moeller" userId="0bcb1583-c1a4-48b5-87e6-2cc074d2d571" providerId="ADAL" clId="{C92DF3DE-23A5-4E98-85FA-AAD4EAE96412}" dt="2023-09-13T07:10:33.973" v="1519" actId="164"/>
-          <ac:grpSpMkLst>
-            <pc:docMk/>
-            <pc:sldMk cId="1311594560" sldId="269"/>
-            <ac:grpSpMk id="14" creationId="{BB2EB9C1-9BB4-3AE1-EF3D-CFFA8E91D14A}"/>
-          </ac:grpSpMkLst>
-        </pc:grpChg>
-        <pc:grpChg chg="add mod">
-          <ac:chgData name="Julia Moeller" userId="0bcb1583-c1a4-48b5-87e6-2cc074d2d571" providerId="ADAL" clId="{C92DF3DE-23A5-4E98-85FA-AAD4EAE96412}" dt="2023-09-13T08:25:03.930" v="2362" actId="1076"/>
-          <ac:grpSpMkLst>
-            <pc:docMk/>
-            <pc:sldMk cId="1311594560" sldId="269"/>
-            <ac:grpSpMk id="19" creationId="{91670712-6DD5-CF02-B0FC-74B1E784055A}"/>
-          </ac:grpSpMkLst>
-        </pc:grpChg>
-        <pc:picChg chg="add del mod">
-          <ac:chgData name="Julia Moeller" userId="0bcb1583-c1a4-48b5-87e6-2cc074d2d571" providerId="ADAL" clId="{C92DF3DE-23A5-4E98-85FA-AAD4EAE96412}" dt="2023-09-13T06:31:16.840" v="1155" actId="478"/>
-          <ac:picMkLst>
-            <pc:docMk/>
-            <pc:sldMk cId="1311594560" sldId="269"/>
-            <ac:picMk id="11" creationId="{28FA3161-75B7-1AA6-24ED-DD9AF0DDE3E2}"/>
-          </ac:picMkLst>
-        </pc:picChg>
-        <pc:picChg chg="add mod">
-          <ac:chgData name="Julia Moeller" userId="0bcb1583-c1a4-48b5-87e6-2cc074d2d571" providerId="ADAL" clId="{C92DF3DE-23A5-4E98-85FA-AAD4EAE96412}" dt="2023-09-13T08:25:01.239" v="2361" actId="1076"/>
-          <ac:picMkLst>
-            <pc:docMk/>
-            <pc:sldMk cId="1311594560" sldId="269"/>
-            <ac:picMk id="13" creationId="{0F3122D6-A648-5D79-D9B7-871F19069138}"/>
-          </ac:picMkLst>
-        </pc:picChg>
-        <pc:picChg chg="mod">
-          <ac:chgData name="Julia Moeller" userId="0bcb1583-c1a4-48b5-87e6-2cc074d2d571" providerId="ADAL" clId="{C92DF3DE-23A5-4E98-85FA-AAD4EAE96412}" dt="2023-09-13T07:07:23.204" v="1490"/>
-          <ac:picMkLst>
-            <pc:docMk/>
-            <pc:sldMk cId="1311594560" sldId="269"/>
-            <ac:picMk id="15" creationId="{2F21ABE6-CFB1-6FCA-3926-C011FF4294A4}"/>
-          </ac:picMkLst>
-        </pc:picChg>
-        <pc:extLst>
-          <p:ext xmlns:p="http://schemas.openxmlformats.org/presentationml/2006/main" uri="{D6D511B9-2390-475A-947B-AFAB55BFBCF1}">
-            <pc226:cmChg xmlns:pc226="http://schemas.microsoft.com/office/powerpoint/2022/06/main/command" chg="mod">
-              <pc226:chgData name="Julia Moeller" userId="0bcb1583-c1a4-48b5-87e6-2cc074d2d571" providerId="ADAL" clId="{C92DF3DE-23A5-4E98-85FA-AAD4EAE96412}" dt="2023-09-13T09:30:15.472" v="2728"/>
-              <pc2:cmMkLst xmlns:pc2="http://schemas.microsoft.com/office/powerpoint/2019/9/main/command">
-                <pc:docMk/>
-                <pc:sldMk cId="1311594560" sldId="269"/>
-                <pc2:cmMk id="{68A53F02-F702-40B3-8E69-13A15647A57E}"/>
-              </pc2:cmMkLst>
-            </pc226:cmChg>
-            <pc226:cmChg xmlns:pc226="http://schemas.microsoft.com/office/powerpoint/2022/06/main/command" chg="mod">
-              <pc226:chgData name="Julia Moeller" userId="0bcb1583-c1a4-48b5-87e6-2cc074d2d571" providerId="ADAL" clId="{C92DF3DE-23A5-4E98-85FA-AAD4EAE96412}" dt="2023-09-12T12:00:17.129" v="897"/>
-              <pc2:cmMkLst xmlns:pc2="http://schemas.microsoft.com/office/powerpoint/2019/9/main/command">
-                <pc:docMk/>
-                <pc:sldMk cId="1311594560" sldId="269"/>
-                <pc2:cmMk id="{76B72D18-7DE8-4043-AF1C-8EE1039EC246}"/>
-              </pc2:cmMkLst>
-            </pc226:cmChg>
-            <pc226:cmChg xmlns:pc226="http://schemas.microsoft.com/office/powerpoint/2022/06/main/command" chg="mod">
-              <pc226:chgData name="Julia Moeller" userId="0bcb1583-c1a4-48b5-87e6-2cc074d2d571" providerId="ADAL" clId="{C92DF3DE-23A5-4E98-85FA-AAD4EAE96412}" dt="2023-09-12T12:00:18.720" v="898"/>
-              <pc2:cmMkLst xmlns:pc2="http://schemas.microsoft.com/office/powerpoint/2019/9/main/command">
-                <pc:docMk/>
-                <pc:sldMk cId="1311594560" sldId="269"/>
-                <pc2:cmMk id="{D480513E-3153-437F-8AAE-C15512801FE9}"/>
-              </pc2:cmMkLst>
-            </pc226:cmChg>
-            <pc226:cmChg xmlns:pc226="http://schemas.microsoft.com/office/powerpoint/2022/06/main/command" chg="mod">
-              <pc226:chgData name="Julia Moeller" userId="0bcb1583-c1a4-48b5-87e6-2cc074d2d571" providerId="ADAL" clId="{C92DF3DE-23A5-4E98-85FA-AAD4EAE96412}" dt="2023-09-13T09:30:17.726" v="2729"/>
-              <pc2:cmMkLst xmlns:pc2="http://schemas.microsoft.com/office/powerpoint/2019/9/main/command">
-                <pc:docMk/>
-                <pc:sldMk cId="1311594560" sldId="269"/>
-                <pc2:cmMk id="{20A70480-B211-4F03-AE64-BDB953D7E5AB}"/>
-              </pc2:cmMkLst>
-            </pc226:cmChg>
-          </p:ext>
-        </pc:extLst>
-      </pc:sldChg>
-      <pc:sldChg chg="addSp delSp modSp mod addCm modCm">
-        <pc:chgData name="Julia Moeller" userId="0bcb1583-c1a4-48b5-87e6-2cc074d2d571" providerId="ADAL" clId="{C92DF3DE-23A5-4E98-85FA-AAD4EAE96412}" dt="2023-09-29T13:34:02.781" v="11415" actId="20577"/>
-        <pc:sldMkLst>
-          <pc:docMk/>
-          <pc:sldMk cId="2315915978" sldId="270"/>
-        </pc:sldMkLst>
-        <pc:spChg chg="mod">
-          <ac:chgData name="Julia Moeller" userId="0bcb1583-c1a4-48b5-87e6-2cc074d2d571" providerId="ADAL" clId="{C92DF3DE-23A5-4E98-85FA-AAD4EAE96412}" dt="2023-09-13T07:49:25.056" v="1903" actId="20577"/>
-          <ac:spMkLst>
-            <pc:docMk/>
-            <pc:sldMk cId="2315915978" sldId="270"/>
-            <ac:spMk id="2" creationId="{00000000-0000-0000-0000-000000000000}"/>
-          </ac:spMkLst>
-        </pc:spChg>
-        <pc:spChg chg="mod">
-          <ac:chgData name="Julia Moeller" userId="0bcb1583-c1a4-48b5-87e6-2cc074d2d571" providerId="ADAL" clId="{C92DF3DE-23A5-4E98-85FA-AAD4EAE96412}" dt="2023-09-29T13:34:02.781" v="11415" actId="20577"/>
-          <ac:spMkLst>
-            <pc:docMk/>
-            <pc:sldMk cId="2315915978" sldId="270"/>
-            <ac:spMk id="3" creationId="{00000000-0000-0000-0000-000000000000}"/>
-          </ac:spMkLst>
-        </pc:spChg>
-        <pc:spChg chg="add del mod">
-          <ac:chgData name="Julia Moeller" userId="0bcb1583-c1a4-48b5-87e6-2cc074d2d571" providerId="ADAL" clId="{C92DF3DE-23A5-4E98-85FA-AAD4EAE96412}" dt="2023-09-13T08:37:39.587" v="2376" actId="478"/>
-          <ac:spMkLst>
-            <pc:docMk/>
-            <pc:sldMk cId="2315915978" sldId="270"/>
-            <ac:spMk id="4" creationId="{67F20F6A-01DA-FCFB-A184-F2542A561F27}"/>
-          </ac:spMkLst>
-        </pc:spChg>
-        <pc:spChg chg="add mod">
-          <ac:chgData name="Julia Moeller" userId="0bcb1583-c1a4-48b5-87e6-2cc074d2d571" providerId="ADAL" clId="{C92DF3DE-23A5-4E98-85FA-AAD4EAE96412}" dt="2023-09-13T08:38:58.325" v="2380" actId="1076"/>
-          <ac:spMkLst>
-            <pc:docMk/>
-            <pc:sldMk cId="2315915978" sldId="270"/>
-            <ac:spMk id="5" creationId="{BCEB808B-0A3E-8F58-C2B2-A8A7F6D262D5}"/>
-          </ac:spMkLst>
-        </pc:spChg>
-        <pc:spChg chg="add mod">
-          <ac:chgData name="Julia Moeller" userId="0bcb1583-c1a4-48b5-87e6-2cc074d2d571" providerId="ADAL" clId="{C92DF3DE-23A5-4E98-85FA-AAD4EAE96412}" dt="2023-09-13T08:39:03.224" v="2381" actId="1076"/>
-          <ac:spMkLst>
-            <pc:docMk/>
-            <pc:sldMk cId="2315915978" sldId="270"/>
-            <ac:spMk id="6" creationId="{70A8C7BC-DD65-8632-F5F7-399D61CCDB5F}"/>
-          </ac:spMkLst>
-        </pc:spChg>
-        <pc:extLst>
-          <p:ext xmlns:p="http://schemas.openxmlformats.org/presentationml/2006/main" uri="{D6D511B9-2390-475A-947B-AFAB55BFBCF1}">
-            <pc226:cmChg xmlns:pc226="http://schemas.microsoft.com/office/powerpoint/2022/06/main/command" chg="mod">
-              <pc226:chgData name="Julia Moeller" userId="0bcb1583-c1a4-48b5-87e6-2cc074d2d571" providerId="ADAL" clId="{C92DF3DE-23A5-4E98-85FA-AAD4EAE96412}" dt="2023-09-13T09:30:22.219" v="2730"/>
-              <pc2:cmMkLst xmlns:pc2="http://schemas.microsoft.com/office/powerpoint/2019/9/main/command">
-                <pc:docMk/>
-                <pc:sldMk cId="2315915978" sldId="270"/>
-                <pc2:cmMk id="{B7988C69-0866-486E-B3CE-2ADFF0698704}"/>
-              </pc2:cmMkLst>
-            </pc226:cmChg>
-            <pc226:cmChg xmlns:pc226="http://schemas.microsoft.com/office/powerpoint/2022/06/main/command" chg="add">
-              <pc226:chgData name="Julia Moeller" userId="0bcb1583-c1a4-48b5-87e6-2cc074d2d571" providerId="ADAL" clId="{C92DF3DE-23A5-4E98-85FA-AAD4EAE96412}" dt="2023-09-29T13:33:30.313" v="11413"/>
-              <pc2:cmMkLst xmlns:pc2="http://schemas.microsoft.com/office/powerpoint/2019/9/main/command">
-                <pc:docMk/>
-                <pc:sldMk cId="2315915978" sldId="270"/>
-                <pc2:cmMk id="{1AE6ACD6-AB3A-4920-8B05-C36FD966933F}"/>
-              </pc2:cmMkLst>
-            </pc226:cmChg>
-          </p:ext>
-        </pc:extLst>
-      </pc:sldChg>
-      <pc:sldChg chg="addSp delSp modSp mod delCm modCm">
-        <pc:chgData name="Julia Moeller" userId="0bcb1583-c1a4-48b5-87e6-2cc074d2d571" providerId="ADAL" clId="{C92DF3DE-23A5-4E98-85FA-AAD4EAE96412}" dt="2023-09-29T13:34:14.952" v="11417" actId="20577"/>
-        <pc:sldMkLst>
-          <pc:docMk/>
-          <pc:sldMk cId="2226570163" sldId="271"/>
-        </pc:sldMkLst>
-        <pc:spChg chg="mod">
-          <ac:chgData name="Julia Moeller" userId="0bcb1583-c1a4-48b5-87e6-2cc074d2d571" providerId="ADAL" clId="{C92DF3DE-23A5-4E98-85FA-AAD4EAE96412}" dt="2023-09-13T14:29:17.025" v="3708" actId="20577"/>
-          <ac:spMkLst>
-            <pc:docMk/>
-            <pc:sldMk cId="2226570163" sldId="271"/>
-            <ac:spMk id="2" creationId="{00000000-0000-0000-0000-000000000000}"/>
-          </ac:spMkLst>
-        </pc:spChg>
-        <pc:spChg chg="mod">
-          <ac:chgData name="Julia Moeller" userId="0bcb1583-c1a4-48b5-87e6-2cc074d2d571" providerId="ADAL" clId="{C92DF3DE-23A5-4E98-85FA-AAD4EAE96412}" dt="2023-09-29T13:34:14.952" v="11417" actId="20577"/>
-          <ac:spMkLst>
-            <pc:docMk/>
-            <pc:sldMk cId="2226570163" sldId="271"/>
-            <ac:spMk id="4" creationId="{00000000-0000-0000-0000-000000000000}"/>
-          </ac:spMkLst>
-        </pc:spChg>
-        <pc:spChg chg="del mod">
-          <ac:chgData name="Julia Moeller" userId="0bcb1583-c1a4-48b5-87e6-2cc074d2d571" providerId="ADAL" clId="{C92DF3DE-23A5-4E98-85FA-AAD4EAE96412}" dt="2023-09-13T09:27:20.098" v="2697" actId="478"/>
-          <ac:spMkLst>
-            <pc:docMk/>
-            <pc:sldMk cId="2226570163" sldId="271"/>
-            <ac:spMk id="7" creationId="{00000000-0000-0000-0000-000000000000}"/>
-          </ac:spMkLst>
-        </pc:spChg>
-        <pc:grpChg chg="add mod">
-          <ac:chgData name="Julia Moeller" userId="0bcb1583-c1a4-48b5-87e6-2cc074d2d571" providerId="ADAL" clId="{C92DF3DE-23A5-4E98-85FA-AAD4EAE96412}" dt="2023-09-13T10:18:11.557" v="3041" actId="164"/>
-          <ac:grpSpMkLst>
-            <pc:docMk/>
-            <pc:sldMk cId="2226570163" sldId="271"/>
-            <ac:grpSpMk id="9" creationId="{F1CF12FC-6D29-C021-4344-BEE79C22AFC0}"/>
-          </ac:grpSpMkLst>
-        </pc:grpChg>
-        <pc:grpChg chg="add mod">
-          <ac:chgData name="Julia Moeller" userId="0bcb1583-c1a4-48b5-87e6-2cc074d2d571" providerId="ADAL" clId="{C92DF3DE-23A5-4E98-85FA-AAD4EAE96412}" dt="2023-09-13T10:25:36.490" v="3069" actId="1076"/>
-          <ac:grpSpMkLst>
-            <pc:docMk/>
-            <pc:sldMk cId="2226570163" sldId="271"/>
-            <ac:grpSpMk id="10" creationId="{8AEB495A-AF8B-3A37-FAF0-B9AFE5AF079C}"/>
-          </ac:grpSpMkLst>
-        </pc:grpChg>
-        <pc:picChg chg="add mod modCrop">
-          <ac:chgData name="Julia Moeller" userId="0bcb1583-c1a4-48b5-87e6-2cc074d2d571" providerId="ADAL" clId="{C92DF3DE-23A5-4E98-85FA-AAD4EAE96412}" dt="2023-09-13T10:24:38.208" v="3058" actId="164"/>
-          <ac:picMkLst>
-            <pc:docMk/>
-            <pc:sldMk cId="2226570163" sldId="271"/>
-            <ac:picMk id="5" creationId="{32A65B8C-E1F2-AED3-F76F-1066BBE5B142}"/>
-          </ac:picMkLst>
-        </pc:picChg>
-        <pc:picChg chg="del mod">
-          <ac:chgData name="Julia Moeller" userId="0bcb1583-c1a4-48b5-87e6-2cc074d2d571" providerId="ADAL" clId="{C92DF3DE-23A5-4E98-85FA-AAD4EAE96412}" dt="2023-09-13T09:25:37.267" v="2631" actId="478"/>
-          <ac:picMkLst>
-            <pc:docMk/>
-            <pc:sldMk cId="2226570163" sldId="271"/>
-            <ac:picMk id="6" creationId="{00000000-0000-0000-0000-000000000000}"/>
-          </ac:picMkLst>
-        </pc:picChg>
-        <pc:picChg chg="add mod modCrop">
-          <ac:chgData name="Julia Moeller" userId="0bcb1583-c1a4-48b5-87e6-2cc074d2d571" providerId="ADAL" clId="{C92DF3DE-23A5-4E98-85FA-AAD4EAE96412}" dt="2023-09-13T10:24:38.208" v="3058" actId="164"/>
-          <ac:picMkLst>
-            <pc:docMk/>
-            <pc:sldMk cId="2226570163" sldId="271"/>
-            <ac:picMk id="8" creationId="{B760E86B-2025-AB07-D456-572ED56A6504}"/>
-          </ac:picMkLst>
-        </pc:picChg>
-        <pc:extLst>
-          <p:ext xmlns:p="http://schemas.openxmlformats.org/presentationml/2006/main" uri="{D6D511B9-2390-475A-947B-AFAB55BFBCF1}">
-            <pc226:cmChg xmlns:pc226="http://schemas.microsoft.com/office/powerpoint/2022/06/main/command" chg="mod">
-              <pc226:chgData name="Julia Moeller" userId="0bcb1583-c1a4-48b5-87e6-2cc074d2d571" providerId="ADAL" clId="{C92DF3DE-23A5-4E98-85FA-AAD4EAE96412}" dt="2023-09-13T09:35:06.712" v="2856"/>
-              <pc2:cmMkLst xmlns:pc2="http://schemas.microsoft.com/office/powerpoint/2019/9/main/command">
-                <pc:docMk/>
-                <pc:sldMk cId="2226570163" sldId="271"/>
-                <pc2:cmMk id="{B2164C1A-9D2B-4B72-B2AD-ADD850C3A101}"/>
-              </pc2:cmMkLst>
-            </pc226:cmChg>
-            <pc226:cmChg xmlns:pc226="http://schemas.microsoft.com/office/powerpoint/2022/06/main/command" chg="del">
-              <pc226:chgData name="Julia Moeller" userId="0bcb1583-c1a4-48b5-87e6-2cc074d2d571" providerId="ADAL" clId="{C92DF3DE-23A5-4E98-85FA-AAD4EAE96412}" dt="2023-09-15T13:44:02.810" v="11354"/>
-              <pc2:cmMkLst xmlns:pc2="http://schemas.microsoft.com/office/powerpoint/2019/9/main/command">
-                <pc:docMk/>
-                <pc:sldMk cId="2226570163" sldId="271"/>
-                <pc2:cmMk id="{23995C75-FCE3-42C7-8B2B-EB733869557E}"/>
-              </pc2:cmMkLst>
-            </pc226:cmChg>
-          </p:ext>
-        </pc:extLst>
-      </pc:sldChg>
-      <pc:sldChg chg="addSp delSp modSp mod">
-        <pc:chgData name="Julia Moeller" userId="0bcb1583-c1a4-48b5-87e6-2cc074d2d571" providerId="ADAL" clId="{C92DF3DE-23A5-4E98-85FA-AAD4EAE96412}" dt="2023-09-29T13:35:40.825" v="11419" actId="1076"/>
-        <pc:sldMkLst>
-          <pc:docMk/>
-          <pc:sldMk cId="1950821850" sldId="272"/>
-        </pc:sldMkLst>
-        <pc:spChg chg="mod">
-          <ac:chgData name="Julia Moeller" userId="0bcb1583-c1a4-48b5-87e6-2cc074d2d571" providerId="ADAL" clId="{C92DF3DE-23A5-4E98-85FA-AAD4EAE96412}" dt="2023-09-13T14:29:24.668" v="3720" actId="20577"/>
-          <ac:spMkLst>
-            <pc:docMk/>
-            <pc:sldMk cId="1950821850" sldId="272"/>
-            <ac:spMk id="2" creationId="{00000000-0000-0000-0000-000000000000}"/>
-          </ac:spMkLst>
-        </pc:spChg>
-        <pc:spChg chg="mod">
-          <ac:chgData name="Julia Moeller" userId="0bcb1583-c1a4-48b5-87e6-2cc074d2d571" providerId="ADAL" clId="{C92DF3DE-23A5-4E98-85FA-AAD4EAE96412}" dt="2023-09-14T18:39:35.474" v="7664" actId="20577"/>
-          <ac:spMkLst>
-            <pc:docMk/>
-            <pc:sldMk cId="1950821850" sldId="272"/>
-            <ac:spMk id="3" creationId="{00000000-0000-0000-0000-000000000000}"/>
-          </ac:spMkLst>
-        </pc:spChg>
-        <pc:spChg chg="del mod">
-          <ac:chgData name="Julia Moeller" userId="0bcb1583-c1a4-48b5-87e6-2cc074d2d571" providerId="ADAL" clId="{C92DF3DE-23A5-4E98-85FA-AAD4EAE96412}" dt="2023-09-13T12:26:30.623" v="3459" actId="478"/>
-          <ac:spMkLst>
-            <pc:docMk/>
-            <pc:sldMk cId="1950821850" sldId="272"/>
-            <ac:spMk id="6" creationId="{00000000-0000-0000-0000-000000000000}"/>
-          </ac:spMkLst>
-        </pc:spChg>
-        <pc:spChg chg="add mod ord">
-          <ac:chgData name="Julia Moeller" userId="0bcb1583-c1a4-48b5-87e6-2cc074d2d571" providerId="ADAL" clId="{C92DF3DE-23A5-4E98-85FA-AAD4EAE96412}" dt="2023-09-13T12:46:01.721" v="3511" actId="164"/>
-          <ac:spMkLst>
-            <pc:docMk/>
-            <pc:sldMk cId="1950821850" sldId="272"/>
-            <ac:spMk id="18" creationId="{8AAC8470-764B-5D3E-9783-4D0A17DAA11D}"/>
-          </ac:spMkLst>
-        </pc:spChg>
-        <pc:spChg chg="add mod">
-          <ac:chgData name="Julia Moeller" userId="0bcb1583-c1a4-48b5-87e6-2cc074d2d571" providerId="ADAL" clId="{C92DF3DE-23A5-4E98-85FA-AAD4EAE96412}" dt="2023-09-29T13:35:40.825" v="11419" actId="1076"/>
-          <ac:spMkLst>
-            <pc:docMk/>
-            <pc:sldMk cId="1950821850" sldId="272"/>
-            <ac:spMk id="19" creationId="{9C4880A5-1264-0BD9-8010-356B660F47D9}"/>
-          </ac:spMkLst>
-        </pc:spChg>
-        <pc:spChg chg="add mod ord">
-          <ac:chgData name="Julia Moeller" userId="0bcb1583-c1a4-48b5-87e6-2cc074d2d571" providerId="ADAL" clId="{C92DF3DE-23A5-4E98-85FA-AAD4EAE96412}" dt="2023-09-13T12:46:01.721" v="3511" actId="164"/>
-          <ac:spMkLst>
-            <pc:docMk/>
-            <pc:sldMk cId="1950821850" sldId="272"/>
-            <ac:spMk id="20" creationId="{CF51A18E-312C-2832-AC89-74BB6742EAFD}"/>
-          </ac:spMkLst>
-        </pc:spChg>
-        <pc:spChg chg="add mod">
-          <ac:chgData name="Julia Moeller" userId="0bcb1583-c1a4-48b5-87e6-2cc074d2d571" providerId="ADAL" clId="{C92DF3DE-23A5-4E98-85FA-AAD4EAE96412}" dt="2023-09-29T13:35:32.680" v="11418" actId="1076"/>
-          <ac:spMkLst>
-            <pc:docMk/>
-            <pc:sldMk cId="1950821850" sldId="272"/>
-            <ac:spMk id="21" creationId="{976361DA-F887-0024-D073-8ABB5070E10B}"/>
-          </ac:spMkLst>
-        </pc:spChg>
-        <pc:spChg chg="add mod">
-          <ac:chgData name="Julia Moeller" userId="0bcb1583-c1a4-48b5-87e6-2cc074d2d571" providerId="ADAL" clId="{C92DF3DE-23A5-4E98-85FA-AAD4EAE96412}" dt="2023-09-14T18:39:41.399" v="7665" actId="1076"/>
-          <ac:spMkLst>
-            <pc:docMk/>
-            <pc:sldMk cId="1950821850" sldId="272"/>
-            <ac:spMk id="24" creationId="{E2C21C52-D3CF-1559-DAFC-9250D7826BFD}"/>
-          </ac:spMkLst>
-        </pc:spChg>
-        <pc:grpChg chg="add del mod">
-          <ac:chgData name="Julia Moeller" userId="0bcb1583-c1a4-48b5-87e6-2cc074d2d571" providerId="ADAL" clId="{C92DF3DE-23A5-4E98-85FA-AAD4EAE96412}" dt="2023-09-13T12:27:11.971" v="3467" actId="478"/>
-          <ac:grpSpMkLst>
-            <pc:docMk/>
-            <pc:sldMk cId="1950821850" sldId="272"/>
-            <ac:grpSpMk id="8" creationId="{EAB58766-9D4A-F7D6-6A6B-0C0391F135EB}"/>
-          </ac:grpSpMkLst>
-        </pc:grpChg>
-        <pc:grpChg chg="add mod">
-          <ac:chgData name="Julia Moeller" userId="0bcb1583-c1a4-48b5-87e6-2cc074d2d571" providerId="ADAL" clId="{C92DF3DE-23A5-4E98-85FA-AAD4EAE96412}" dt="2023-09-14T18:39:41.399" v="7665" actId="1076"/>
-          <ac:grpSpMkLst>
-            <pc:docMk/>
-            <pc:sldMk cId="1950821850" sldId="272"/>
-            <ac:grpSpMk id="22" creationId="{F4137771-897F-8E60-CE6A-3848E8A4EE3B}"/>
-          </ac:grpSpMkLst>
-        </pc:grpChg>
-        <pc:grpChg chg="add mod">
-          <ac:chgData name="Julia Moeller" userId="0bcb1583-c1a4-48b5-87e6-2cc074d2d571" providerId="ADAL" clId="{C92DF3DE-23A5-4E98-85FA-AAD4EAE96412}" dt="2023-09-14T18:39:41.399" v="7665" actId="1076"/>
-          <ac:grpSpMkLst>
-            <pc:docMk/>
-            <pc:sldMk cId="1950821850" sldId="272"/>
-            <ac:grpSpMk id="23" creationId="{EA935CF2-822E-3D37-AFB7-DE60B6338F7D}"/>
-          </ac:grpSpMkLst>
-        </pc:grpChg>
-        <pc:picChg chg="del">
-          <ac:chgData name="Julia Moeller" userId="0bcb1583-c1a4-48b5-87e6-2cc074d2d571" providerId="ADAL" clId="{C92DF3DE-23A5-4E98-85FA-AAD4EAE96412}" dt="2023-09-13T10:16:32.416" v="3027" actId="478"/>
-          <ac:picMkLst>
-            <pc:docMk/>
-            <pc:sldMk cId="1950821850" sldId="272"/>
-            <ac:picMk id="4" creationId="{00000000-0000-0000-0000-000000000000}"/>
-          </ac:picMkLst>
-        </pc:picChg>
-        <pc:picChg chg="add mod ord modCrop">
-          <ac:chgData name="Julia Moeller" userId="0bcb1583-c1a4-48b5-87e6-2cc074d2d571" providerId="ADAL" clId="{C92DF3DE-23A5-4E98-85FA-AAD4EAE96412}" dt="2023-09-13T12:46:01.721" v="3511" actId="164"/>
-          <ac:picMkLst>
-            <pc:docMk/>
-            <pc:sldMk cId="1950821850" sldId="272"/>
-            <ac:picMk id="7" creationId="{84078063-4FC7-DF8C-5ABB-9E50C99A9A6C}"/>
-          </ac:picMkLst>
-        </pc:picChg>
-        <pc:picChg chg="mod topLvl modCrop">
-          <ac:chgData name="Julia Moeller" userId="0bcb1583-c1a4-48b5-87e6-2cc074d2d571" providerId="ADAL" clId="{C92DF3DE-23A5-4E98-85FA-AAD4EAE96412}" dt="2023-09-13T12:46:13.260" v="3512" actId="164"/>
-          <ac:picMkLst>
-            <pc:docMk/>
-            <pc:sldMk cId="1950821850" sldId="272"/>
-            <ac:picMk id="9" creationId="{2E6BD2B6-FAEB-D82F-4200-1F90487857D8}"/>
-          </ac:picMkLst>
-        </pc:picChg>
-        <pc:picChg chg="del mod topLvl">
-          <ac:chgData name="Julia Moeller" userId="0bcb1583-c1a4-48b5-87e6-2cc074d2d571" providerId="ADAL" clId="{C92DF3DE-23A5-4E98-85FA-AAD4EAE96412}" dt="2023-09-13T12:27:11.971" v="3467" actId="478"/>
-          <ac:picMkLst>
-            <pc:docMk/>
-            <pc:sldMk cId="1950821850" sldId="272"/>
-            <ac:picMk id="10" creationId="{A33C289E-48E6-5AB8-BDBC-42D82FAA7879}"/>
-          </ac:picMkLst>
-        </pc:picChg>
-        <pc:cxnChg chg="add del mod">
-          <ac:chgData name="Julia Moeller" userId="0bcb1583-c1a4-48b5-87e6-2cc074d2d571" providerId="ADAL" clId="{C92DF3DE-23A5-4E98-85FA-AAD4EAE96412}" dt="2023-09-13T12:28:07.043" v="3476" actId="478"/>
-          <ac:cxnSpMkLst>
-            <pc:docMk/>
-            <pc:sldMk cId="1950821850" sldId="272"/>
-            <ac:cxnSpMk id="12" creationId="{5D82C34B-04C0-1B4B-1C75-D00907A45630}"/>
-          </ac:cxnSpMkLst>
-        </pc:cxnChg>
-        <pc:cxnChg chg="add del mod">
-          <ac:chgData name="Julia Moeller" userId="0bcb1583-c1a4-48b5-87e6-2cc074d2d571" providerId="ADAL" clId="{C92DF3DE-23A5-4E98-85FA-AAD4EAE96412}" dt="2023-09-13T12:38:26.708" v="3486" actId="478"/>
-          <ac:cxnSpMkLst>
-            <pc:docMk/>
-            <pc:sldMk cId="1950821850" sldId="272"/>
-            <ac:cxnSpMk id="16" creationId="{2D92E317-94F6-8A31-E317-A478AAE9E127}"/>
-          </ac:cxnSpMkLst>
-        </pc:cxnChg>
-      </pc:sldChg>
-      <pc:sldChg chg="modSp mod delCm modCm">
-        <pc:chgData name="Julia Moeller" userId="0bcb1583-c1a4-48b5-87e6-2cc074d2d571" providerId="ADAL" clId="{C92DF3DE-23A5-4E98-85FA-AAD4EAE96412}" dt="2023-09-15T14:28:39.012" v="11372" actId="14100"/>
-        <pc:sldMkLst>
-          <pc:docMk/>
-          <pc:sldMk cId="3368420116" sldId="273"/>
-        </pc:sldMkLst>
-        <pc:spChg chg="mod">
-          <ac:chgData name="Julia Moeller" userId="0bcb1583-c1a4-48b5-87e6-2cc074d2d571" providerId="ADAL" clId="{C92DF3DE-23A5-4E98-85FA-AAD4EAE96412}" dt="2023-09-13T14:30:58.447" v="3799" actId="20577"/>
-          <ac:spMkLst>
-            <pc:docMk/>
-            <pc:sldMk cId="3368420116" sldId="273"/>
-            <ac:spMk id="2" creationId="{00000000-0000-0000-0000-000000000000}"/>
-          </ac:spMkLst>
-        </pc:spChg>
-        <pc:spChg chg="mod">
-          <ac:chgData name="Julia Moeller" userId="0bcb1583-c1a4-48b5-87e6-2cc074d2d571" providerId="ADAL" clId="{C92DF3DE-23A5-4E98-85FA-AAD4EAE96412}" dt="2023-09-15T14:28:39.012" v="11372" actId="14100"/>
-          <ac:spMkLst>
-            <pc:docMk/>
-            <pc:sldMk cId="3368420116" sldId="273"/>
-            <ac:spMk id="3" creationId="{00000000-0000-0000-0000-000000000000}"/>
-          </ac:spMkLst>
-        </pc:spChg>
-        <pc:picChg chg="mod">
-          <ac:chgData name="Julia Moeller" userId="0bcb1583-c1a4-48b5-87e6-2cc074d2d571" providerId="ADAL" clId="{C92DF3DE-23A5-4E98-85FA-AAD4EAE96412}" dt="2023-09-13T12:58:50.125" v="3529" actId="1076"/>
-          <ac:picMkLst>
-            <pc:docMk/>
-            <pc:sldMk cId="3368420116" sldId="273"/>
-            <ac:picMk id="5" creationId="{00000000-0000-0000-0000-000000000000}"/>
-          </ac:picMkLst>
-        </pc:picChg>
-        <pc:extLst>
-          <p:ext xmlns:p="http://schemas.openxmlformats.org/presentationml/2006/main" uri="{D6D511B9-2390-475A-947B-AFAB55BFBCF1}">
-            <pc226:cmChg xmlns:pc226="http://schemas.microsoft.com/office/powerpoint/2022/06/main/command" chg="mod">
-              <pc226:chgData name="Julia Moeller" userId="0bcb1583-c1a4-48b5-87e6-2cc074d2d571" providerId="ADAL" clId="{C92DF3DE-23A5-4E98-85FA-AAD4EAE96412}" dt="2023-09-13T14:21:25.172" v="3676"/>
-              <pc2:cmMkLst xmlns:pc2="http://schemas.microsoft.com/office/powerpoint/2019/9/main/command">
-                <pc:docMk/>
-                <pc:sldMk cId="3368420116" sldId="273"/>
-                <pc2:cmMk id="{76F41E33-0C30-46F5-849D-E87641BED3C3}"/>
-              </pc2:cmMkLst>
-            </pc226:cmChg>
-            <pc226:cmChg xmlns:pc226="http://schemas.microsoft.com/office/powerpoint/2022/06/main/command" chg="del">
-              <pc226:chgData name="Julia Moeller" userId="0bcb1583-c1a4-48b5-87e6-2cc074d2d571" providerId="ADAL" clId="{C92DF3DE-23A5-4E98-85FA-AAD4EAE96412}" dt="2023-09-15T13:44:07.084" v="11355"/>
-              <pc2:cmMkLst xmlns:pc2="http://schemas.microsoft.com/office/powerpoint/2019/9/main/command">
-                <pc:docMk/>
-                <pc:sldMk cId="3368420116" sldId="273"/>
-                <pc2:cmMk id="{AFF6F837-B31C-49A1-973E-54966DD4CC52}"/>
-              </pc2:cmMkLst>
-            </pc226:cmChg>
-          </p:ext>
-        </pc:extLst>
-      </pc:sldChg>
-      <pc:sldChg chg="addSp delSp modSp mod">
-        <pc:chgData name="Julia Moeller" userId="0bcb1583-c1a4-48b5-87e6-2cc074d2d571" providerId="ADAL" clId="{C92DF3DE-23A5-4E98-85FA-AAD4EAE96412}" dt="2023-09-13T14:35:12.724" v="3875" actId="1076"/>
-        <pc:sldMkLst>
-          <pc:docMk/>
-          <pc:sldMk cId="2147403087" sldId="274"/>
-        </pc:sldMkLst>
-        <pc:spChg chg="mod">
-          <ac:chgData name="Julia Moeller" userId="0bcb1583-c1a4-48b5-87e6-2cc074d2d571" providerId="ADAL" clId="{C92DF3DE-23A5-4E98-85FA-AAD4EAE96412}" dt="2023-09-13T14:29:32.623" v="3728" actId="20577"/>
-          <ac:spMkLst>
-            <pc:docMk/>
-            <pc:sldMk cId="2147403087" sldId="274"/>
-            <ac:spMk id="2" creationId="{00000000-0000-0000-0000-000000000000}"/>
-          </ac:spMkLst>
-        </pc:spChg>
-        <pc:spChg chg="mod">
-          <ac:chgData name="Julia Moeller" userId="0bcb1583-c1a4-48b5-87e6-2cc074d2d571" providerId="ADAL" clId="{C92DF3DE-23A5-4E98-85FA-AAD4EAE96412}" dt="2023-09-13T14:33:58.255" v="3859" actId="14100"/>
-          <ac:spMkLst>
-            <pc:docMk/>
-            <pc:sldMk cId="2147403087" sldId="274"/>
-            <ac:spMk id="3" creationId="{00000000-0000-0000-0000-000000000000}"/>
-          </ac:spMkLst>
-        </pc:spChg>
-        <pc:spChg chg="add mod">
-          <ac:chgData name="Julia Moeller" userId="0bcb1583-c1a4-48b5-87e6-2cc074d2d571" providerId="ADAL" clId="{C92DF3DE-23A5-4E98-85FA-AAD4EAE96412}" dt="2023-09-13T14:34:52.386" v="3869" actId="14100"/>
-          <ac:spMkLst>
-            <pc:docMk/>
-            <pc:sldMk cId="2147403087" sldId="274"/>
-            <ac:spMk id="10" creationId="{7872A00F-8BD7-D730-0583-55B10A5290BD}"/>
-          </ac:spMkLst>
-        </pc:spChg>
-        <pc:spChg chg="add mod">
-          <ac:chgData name="Julia Moeller" userId="0bcb1583-c1a4-48b5-87e6-2cc074d2d571" providerId="ADAL" clId="{C92DF3DE-23A5-4E98-85FA-AAD4EAE96412}" dt="2023-09-13T14:35:12.724" v="3875" actId="1076"/>
-          <ac:spMkLst>
-            <pc:docMk/>
-            <pc:sldMk cId="2147403087" sldId="274"/>
-            <ac:spMk id="11" creationId="{15E05614-7F43-FA56-FBBC-73FCF8115B0F}"/>
-          </ac:spMkLst>
-        </pc:spChg>
-        <pc:grpChg chg="add mod">
-          <ac:chgData name="Julia Moeller" userId="0bcb1583-c1a4-48b5-87e6-2cc074d2d571" providerId="ADAL" clId="{C92DF3DE-23A5-4E98-85FA-AAD4EAE96412}" dt="2023-09-13T14:35:00.457" v="3872" actId="1076"/>
-          <ac:grpSpMkLst>
-            <pc:docMk/>
-            <pc:sldMk cId="2147403087" sldId="274"/>
-            <ac:grpSpMk id="9" creationId="{3B64F671-5012-9331-BC79-9406D041E632}"/>
-          </ac:grpSpMkLst>
-        </pc:grpChg>
-        <pc:picChg chg="del">
-          <ac:chgData name="Julia Moeller" userId="0bcb1583-c1a4-48b5-87e6-2cc074d2d571" providerId="ADAL" clId="{C92DF3DE-23A5-4E98-85FA-AAD4EAE96412}" dt="2023-09-13T14:27:16.388" v="3677" actId="478"/>
-          <ac:picMkLst>
-            <pc:docMk/>
-            <pc:sldMk cId="2147403087" sldId="274"/>
-            <ac:picMk id="5" creationId="{00000000-0000-0000-0000-000000000000}"/>
-          </ac:picMkLst>
-        </pc:picChg>
-        <pc:picChg chg="add mod">
-          <ac:chgData name="Julia Moeller" userId="0bcb1583-c1a4-48b5-87e6-2cc074d2d571" providerId="ADAL" clId="{C92DF3DE-23A5-4E98-85FA-AAD4EAE96412}" dt="2023-09-13T14:28:41.774" v="3693" actId="164"/>
-          <ac:picMkLst>
-            <pc:docMk/>
-            <pc:sldMk cId="2147403087" sldId="274"/>
-            <ac:picMk id="6" creationId="{CCF63831-8778-0BA2-9D51-516B6A5DEE49}"/>
-          </ac:picMkLst>
-        </pc:picChg>
-        <pc:picChg chg="add mod">
-          <ac:chgData name="Julia Moeller" userId="0bcb1583-c1a4-48b5-87e6-2cc074d2d571" providerId="ADAL" clId="{C92DF3DE-23A5-4E98-85FA-AAD4EAE96412}" dt="2023-09-13T14:28:41.774" v="3693" actId="164"/>
-          <ac:picMkLst>
-            <pc:docMk/>
-            <pc:sldMk cId="2147403087" sldId="274"/>
-            <ac:picMk id="7" creationId="{5828660E-7F9E-DCE7-6648-EE454E3C2765}"/>
-          </ac:picMkLst>
-        </pc:picChg>
-        <pc:picChg chg="add mod">
-          <ac:chgData name="Julia Moeller" userId="0bcb1583-c1a4-48b5-87e6-2cc074d2d571" providerId="ADAL" clId="{C92DF3DE-23A5-4E98-85FA-AAD4EAE96412}" dt="2023-09-13T14:28:41.774" v="3693" actId="164"/>
-          <ac:picMkLst>
-            <pc:docMk/>
-            <pc:sldMk cId="2147403087" sldId="274"/>
-            <ac:picMk id="8" creationId="{CFAD47AD-E13B-72A1-5D94-2CC93896E873}"/>
-          </ac:picMkLst>
-        </pc:picChg>
-      </pc:sldChg>
-      <pc:sldChg chg="modSp mod modCm">
-        <pc:chgData name="Julia Moeller" userId="0bcb1583-c1a4-48b5-87e6-2cc074d2d571" providerId="ADAL" clId="{C92DF3DE-23A5-4E98-85FA-AAD4EAE96412}" dt="2023-09-14T11:33:40.477" v="5367" actId="1076"/>
-        <pc:sldMkLst>
-          <pc:docMk/>
-          <pc:sldMk cId="3015651157" sldId="275"/>
-        </pc:sldMkLst>
-        <pc:spChg chg="mod">
-          <ac:chgData name="Julia Moeller" userId="0bcb1583-c1a4-48b5-87e6-2cc074d2d571" providerId="ADAL" clId="{C92DF3DE-23A5-4E98-85FA-AAD4EAE96412}" dt="2023-09-13T14:36:01.502" v="3886" actId="20577"/>
-          <ac:spMkLst>
-            <pc:docMk/>
-            <pc:sldMk cId="3015651157" sldId="275"/>
-            <ac:spMk id="2" creationId="{00000000-0000-0000-0000-000000000000}"/>
-          </ac:spMkLst>
-        </pc:spChg>
-        <pc:spChg chg="mod">
-          <ac:chgData name="Julia Moeller" userId="0bcb1583-c1a4-48b5-87e6-2cc074d2d571" providerId="ADAL" clId="{C92DF3DE-23A5-4E98-85FA-AAD4EAE96412}" dt="2023-09-14T11:33:37.095" v="5366" actId="14100"/>
-          <ac:spMkLst>
-            <pc:docMk/>
-            <pc:sldMk cId="3015651157" sldId="275"/>
-            <ac:spMk id="3" creationId="{00000000-0000-0000-0000-000000000000}"/>
-          </ac:spMkLst>
-        </pc:spChg>
-        <pc:picChg chg="mod">
-          <ac:chgData name="Julia Moeller" userId="0bcb1583-c1a4-48b5-87e6-2cc074d2d571" providerId="ADAL" clId="{C92DF3DE-23A5-4E98-85FA-AAD4EAE96412}" dt="2023-09-14T11:33:40.477" v="5367" actId="1076"/>
-          <ac:picMkLst>
-            <pc:docMk/>
-            <pc:sldMk cId="3015651157" sldId="275"/>
-            <ac:picMk id="5" creationId="{00000000-0000-0000-0000-000000000000}"/>
-          </ac:picMkLst>
-        </pc:picChg>
-        <pc:extLst>
-          <p:ext xmlns:p="http://schemas.openxmlformats.org/presentationml/2006/main" uri="{D6D511B9-2390-475A-947B-AFAB55BFBCF1}">
-            <pc226:cmChg xmlns:pc226="http://schemas.microsoft.com/office/powerpoint/2022/06/main/command" chg="mod">
-              <pc226:chgData name="Julia Moeller" userId="0bcb1583-c1a4-48b5-87e6-2cc074d2d571" providerId="ADAL" clId="{C92DF3DE-23A5-4E98-85FA-AAD4EAE96412}" dt="2023-09-14T09:08:58.168" v="4081"/>
-              <pc2:cmMkLst xmlns:pc2="http://schemas.microsoft.com/office/powerpoint/2019/9/main/command">
-                <pc:docMk/>
-                <pc:sldMk cId="3015651157" sldId="275"/>
-                <pc2:cmMk id="{71C02D51-D4B2-4B99-817C-3DE22F49AD5D}"/>
-              </pc2:cmMkLst>
-            </pc226:cmChg>
-          </p:ext>
-        </pc:extLst>
-      </pc:sldChg>
-      <pc:sldChg chg="addSp delSp modSp mod modCm">
-        <pc:chgData name="Julia Moeller" userId="0bcb1583-c1a4-48b5-87e6-2cc074d2d571" providerId="ADAL" clId="{C92DF3DE-23A5-4E98-85FA-AAD4EAE96412}" dt="2023-09-14T19:12:18.817" v="8132"/>
-        <pc:sldMkLst>
-          <pc:docMk/>
-          <pc:sldMk cId="1529891497" sldId="276"/>
-        </pc:sldMkLst>
-        <pc:spChg chg="mod">
-          <ac:chgData name="Julia Moeller" userId="0bcb1583-c1a4-48b5-87e6-2cc074d2d571" providerId="ADAL" clId="{C92DF3DE-23A5-4E98-85FA-AAD4EAE96412}" dt="2023-09-14T09:04:17.925" v="4080" actId="20577"/>
-          <ac:spMkLst>
-            <pc:docMk/>
-            <pc:sldMk cId="1529891497" sldId="276"/>
-            <ac:spMk id="2" creationId="{00000000-0000-0000-0000-000000000000}"/>
-          </ac:spMkLst>
-        </pc:spChg>
-        <pc:spChg chg="mod">
-          <ac:chgData name="Julia Moeller" userId="0bcb1583-c1a4-48b5-87e6-2cc074d2d571" providerId="ADAL" clId="{C92DF3DE-23A5-4E98-85FA-AAD4EAE96412}" dt="2023-09-14T11:26:11.526" v="5157" actId="1076"/>
-          <ac:spMkLst>
-            <pc:docMk/>
-            <pc:sldMk cId="1529891497" sldId="276"/>
-            <ac:spMk id="3" creationId="{00000000-0000-0000-0000-000000000000}"/>
-          </ac:spMkLst>
-        </pc:spChg>
-        <pc:spChg chg="del mod">
-          <ac:chgData name="Julia Moeller" userId="0bcb1583-c1a4-48b5-87e6-2cc074d2d571" providerId="ADAL" clId="{C92DF3DE-23A5-4E98-85FA-AAD4EAE96412}" dt="2023-09-14T10:05:48.727" v="4525" actId="478"/>
-          <ac:spMkLst>
-            <pc:docMk/>
-            <pc:sldMk cId="1529891497" sldId="276"/>
-            <ac:spMk id="8" creationId="{00000000-0000-0000-0000-000000000000}"/>
-          </ac:spMkLst>
-        </pc:spChg>
-        <pc:grpChg chg="del">
-          <ac:chgData name="Julia Moeller" userId="0bcb1583-c1a4-48b5-87e6-2cc074d2d571" providerId="ADAL" clId="{C92DF3DE-23A5-4E98-85FA-AAD4EAE96412}" dt="2023-09-14T09:09:52.917" v="4097" actId="478"/>
-          <ac:grpSpMkLst>
-            <pc:docMk/>
-            <pc:sldMk cId="1529891497" sldId="276"/>
-            <ac:grpSpMk id="7" creationId="{00000000-0000-0000-0000-000000000000}"/>
-          </ac:grpSpMkLst>
-        </pc:grpChg>
-        <pc:picChg chg="add del mod">
-          <ac:chgData name="Julia Moeller" userId="0bcb1583-c1a4-48b5-87e6-2cc074d2d571" providerId="ADAL" clId="{C92DF3DE-23A5-4E98-85FA-AAD4EAE96412}" dt="2023-09-14T11:23:31.030" v="5017" actId="478"/>
-          <ac:picMkLst>
-            <pc:docMk/>
-            <pc:sldMk cId="1529891497" sldId="276"/>
-            <ac:picMk id="4" creationId="{91F475E8-C3EC-6703-FF1D-1D3AC53A1D12}"/>
-          </ac:picMkLst>
-        </pc:picChg>
-        <pc:extLst>
-          <p:ext xmlns:p="http://schemas.openxmlformats.org/presentationml/2006/main" uri="{D6D511B9-2390-475A-947B-AFAB55BFBCF1}">
-            <pc226:cmChg xmlns:pc226="http://schemas.microsoft.com/office/powerpoint/2022/06/main/command" chg="mod">
-              <pc226:chgData name="Julia Moeller" userId="0bcb1583-c1a4-48b5-87e6-2cc074d2d571" providerId="ADAL" clId="{C92DF3DE-23A5-4E98-85FA-AAD4EAE96412}" dt="2023-09-14T19:12:18.817" v="8132"/>
-              <pc2:cmMkLst xmlns:pc2="http://schemas.microsoft.com/office/powerpoint/2019/9/main/command">
-                <pc:docMk/>
-                <pc:sldMk cId="1529891497" sldId="276"/>
-                <pc2:cmMk id="{29306314-2E6E-4E13-858C-3E2A0356C900}"/>
-              </pc2:cmMkLst>
-            </pc226:cmChg>
-          </p:ext>
-        </pc:extLst>
-      </pc:sldChg>
-      <pc:sldChg chg="delSp del mod">
-        <pc:chgData name="Julia Moeller" userId="0bcb1583-c1a4-48b5-87e6-2cc074d2d571" providerId="ADAL" clId="{C92DF3DE-23A5-4E98-85FA-AAD4EAE96412}" dt="2023-09-14T11:48:30.935" v="5572" actId="2696"/>
-        <pc:sldMkLst>
-          <pc:docMk/>
-          <pc:sldMk cId="1195076971" sldId="277"/>
-        </pc:sldMkLst>
-        <pc:picChg chg="del">
-          <ac:chgData name="Julia Moeller" userId="0bcb1583-c1a4-48b5-87e6-2cc074d2d571" providerId="ADAL" clId="{C92DF3DE-23A5-4E98-85FA-AAD4EAE96412}" dt="2023-09-14T11:42:03.390" v="5524" actId="21"/>
-          <ac:picMkLst>
-            <pc:docMk/>
-            <pc:sldMk cId="1195076971" sldId="277"/>
-            <ac:picMk id="4" creationId="{00000000-0000-0000-0000-000000000000}"/>
-          </ac:picMkLst>
-        </pc:picChg>
-      </pc:sldChg>
-      <pc:sldChg chg="addSp delSp modSp mod">
-        <pc:chgData name="Julia Moeller" userId="0bcb1583-c1a4-48b5-87e6-2cc074d2d571" providerId="ADAL" clId="{C92DF3DE-23A5-4E98-85FA-AAD4EAE96412}" dt="2023-09-14T11:48:14.678" v="5571" actId="12"/>
-        <pc:sldMkLst>
-          <pc:docMk/>
-          <pc:sldMk cId="1755948848" sldId="278"/>
-        </pc:sldMkLst>
-        <pc:spChg chg="mod">
-          <ac:chgData name="Julia Moeller" userId="0bcb1583-c1a4-48b5-87e6-2cc074d2d571" providerId="ADAL" clId="{C92DF3DE-23A5-4E98-85FA-AAD4EAE96412}" dt="2023-09-14T10:47:36.612" v="4962"/>
-          <ac:spMkLst>
-            <pc:docMk/>
-            <pc:sldMk cId="1755948848" sldId="278"/>
-            <ac:spMk id="2" creationId="{00000000-0000-0000-0000-000000000000}"/>
-          </ac:spMkLst>
-        </pc:spChg>
-        <pc:spChg chg="mod">
-          <ac:chgData name="Julia Moeller" userId="0bcb1583-c1a4-48b5-87e6-2cc074d2d571" providerId="ADAL" clId="{C92DF3DE-23A5-4E98-85FA-AAD4EAE96412}" dt="2023-09-14T11:48:14.678" v="5571" actId="12"/>
-          <ac:spMkLst>
-            <pc:docMk/>
-            <pc:sldMk cId="1755948848" sldId="278"/>
-            <ac:spMk id="3" creationId="{00000000-0000-0000-0000-000000000000}"/>
-          </ac:spMkLst>
-        </pc:spChg>
-        <pc:spChg chg="add mod">
-          <ac:chgData name="Julia Moeller" userId="0bcb1583-c1a4-48b5-87e6-2cc074d2d571" providerId="ADAL" clId="{C92DF3DE-23A5-4E98-85FA-AAD4EAE96412}" dt="2023-09-14T11:47:37.085" v="5556" actId="207"/>
-          <ac:spMkLst>
-            <pc:docMk/>
-            <pc:sldMk cId="1755948848" sldId="278"/>
-            <ac:spMk id="10" creationId="{4509E137-3D1B-0D3F-6B24-746A0420A3E3}"/>
-          </ac:spMkLst>
-        </pc:spChg>
-        <pc:grpChg chg="del mod">
-          <ac:chgData name="Julia Moeller" userId="0bcb1583-c1a4-48b5-87e6-2cc074d2d571" providerId="ADAL" clId="{C92DF3DE-23A5-4E98-85FA-AAD4EAE96412}" dt="2023-09-14T11:29:25.934" v="5214" actId="478"/>
-          <ac:grpSpMkLst>
-            <pc:docMk/>
-            <pc:sldMk cId="1755948848" sldId="278"/>
-            <ac:grpSpMk id="7" creationId="{00000000-0000-0000-0000-000000000000}"/>
-          </ac:grpSpMkLst>
-        </pc:grpChg>
-        <pc:picChg chg="add mod">
-          <ac:chgData name="Julia Moeller" userId="0bcb1583-c1a4-48b5-87e6-2cc074d2d571" providerId="ADAL" clId="{C92DF3DE-23A5-4E98-85FA-AAD4EAE96412}" dt="2023-09-14T11:46:29.479" v="5552" actId="1076"/>
-          <ac:picMkLst>
-            <pc:docMk/>
-            <pc:sldMk cId="1755948848" sldId="278"/>
-            <ac:picMk id="8" creationId="{A113ED58-F6FD-C47E-4EEA-15AC5B461614}"/>
-          </ac:picMkLst>
-        </pc:picChg>
-        <pc:picChg chg="add mod">
-          <ac:chgData name="Julia Moeller" userId="0bcb1583-c1a4-48b5-87e6-2cc074d2d571" providerId="ADAL" clId="{C92DF3DE-23A5-4E98-85FA-AAD4EAE96412}" dt="2023-09-14T11:46:16.606" v="5551" actId="1076"/>
-          <ac:picMkLst>
-            <pc:docMk/>
-            <pc:sldMk cId="1755948848" sldId="278"/>
-            <ac:picMk id="9" creationId="{44F7DA11-197D-9BD5-05DF-0903A1F96066}"/>
-          </ac:picMkLst>
-        </pc:picChg>
-      </pc:sldChg>
-      <pc:sldChg chg="delSp modSp mod modCm">
-        <pc:chgData name="Julia Moeller" userId="0bcb1583-c1a4-48b5-87e6-2cc074d2d571" providerId="ADAL" clId="{C92DF3DE-23A5-4E98-85FA-AAD4EAE96412}" dt="2023-09-29T13:42:31.338" v="11472" actId="255"/>
-        <pc:sldMkLst>
-          <pc:docMk/>
-          <pc:sldMk cId="2957868102" sldId="279"/>
-        </pc:sldMkLst>
-        <pc:spChg chg="mod">
-          <ac:chgData name="Julia Moeller" userId="0bcb1583-c1a4-48b5-87e6-2cc074d2d571" providerId="ADAL" clId="{C92DF3DE-23A5-4E98-85FA-AAD4EAE96412}" dt="2023-09-14T11:54:05.167" v="5700" actId="20577"/>
-          <ac:spMkLst>
-            <pc:docMk/>
-            <pc:sldMk cId="2957868102" sldId="279"/>
-            <ac:spMk id="2" creationId="{00000000-0000-0000-0000-000000000000}"/>
-          </ac:spMkLst>
-        </pc:spChg>
-        <pc:spChg chg="mod">
-          <ac:chgData name="Julia Moeller" userId="0bcb1583-c1a4-48b5-87e6-2cc074d2d571" providerId="ADAL" clId="{C92DF3DE-23A5-4E98-85FA-AAD4EAE96412}" dt="2023-09-29T13:42:31.338" v="11472" actId="255"/>
-          <ac:spMkLst>
-            <pc:docMk/>
-            <pc:sldMk cId="2957868102" sldId="279"/>
-            <ac:spMk id="3" creationId="{00000000-0000-0000-0000-000000000000}"/>
-          </ac:spMkLst>
-        </pc:spChg>
-        <pc:spChg chg="del">
-          <ac:chgData name="Julia Moeller" userId="0bcb1583-c1a4-48b5-87e6-2cc074d2d571" providerId="ADAL" clId="{C92DF3DE-23A5-4E98-85FA-AAD4EAE96412}" dt="2023-09-14T11:49:14.098" v="5577" actId="478"/>
-          <ac:spMkLst>
-            <pc:docMk/>
-            <pc:sldMk cId="2957868102" sldId="279"/>
-            <ac:spMk id="5" creationId="{00000000-0000-0000-0000-000000000000}"/>
-          </ac:spMkLst>
-        </pc:spChg>
-        <pc:extLst>
-          <p:ext xmlns:p="http://schemas.openxmlformats.org/presentationml/2006/main" uri="{D6D511B9-2390-475A-947B-AFAB55BFBCF1}">
-            <pc226:cmChg xmlns:pc226="http://schemas.microsoft.com/office/powerpoint/2022/06/main/command" chg="mod">
-              <pc226:chgData name="Julia Moeller" userId="0bcb1583-c1a4-48b5-87e6-2cc074d2d571" providerId="ADAL" clId="{C92DF3DE-23A5-4E98-85FA-AAD4EAE96412}" dt="2023-09-14T19:12:03.340" v="8131"/>
-              <pc2:cmMkLst xmlns:pc2="http://schemas.microsoft.com/office/powerpoint/2019/9/main/command">
-                <pc:docMk/>
-                <pc:sldMk cId="2957868102" sldId="279"/>
-                <pc2:cmMk id="{2A7C7F4D-FE5A-4D9E-B9BB-25A7AEB69BC2}"/>
-              </pc2:cmMkLst>
-            </pc226:cmChg>
-          </p:ext>
-        </pc:extLst>
-      </pc:sldChg>
-      <pc:sldChg chg="addSp delSp modSp mod modCm">
-        <pc:chgData name="Julia Moeller" userId="0bcb1583-c1a4-48b5-87e6-2cc074d2d571" providerId="ADAL" clId="{C92DF3DE-23A5-4E98-85FA-AAD4EAE96412}" dt="2023-09-14T19:11:58.032" v="8130"/>
-        <pc:sldMkLst>
-          <pc:docMk/>
-          <pc:sldMk cId="19262974" sldId="280"/>
-        </pc:sldMkLst>
-        <pc:spChg chg="mod">
-          <ac:chgData name="Julia Moeller" userId="0bcb1583-c1a4-48b5-87e6-2cc074d2d571" providerId="ADAL" clId="{C92DF3DE-23A5-4E98-85FA-AAD4EAE96412}" dt="2023-09-14T11:54:13.002" v="5701" actId="20577"/>
-          <ac:spMkLst>
-            <pc:docMk/>
-            <pc:sldMk cId="19262974" sldId="280"/>
-            <ac:spMk id="2" creationId="{00000000-0000-0000-0000-000000000000}"/>
-          </ac:spMkLst>
-        </pc:spChg>
-        <pc:spChg chg="del mod">
-          <ac:chgData name="Julia Moeller" userId="0bcb1583-c1a4-48b5-87e6-2cc074d2d571" providerId="ADAL" clId="{C92DF3DE-23A5-4E98-85FA-AAD4EAE96412}" dt="2023-09-14T11:52:37.377" v="5679" actId="478"/>
-          <ac:spMkLst>
-            <pc:docMk/>
-            <pc:sldMk cId="19262974" sldId="280"/>
-            <ac:spMk id="11" creationId="{00000000-0000-0000-0000-000000000000}"/>
-          </ac:spMkLst>
-        </pc:spChg>
-        <pc:spChg chg="add mod">
-          <ac:chgData name="Julia Moeller" userId="0bcb1583-c1a4-48b5-87e6-2cc074d2d571" providerId="ADAL" clId="{C92DF3DE-23A5-4E98-85FA-AAD4EAE96412}" dt="2023-09-14T11:55:42.893" v="5750" actId="207"/>
-          <ac:spMkLst>
-            <pc:docMk/>
-            <pc:sldMk cId="19262974" sldId="280"/>
-            <ac:spMk id="15" creationId="{3AE3C078-C8F9-2C6E-7B39-C50F9D03D139}"/>
-          </ac:spMkLst>
-        </pc:spChg>
-        <pc:spChg chg="add mod">
-          <ac:chgData name="Julia Moeller" userId="0bcb1583-c1a4-48b5-87e6-2cc074d2d571" providerId="ADAL" clId="{C92DF3DE-23A5-4E98-85FA-AAD4EAE96412}" dt="2023-09-14T12:05:41.993" v="5776" actId="1076"/>
-          <ac:spMkLst>
-            <pc:docMk/>
-            <pc:sldMk cId="19262974" sldId="280"/>
-            <ac:spMk id="17" creationId="{0CBB159D-EA69-2BAE-C8EC-40FE3092E238}"/>
-          </ac:spMkLst>
-        </pc:spChg>
-        <pc:spChg chg="del mod">
-          <ac:chgData name="Julia Moeller" userId="0bcb1583-c1a4-48b5-87e6-2cc074d2d571" providerId="ADAL" clId="{C92DF3DE-23A5-4E98-85FA-AAD4EAE96412}" dt="2023-09-14T11:52:35.423" v="5677" actId="478"/>
-          <ac:spMkLst>
-            <pc:docMk/>
-            <pc:sldMk cId="19262974" sldId="280"/>
-            <ac:spMk id="18" creationId="{00000000-0000-0000-0000-000000000000}"/>
-          </ac:spMkLst>
-        </pc:spChg>
-        <pc:spChg chg="add del mod">
-          <ac:chgData name="Julia Moeller" userId="0bcb1583-c1a4-48b5-87e6-2cc074d2d571" providerId="ADAL" clId="{C92DF3DE-23A5-4E98-85FA-AAD4EAE96412}" dt="2023-09-14T12:05:19.925" v="5774" actId="478"/>
-          <ac:spMkLst>
-            <pc:docMk/>
-            <pc:sldMk cId="19262974" sldId="280"/>
-            <ac:spMk id="19" creationId="{ABC71585-4C36-153D-4445-AE2B18FAF76C}"/>
-          </ac:spMkLst>
-        </pc:spChg>
-        <pc:spChg chg="add mod">
-          <ac:chgData name="Julia Moeller" userId="0bcb1583-c1a4-48b5-87e6-2cc074d2d571" providerId="ADAL" clId="{C92DF3DE-23A5-4E98-85FA-AAD4EAE96412}" dt="2023-09-14T13:31:02.452" v="6488" actId="20577"/>
-          <ac:spMkLst>
-            <pc:docMk/>
-            <pc:sldMk cId="19262974" sldId="280"/>
-            <ac:spMk id="22" creationId="{CF9B26AD-ECA8-4AA9-D781-160187B84C62}"/>
-          </ac:spMkLst>
-        </pc:spChg>
-        <pc:grpChg chg="del">
-          <ac:chgData name="Julia Moeller" userId="0bcb1583-c1a4-48b5-87e6-2cc074d2d571" providerId="ADAL" clId="{C92DF3DE-23A5-4E98-85FA-AAD4EAE96412}" dt="2023-09-14T11:52:30.095" v="5673" actId="478"/>
-          <ac:grpSpMkLst>
-            <pc:docMk/>
-            <pc:sldMk cId="19262974" sldId="280"/>
-            <ac:grpSpMk id="7" creationId="{00000000-0000-0000-0000-000000000000}"/>
-          </ac:grpSpMkLst>
-        </pc:grpChg>
-        <pc:grpChg chg="add mod">
-          <ac:chgData name="Julia Moeller" userId="0bcb1583-c1a4-48b5-87e6-2cc074d2d571" providerId="ADAL" clId="{C92DF3DE-23A5-4E98-85FA-AAD4EAE96412}" dt="2023-09-14T11:58:58.149" v="5772" actId="164"/>
-          <ac:grpSpMkLst>
-            <pc:docMk/>
-            <pc:sldMk cId="19262974" sldId="280"/>
-            <ac:grpSpMk id="21" creationId="{B8907E9D-6C6B-97AD-E823-5F945BFFF9D9}"/>
-          </ac:grpSpMkLst>
-        </pc:grpChg>
-        <pc:picChg chg="add del mod">
-          <ac:chgData name="Julia Moeller" userId="0bcb1583-c1a4-48b5-87e6-2cc074d2d571" providerId="ADAL" clId="{C92DF3DE-23A5-4E98-85FA-AAD4EAE96412}" dt="2023-09-14T11:52:58.797" v="5684" actId="478"/>
-          <ac:picMkLst>
-            <pc:docMk/>
-            <pc:sldMk cId="19262974" sldId="280"/>
-            <ac:picMk id="4" creationId="{F6F84B6F-26B6-4365-814A-DEBCEBE7E772}"/>
-          </ac:picMkLst>
-        </pc:picChg>
-        <pc:picChg chg="add mod">
-          <ac:chgData name="Julia Moeller" userId="0bcb1583-c1a4-48b5-87e6-2cc074d2d571" providerId="ADAL" clId="{C92DF3DE-23A5-4E98-85FA-AAD4EAE96412}" dt="2023-09-14T11:58:58.149" v="5772" actId="164"/>
-          <ac:picMkLst>
-            <pc:docMk/>
-            <pc:sldMk cId="19262974" sldId="280"/>
-            <ac:picMk id="10" creationId="{EB1105E7-46B2-86AA-E1AF-6EA6103AB77E}"/>
-          </ac:picMkLst>
-        </pc:picChg>
-        <pc:picChg chg="del">
-          <ac:chgData name="Julia Moeller" userId="0bcb1583-c1a4-48b5-87e6-2cc074d2d571" providerId="ADAL" clId="{C92DF3DE-23A5-4E98-85FA-AAD4EAE96412}" dt="2023-09-14T11:52:31.189" v="5674" actId="478"/>
-          <ac:picMkLst>
-            <pc:docMk/>
-            <pc:sldMk cId="19262974" sldId="280"/>
-            <ac:picMk id="12" creationId="{00000000-0000-0000-0000-000000000000}"/>
-          </ac:picMkLst>
-        </pc:picChg>
-        <pc:picChg chg="add mod">
-          <ac:chgData name="Julia Moeller" userId="0bcb1583-c1a4-48b5-87e6-2cc074d2d571" providerId="ADAL" clId="{C92DF3DE-23A5-4E98-85FA-AAD4EAE96412}" dt="2023-09-14T12:05:32.967" v="5775" actId="1076"/>
-          <ac:picMkLst>
-            <pc:docMk/>
-            <pc:sldMk cId="19262974" sldId="280"/>
-            <ac:picMk id="14" creationId="{6B77BD7F-14B9-095F-F0A5-3880FCF787DB}"/>
-          </ac:picMkLst>
-        </pc:picChg>
-        <pc:picChg chg="add mod">
-          <ac:chgData name="Julia Moeller" userId="0bcb1583-c1a4-48b5-87e6-2cc074d2d571" providerId="ADAL" clId="{C92DF3DE-23A5-4E98-85FA-AAD4EAE96412}" dt="2023-09-14T11:58:58.149" v="5772" actId="164"/>
-          <ac:picMkLst>
-            <pc:docMk/>
-            <pc:sldMk cId="19262974" sldId="280"/>
-            <ac:picMk id="20" creationId="{E88B80C4-6094-61BC-9E40-F48A5DFE9F16}"/>
-          </ac:picMkLst>
-        </pc:picChg>
-        <pc:cxnChg chg="del">
-          <ac:chgData name="Julia Moeller" userId="0bcb1583-c1a4-48b5-87e6-2cc074d2d571" providerId="ADAL" clId="{C92DF3DE-23A5-4E98-85FA-AAD4EAE96412}" dt="2023-09-14T11:52:38.376" v="5680" actId="478"/>
-          <ac:cxnSpMkLst>
-            <pc:docMk/>
-            <pc:sldMk cId="19262974" sldId="280"/>
-            <ac:cxnSpMk id="9" creationId="{00000000-0000-0000-0000-000000000000}"/>
-          </ac:cxnSpMkLst>
-        </pc:cxnChg>
-        <pc:cxnChg chg="del">
-          <ac:chgData name="Julia Moeller" userId="0bcb1583-c1a4-48b5-87e6-2cc074d2d571" providerId="ADAL" clId="{C92DF3DE-23A5-4E98-85FA-AAD4EAE96412}" dt="2023-09-14T11:52:33.563" v="5676" actId="478"/>
-          <ac:cxnSpMkLst>
-            <pc:docMk/>
-            <pc:sldMk cId="19262974" sldId="280"/>
-            <ac:cxnSpMk id="16" creationId="{00000000-0000-0000-0000-000000000000}"/>
-          </ac:cxnSpMkLst>
-        </pc:cxnChg>
-        <pc:extLst>
-          <p:ext xmlns:p="http://schemas.openxmlformats.org/presentationml/2006/main" uri="{D6D511B9-2390-475A-947B-AFAB55BFBCF1}">
-            <pc226:cmChg xmlns:pc226="http://schemas.microsoft.com/office/powerpoint/2022/06/main/command" chg="mod">
-              <pc226:chgData name="Julia Moeller" userId="0bcb1583-c1a4-48b5-87e6-2cc074d2d571" providerId="ADAL" clId="{C92DF3DE-23A5-4E98-85FA-AAD4EAE96412}" dt="2023-09-14T19:11:58.032" v="8130"/>
-              <pc2:cmMkLst xmlns:pc2="http://schemas.microsoft.com/office/powerpoint/2019/9/main/command">
-                <pc:docMk/>
-                <pc:sldMk cId="19262974" sldId="280"/>
-                <pc2:cmMk id="{37C25776-C255-4177-851B-CA5F855E209E}"/>
-              </pc2:cmMkLst>
-            </pc226:cmChg>
-          </p:ext>
-        </pc:extLst>
-      </pc:sldChg>
-      <pc:sldChg chg="modSp mod">
-        <pc:chgData name="Julia Moeller" userId="0bcb1583-c1a4-48b5-87e6-2cc074d2d571" providerId="ADAL" clId="{C92DF3DE-23A5-4E98-85FA-AAD4EAE96412}" dt="2023-09-29T13:45:17.342" v="11474" actId="207"/>
-        <pc:sldMkLst>
-          <pc:docMk/>
-          <pc:sldMk cId="2079531476" sldId="281"/>
-        </pc:sldMkLst>
-        <pc:spChg chg="mod">
-          <ac:chgData name="Julia Moeller" userId="0bcb1583-c1a4-48b5-87e6-2cc074d2d571" providerId="ADAL" clId="{C92DF3DE-23A5-4E98-85FA-AAD4EAE96412}" dt="2023-09-14T13:17:09.807" v="6110" actId="20577"/>
-          <ac:spMkLst>
-            <pc:docMk/>
-            <pc:sldMk cId="2079531476" sldId="281"/>
-            <ac:spMk id="2" creationId="{00000000-0000-0000-0000-000000000000}"/>
-          </ac:spMkLst>
-        </pc:spChg>
-        <pc:spChg chg="mod">
-          <ac:chgData name="Julia Moeller" userId="0bcb1583-c1a4-48b5-87e6-2cc074d2d571" providerId="ADAL" clId="{C92DF3DE-23A5-4E98-85FA-AAD4EAE96412}" dt="2023-09-29T13:45:17.342" v="11474" actId="207"/>
-          <ac:spMkLst>
-            <pc:docMk/>
-            <pc:sldMk cId="2079531476" sldId="281"/>
-            <ac:spMk id="3" creationId="{00000000-0000-0000-0000-000000000000}"/>
-          </ac:spMkLst>
-        </pc:spChg>
-      </pc:sldChg>
-      <pc:sldChg chg="addSp delSp modSp mod modCm">
-        <pc:chgData name="Julia Moeller" userId="0bcb1583-c1a4-48b5-87e6-2cc074d2d571" providerId="ADAL" clId="{C92DF3DE-23A5-4E98-85FA-AAD4EAE96412}" dt="2023-09-14T19:11:51.576" v="8129"/>
-        <pc:sldMkLst>
-          <pc:docMk/>
-          <pc:sldMk cId="2337627130" sldId="282"/>
-        </pc:sldMkLst>
-        <pc:spChg chg="mod">
-          <ac:chgData name="Julia Moeller" userId="0bcb1583-c1a4-48b5-87e6-2cc074d2d571" providerId="ADAL" clId="{C92DF3DE-23A5-4E98-85FA-AAD4EAE96412}" dt="2023-09-14T13:22:57.683" v="6419" actId="20577"/>
-          <ac:spMkLst>
-            <pc:docMk/>
-            <pc:sldMk cId="2337627130" sldId="282"/>
-            <ac:spMk id="2" creationId="{00000000-0000-0000-0000-000000000000}"/>
-          </ac:spMkLst>
-        </pc:spChg>
-        <pc:spChg chg="add mod">
-          <ac:chgData name="Julia Moeller" userId="0bcb1583-c1a4-48b5-87e6-2cc074d2d571" providerId="ADAL" clId="{C92DF3DE-23A5-4E98-85FA-AAD4EAE96412}" dt="2023-09-14T18:56:56.193" v="7718" actId="179"/>
-          <ac:spMkLst>
-            <pc:docMk/>
-            <pc:sldMk cId="2337627130" sldId="282"/>
-            <ac:spMk id="4" creationId="{7F52414C-28D4-C7DD-E2FB-48994F99345C}"/>
-          </ac:spMkLst>
-        </pc:spChg>
-        <pc:spChg chg="del">
-          <ac:chgData name="Julia Moeller" userId="0bcb1583-c1a4-48b5-87e6-2cc074d2d571" providerId="ADAL" clId="{C92DF3DE-23A5-4E98-85FA-AAD4EAE96412}" dt="2023-09-14T13:28:56.667" v="6440" actId="478"/>
-          <ac:spMkLst>
-            <pc:docMk/>
-            <pc:sldMk cId="2337627130" sldId="282"/>
-            <ac:spMk id="21" creationId="{00000000-0000-0000-0000-000000000000}"/>
-          </ac:spMkLst>
-        </pc:spChg>
-        <pc:spChg chg="del mod">
-          <ac:chgData name="Julia Moeller" userId="0bcb1583-c1a4-48b5-87e6-2cc074d2d571" providerId="ADAL" clId="{C92DF3DE-23A5-4E98-85FA-AAD4EAE96412}" dt="2023-09-14T13:28:58.496" v="6442" actId="478"/>
-          <ac:spMkLst>
-            <pc:docMk/>
-            <pc:sldMk cId="2337627130" sldId="282"/>
-            <ac:spMk id="27" creationId="{00000000-0000-0000-0000-000000000000}"/>
-          </ac:spMkLst>
-        </pc:spChg>
-        <pc:spChg chg="del mod">
-          <ac:chgData name="Julia Moeller" userId="0bcb1583-c1a4-48b5-87e6-2cc074d2d571" providerId="ADAL" clId="{C92DF3DE-23A5-4E98-85FA-AAD4EAE96412}" dt="2023-09-14T14:18:39.978" v="6955" actId="478"/>
-          <ac:spMkLst>
-            <pc:docMk/>
-            <pc:sldMk cId="2337627130" sldId="282"/>
-            <ac:spMk id="28" creationId="{00000000-0000-0000-0000-000000000000}"/>
-          </ac:spMkLst>
-        </pc:spChg>
-        <pc:grpChg chg="del">
-          <ac:chgData name="Julia Moeller" userId="0bcb1583-c1a4-48b5-87e6-2cc074d2d571" providerId="ADAL" clId="{C92DF3DE-23A5-4E98-85FA-AAD4EAE96412}" dt="2023-09-14T13:28:58.897" v="6443" actId="478"/>
-          <ac:grpSpMkLst>
-            <pc:docMk/>
-            <pc:sldMk cId="2337627130" sldId="282"/>
-            <ac:grpSpMk id="19" creationId="{00000000-0000-0000-0000-000000000000}"/>
-          </ac:grpSpMkLst>
-        </pc:grpChg>
-        <pc:grpChg chg="del">
-          <ac:chgData name="Julia Moeller" userId="0bcb1583-c1a4-48b5-87e6-2cc074d2d571" providerId="ADAL" clId="{C92DF3DE-23A5-4E98-85FA-AAD4EAE96412}" dt="2023-09-14T13:28:53.402" v="6437" actId="478"/>
-          <ac:grpSpMkLst>
-            <pc:docMk/>
-            <pc:sldMk cId="2337627130" sldId="282"/>
-            <ac:grpSpMk id="25" creationId="{00000000-0000-0000-0000-000000000000}"/>
-          </ac:grpSpMkLst>
-        </pc:grpChg>
-        <pc:picChg chg="add mod">
-          <ac:chgData name="Julia Moeller" userId="0bcb1583-c1a4-48b5-87e6-2cc074d2d571" providerId="ADAL" clId="{C92DF3DE-23A5-4E98-85FA-AAD4EAE96412}" dt="2023-09-14T14:19:31.996" v="6964" actId="1076"/>
-          <ac:picMkLst>
-            <pc:docMk/>
-            <pc:sldMk cId="2337627130" sldId="282"/>
-            <ac:picMk id="22" creationId="{620EA41D-BAF3-D8A7-273D-04BEEDE2B998}"/>
-          </ac:picMkLst>
-        </pc:picChg>
-        <pc:cxnChg chg="del">
-          <ac:chgData name="Julia Moeller" userId="0bcb1583-c1a4-48b5-87e6-2cc074d2d571" providerId="ADAL" clId="{C92DF3DE-23A5-4E98-85FA-AAD4EAE96412}" dt="2023-09-14T13:28:57.273" v="6441" actId="478"/>
-          <ac:cxnSpMkLst>
-            <pc:docMk/>
-            <pc:sldMk cId="2337627130" sldId="282"/>
-            <ac:cxnSpMk id="20" creationId="{00000000-0000-0000-0000-000000000000}"/>
-          </ac:cxnSpMkLst>
-        </pc:cxnChg>
-        <pc:cxnChg chg="del">
-          <ac:chgData name="Julia Moeller" userId="0bcb1583-c1a4-48b5-87e6-2cc074d2d571" providerId="ADAL" clId="{C92DF3DE-23A5-4E98-85FA-AAD4EAE96412}" dt="2023-09-14T13:28:54.203" v="6438" actId="478"/>
-          <ac:cxnSpMkLst>
-            <pc:docMk/>
-            <pc:sldMk cId="2337627130" sldId="282"/>
-            <ac:cxnSpMk id="26" creationId="{00000000-0000-0000-0000-000000000000}"/>
-          </ac:cxnSpMkLst>
-        </pc:cxnChg>
-        <pc:extLst>
-          <p:ext xmlns:p="http://schemas.openxmlformats.org/presentationml/2006/main" uri="{D6D511B9-2390-475A-947B-AFAB55BFBCF1}">
-            <pc226:cmChg xmlns:pc226="http://schemas.microsoft.com/office/powerpoint/2022/06/main/command" chg="mod">
-              <pc226:chgData name="Julia Moeller" userId="0bcb1583-c1a4-48b5-87e6-2cc074d2d571" providerId="ADAL" clId="{C92DF3DE-23A5-4E98-85FA-AAD4EAE96412}" dt="2023-09-14T19:11:51.576" v="8129"/>
-              <pc2:cmMkLst xmlns:pc2="http://schemas.microsoft.com/office/powerpoint/2019/9/main/command">
-                <pc:docMk/>
-                <pc:sldMk cId="2337627130" sldId="282"/>
-                <pc2:cmMk id="{C3AAB715-EDAF-4778-8F83-86F660542CD3}"/>
-              </pc2:cmMkLst>
-            </pc226:cmChg>
-          </p:ext>
-        </pc:extLst>
-      </pc:sldChg>
-      <pc:sldChg chg="del">
-        <pc:chgData name="Julia Moeller" userId="0bcb1583-c1a4-48b5-87e6-2cc074d2d571" providerId="ADAL" clId="{C92DF3DE-23A5-4E98-85FA-AAD4EAE96412}" dt="2023-09-14T19:06:58.192" v="8116" actId="2696"/>
-        <pc:sldMkLst>
-          <pc:docMk/>
-          <pc:sldMk cId="3242522514" sldId="283"/>
-        </pc:sldMkLst>
-      </pc:sldChg>
-      <pc:sldChg chg="addSp modSp mod modCm">
-        <pc:chgData name="Julia Moeller" userId="0bcb1583-c1a4-48b5-87e6-2cc074d2d571" providerId="ADAL" clId="{C92DF3DE-23A5-4E98-85FA-AAD4EAE96412}" dt="2023-09-15T09:34:27.734" v="8256" actId="5793"/>
-        <pc:sldMkLst>
-          <pc:docMk/>
-          <pc:sldMk cId="3020063510" sldId="284"/>
-        </pc:sldMkLst>
-        <pc:spChg chg="mod">
-          <ac:chgData name="Julia Moeller" userId="0bcb1583-c1a4-48b5-87e6-2cc074d2d571" providerId="ADAL" clId="{C92DF3DE-23A5-4E98-85FA-AAD4EAE96412}" dt="2023-09-14T18:40:56.560" v="7686" actId="20577"/>
-          <ac:spMkLst>
-            <pc:docMk/>
-            <pc:sldMk cId="3020063510" sldId="284"/>
-            <ac:spMk id="2" creationId="{00000000-0000-0000-0000-000000000000}"/>
-          </ac:spMkLst>
-        </pc:spChg>
-        <pc:spChg chg="mod">
-          <ac:chgData name="Julia Moeller" userId="0bcb1583-c1a4-48b5-87e6-2cc074d2d571" providerId="ADAL" clId="{C92DF3DE-23A5-4E98-85FA-AAD4EAE96412}" dt="2023-09-14T19:07:26.099" v="8123" actId="1076"/>
-          <ac:spMkLst>
-            <pc:docMk/>
-            <pc:sldMk cId="3020063510" sldId="284"/>
-            <ac:spMk id="3" creationId="{00000000-0000-0000-0000-000000000000}"/>
-          </ac:spMkLst>
-        </pc:spChg>
-        <pc:spChg chg="mod">
-          <ac:chgData name="Julia Moeller" userId="0bcb1583-c1a4-48b5-87e6-2cc074d2d571" providerId="ADAL" clId="{C92DF3DE-23A5-4E98-85FA-AAD4EAE96412}" dt="2023-09-14T19:07:28.787" v="8124" actId="1076"/>
-          <ac:spMkLst>
-            <pc:docMk/>
-            <pc:sldMk cId="3020063510" sldId="284"/>
-            <ac:spMk id="5" creationId="{00000000-0000-0000-0000-000000000000}"/>
-          </ac:spMkLst>
-        </pc:spChg>
-        <pc:spChg chg="mod">
-          <ac:chgData name="Julia Moeller" userId="0bcb1583-c1a4-48b5-87e6-2cc074d2d571" providerId="ADAL" clId="{C92DF3DE-23A5-4E98-85FA-AAD4EAE96412}" dt="2023-09-15T09:34:27.734" v="8256" actId="5793"/>
-          <ac:spMkLst>
-            <pc:docMk/>
-            <pc:sldMk cId="3020063510" sldId="284"/>
-            <ac:spMk id="6" creationId="{00000000-0000-0000-0000-000000000000}"/>
-          </ac:spMkLst>
-        </pc:spChg>
-        <pc:spChg chg="add mod">
-          <ac:chgData name="Julia Moeller" userId="0bcb1583-c1a4-48b5-87e6-2cc074d2d571" providerId="ADAL" clId="{C92DF3DE-23A5-4E98-85FA-AAD4EAE96412}" dt="2023-09-15T08:46:12.386" v="8213" actId="164"/>
-          <ac:spMkLst>
-            <pc:docMk/>
-            <pc:sldMk cId="3020063510" sldId="284"/>
-            <ac:spMk id="8" creationId="{78E52C07-3BBE-2E55-E28C-8B020490C4AF}"/>
-          </ac:spMkLst>
-        </pc:spChg>
-        <pc:spChg chg="add mod">
-          <ac:chgData name="Julia Moeller" userId="0bcb1583-c1a4-48b5-87e6-2cc074d2d571" providerId="ADAL" clId="{C92DF3DE-23A5-4E98-85FA-AAD4EAE96412}" dt="2023-09-15T08:46:12.386" v="8213" actId="164"/>
-          <ac:spMkLst>
-            <pc:docMk/>
-            <pc:sldMk cId="3020063510" sldId="284"/>
-            <ac:spMk id="9" creationId="{C65CC9E0-0433-710D-7487-B5DEEE816C10}"/>
-          </ac:spMkLst>
-        </pc:spChg>
-        <pc:grpChg chg="add mod">
-          <ac:chgData name="Julia Moeller" userId="0bcb1583-c1a4-48b5-87e6-2cc074d2d571" providerId="ADAL" clId="{C92DF3DE-23A5-4E98-85FA-AAD4EAE96412}" dt="2023-09-15T08:46:12.386" v="8213" actId="164"/>
-          <ac:grpSpMkLst>
-            <pc:docMk/>
-            <pc:sldMk cId="3020063510" sldId="284"/>
-            <ac:grpSpMk id="10" creationId="{5C490CEE-7ADC-B70D-F23C-CFB2E3E65625}"/>
-          </ac:grpSpMkLst>
-        </pc:grpChg>
-        <pc:picChg chg="add mod">
-          <ac:chgData name="Julia Moeller" userId="0bcb1583-c1a4-48b5-87e6-2cc074d2d571" providerId="ADAL" clId="{C92DF3DE-23A5-4E98-85FA-AAD4EAE96412}" dt="2023-09-15T08:46:12.386" v="8213" actId="164"/>
-          <ac:picMkLst>
-            <pc:docMk/>
-            <pc:sldMk cId="3020063510" sldId="284"/>
-            <ac:picMk id="7" creationId="{8B729581-F02A-3462-793C-3090B37F8B7E}"/>
-          </ac:picMkLst>
-        </pc:picChg>
-        <pc:extLst>
-          <p:ext xmlns:p="http://schemas.openxmlformats.org/presentationml/2006/main" uri="{D6D511B9-2390-475A-947B-AFAB55BFBCF1}">
-            <pc226:cmChg xmlns:pc226="http://schemas.microsoft.com/office/powerpoint/2022/06/main/command" chg="mod">
-              <pc226:chgData name="Julia Moeller" userId="0bcb1583-c1a4-48b5-87e6-2cc074d2d571" providerId="ADAL" clId="{C92DF3DE-23A5-4E98-85FA-AAD4EAE96412}" dt="2023-09-14T19:11:46.557" v="8128"/>
-              <pc2:cmMkLst xmlns:pc2="http://schemas.microsoft.com/office/powerpoint/2019/9/main/command">
-                <pc:docMk/>
-                <pc:sldMk cId="3020063510" sldId="284"/>
-                <pc2:cmMk id="{69792041-B9AB-48B4-8FB6-52B98A442779}"/>
-              </pc2:cmMkLst>
-            </pc226:cmChg>
-          </p:ext>
-        </pc:extLst>
-      </pc:sldChg>
-      <pc:sldChg chg="modSp mod modCm">
-        <pc:chgData name="Julia Moeller" userId="0bcb1583-c1a4-48b5-87e6-2cc074d2d571" providerId="ADAL" clId="{C92DF3DE-23A5-4E98-85FA-AAD4EAE96412}" dt="2023-09-15T13:44:26.771" v="11356"/>
-        <pc:sldMkLst>
-          <pc:docMk/>
-          <pc:sldMk cId="3795354128" sldId="285"/>
-        </pc:sldMkLst>
-        <pc:spChg chg="mod">
-          <ac:chgData name="Julia Moeller" userId="0bcb1583-c1a4-48b5-87e6-2cc074d2d571" providerId="ADAL" clId="{C92DF3DE-23A5-4E98-85FA-AAD4EAE96412}" dt="2023-09-15T09:33:09.602" v="8231" actId="20577"/>
-          <ac:spMkLst>
-            <pc:docMk/>
-            <pc:sldMk cId="3795354128" sldId="285"/>
-            <ac:spMk id="2" creationId="{00000000-0000-0000-0000-000000000000}"/>
-          </ac:spMkLst>
-        </pc:spChg>
-        <pc:spChg chg="mod">
-          <ac:chgData name="Julia Moeller" userId="0bcb1583-c1a4-48b5-87e6-2cc074d2d571" providerId="ADAL" clId="{C92DF3DE-23A5-4E98-85FA-AAD4EAE96412}" dt="2023-09-15T09:32:54.648" v="8229" actId="255"/>
-          <ac:spMkLst>
-            <pc:docMk/>
-            <pc:sldMk cId="3795354128" sldId="285"/>
-            <ac:spMk id="6" creationId="{00000000-0000-0000-0000-000000000000}"/>
-          </ac:spMkLst>
-        </pc:spChg>
-        <pc:picChg chg="mod">
-          <ac:chgData name="Julia Moeller" userId="0bcb1583-c1a4-48b5-87e6-2cc074d2d571" providerId="ADAL" clId="{C92DF3DE-23A5-4E98-85FA-AAD4EAE96412}" dt="2023-09-15T09:32:59.118" v="8230" actId="1076"/>
-          <ac:picMkLst>
-            <pc:docMk/>
-            <pc:sldMk cId="3795354128" sldId="285"/>
-            <ac:picMk id="5" creationId="{00000000-0000-0000-0000-000000000000}"/>
-          </ac:picMkLst>
-        </pc:picChg>
-        <pc:extLst>
-          <p:ext xmlns:p="http://schemas.openxmlformats.org/presentationml/2006/main" uri="{D6D511B9-2390-475A-947B-AFAB55BFBCF1}">
-            <pc226:cmChg xmlns:pc226="http://schemas.microsoft.com/office/powerpoint/2022/06/main/command" chg="mod">
-              <pc226:chgData name="Julia Moeller" userId="0bcb1583-c1a4-48b5-87e6-2cc074d2d571" providerId="ADAL" clId="{C92DF3DE-23A5-4E98-85FA-AAD4EAE96412}" dt="2023-09-15T13:44:26.771" v="11356"/>
-              <pc2:cmMkLst xmlns:pc2="http://schemas.microsoft.com/office/powerpoint/2019/9/main/command">
-                <pc:docMk/>
-                <pc:sldMk cId="3795354128" sldId="285"/>
-                <pc2:cmMk id="{9DAB4B43-7FAA-419A-A3F3-6ABA2D6DBA13}"/>
-              </pc2:cmMkLst>
-            </pc226:cmChg>
-          </p:ext>
-        </pc:extLst>
-      </pc:sldChg>
-      <pc:sldChg chg="addSp delSp modSp mod modCm">
-        <pc:chgData name="Julia Moeller" userId="0bcb1583-c1a4-48b5-87e6-2cc074d2d571" providerId="ADAL" clId="{C92DF3DE-23A5-4E98-85FA-AAD4EAE96412}" dt="2023-09-15T14:33:58.003" v="11384" actId="14100"/>
-        <pc:sldMkLst>
-          <pc:docMk/>
-          <pc:sldMk cId="1290840729" sldId="286"/>
-        </pc:sldMkLst>
-        <pc:spChg chg="mod">
-          <ac:chgData name="Julia Moeller" userId="0bcb1583-c1a4-48b5-87e6-2cc074d2d571" providerId="ADAL" clId="{C92DF3DE-23A5-4E98-85FA-AAD4EAE96412}" dt="2023-09-15T09:34:56.629" v="8263" actId="20577"/>
-          <ac:spMkLst>
-            <pc:docMk/>
-            <pc:sldMk cId="1290840729" sldId="286"/>
-            <ac:spMk id="2" creationId="{00000000-0000-0000-0000-000000000000}"/>
-          </ac:spMkLst>
-        </pc:spChg>
-        <pc:spChg chg="mod">
-          <ac:chgData name="Julia Moeller" userId="0bcb1583-c1a4-48b5-87e6-2cc074d2d571" providerId="ADAL" clId="{C92DF3DE-23A5-4E98-85FA-AAD4EAE96412}" dt="2023-09-15T09:55:58.212" v="8427" actId="20577"/>
-          <ac:spMkLst>
-            <pc:docMk/>
-            <pc:sldMk cId="1290840729" sldId="286"/>
-            <ac:spMk id="3" creationId="{00000000-0000-0000-0000-000000000000}"/>
-          </ac:spMkLst>
-        </pc:spChg>
-        <pc:spChg chg="add del mod">
-          <ac:chgData name="Julia Moeller" userId="0bcb1583-c1a4-48b5-87e6-2cc074d2d571" providerId="ADAL" clId="{C92DF3DE-23A5-4E98-85FA-AAD4EAE96412}" dt="2023-09-15T09:34:53.568" v="8258"/>
-          <ac:spMkLst>
-            <pc:docMk/>
-            <pc:sldMk cId="1290840729" sldId="286"/>
-            <ac:spMk id="4" creationId="{B48BFB00-3D79-472B-1C0F-5D8F3DB31E8D}"/>
-          </ac:spMkLst>
-        </pc:spChg>
-        <pc:spChg chg="add mod">
-          <ac:chgData name="Julia Moeller" userId="0bcb1583-c1a4-48b5-87e6-2cc074d2d571" providerId="ADAL" clId="{C92DF3DE-23A5-4E98-85FA-AAD4EAE96412}" dt="2023-09-15T14:33:58.003" v="11384" actId="14100"/>
-          <ac:spMkLst>
-            <pc:docMk/>
-            <pc:sldMk cId="1290840729" sldId="286"/>
-            <ac:spMk id="5" creationId="{63224A5B-C22F-7DC8-E266-D000F273ED0F}"/>
-          </ac:spMkLst>
-        </pc:spChg>
-        <pc:spChg chg="add mod">
-          <ac:chgData name="Julia Moeller" userId="0bcb1583-c1a4-48b5-87e6-2cc074d2d571" providerId="ADAL" clId="{C92DF3DE-23A5-4E98-85FA-AAD4EAE96412}" dt="2023-09-15T09:55:49.757" v="8422" actId="1076"/>
-          <ac:spMkLst>
-            <pc:docMk/>
-            <pc:sldMk cId="1290840729" sldId="286"/>
-            <ac:spMk id="6" creationId="{31ACCFE6-2A85-B855-202E-AF7A3F66F88E}"/>
-          </ac:spMkLst>
-        </pc:spChg>
-        <pc:extLst>
-          <p:ext xmlns:p="http://schemas.openxmlformats.org/presentationml/2006/main" uri="{D6D511B9-2390-475A-947B-AFAB55BFBCF1}">
-            <pc226:cmChg xmlns:pc226="http://schemas.microsoft.com/office/powerpoint/2022/06/main/command" chg="mod">
-              <pc226:chgData name="Julia Moeller" userId="0bcb1583-c1a4-48b5-87e6-2cc074d2d571" providerId="ADAL" clId="{C92DF3DE-23A5-4E98-85FA-AAD4EAE96412}" dt="2023-09-15T13:44:31.448" v="11357"/>
-              <pc2:cmMkLst xmlns:pc2="http://schemas.microsoft.com/office/powerpoint/2019/9/main/command">
-                <pc:docMk/>
-                <pc:sldMk cId="1290840729" sldId="286"/>
-                <pc2:cmMk id="{54880600-711A-4442-95A8-36512A1CCB2A}"/>
-              </pc2:cmMkLst>
-            </pc226:cmChg>
-          </p:ext>
-        </pc:extLst>
-      </pc:sldChg>
-      <pc:sldChg chg="modSp mod modCm">
-        <pc:chgData name="Julia Moeller" userId="0bcb1583-c1a4-48b5-87e6-2cc074d2d571" providerId="ADAL" clId="{C92DF3DE-23A5-4E98-85FA-AAD4EAE96412}" dt="2023-09-29T13:48:23.886" v="11487" actId="20577"/>
-        <pc:sldMkLst>
-          <pc:docMk/>
-          <pc:sldMk cId="523345763" sldId="287"/>
-        </pc:sldMkLst>
-        <pc:spChg chg="mod">
-          <ac:chgData name="Julia Moeller" userId="0bcb1583-c1a4-48b5-87e6-2cc074d2d571" providerId="ADAL" clId="{C92DF3DE-23A5-4E98-85FA-AAD4EAE96412}" dt="2023-09-15T10:12:30.870" v="8430" actId="20577"/>
-          <ac:spMkLst>
-            <pc:docMk/>
-            <pc:sldMk cId="523345763" sldId="287"/>
-            <ac:spMk id="2" creationId="{00000000-0000-0000-0000-000000000000}"/>
-          </ac:spMkLst>
-        </pc:spChg>
-        <pc:spChg chg="mod">
-          <ac:chgData name="Julia Moeller" userId="0bcb1583-c1a4-48b5-87e6-2cc074d2d571" providerId="ADAL" clId="{C92DF3DE-23A5-4E98-85FA-AAD4EAE96412}" dt="2023-09-29T13:48:23.886" v="11487" actId="20577"/>
-          <ac:spMkLst>
-            <pc:docMk/>
-            <pc:sldMk cId="523345763" sldId="287"/>
-            <ac:spMk id="3" creationId="{00000000-0000-0000-0000-000000000000}"/>
-          </ac:spMkLst>
-        </pc:spChg>
-        <pc:extLst>
-          <p:ext xmlns:p="http://schemas.openxmlformats.org/presentationml/2006/main" uri="{D6D511B9-2390-475A-947B-AFAB55BFBCF1}">
-            <pc226:cmChg xmlns:pc226="http://schemas.microsoft.com/office/powerpoint/2022/06/main/command" chg="mod">
-              <pc226:chgData name="Julia Moeller" userId="0bcb1583-c1a4-48b5-87e6-2cc074d2d571" providerId="ADAL" clId="{C92DF3DE-23A5-4E98-85FA-AAD4EAE96412}" dt="2023-09-15T13:44:36.983" v="11358"/>
-              <pc2:cmMkLst xmlns:pc2="http://schemas.microsoft.com/office/powerpoint/2019/9/main/command">
-                <pc:docMk/>
-                <pc:sldMk cId="523345763" sldId="287"/>
-                <pc2:cmMk id="{DBFE4B17-8D19-40C7-AAC2-A1561DD83DA9}"/>
-              </pc2:cmMkLst>
-            </pc226:cmChg>
-            <pc226:cmChg xmlns:pc226="http://schemas.microsoft.com/office/powerpoint/2022/06/main/command" chg="mod">
-              <pc226:chgData name="Julia Moeller" userId="0bcb1583-c1a4-48b5-87e6-2cc074d2d571" providerId="ADAL" clId="{C92DF3DE-23A5-4E98-85FA-AAD4EAE96412}" dt="2023-09-15T13:44:39.120" v="11359"/>
-              <pc2:cmMkLst xmlns:pc2="http://schemas.microsoft.com/office/powerpoint/2019/9/main/command">
-                <pc:docMk/>
-                <pc:sldMk cId="523345763" sldId="287"/>
-                <pc2:cmMk id="{46864B90-C6A7-4102-986B-6509474622E8}"/>
-              </pc2:cmMkLst>
-            </pc226:cmChg>
-          </p:ext>
-        </pc:extLst>
-      </pc:sldChg>
-      <pc:sldChg chg="addSp delSp modSp mod modCm">
-        <pc:chgData name="Julia Moeller" userId="0bcb1583-c1a4-48b5-87e6-2cc074d2d571" providerId="ADAL" clId="{C92DF3DE-23A5-4E98-85FA-AAD4EAE96412}" dt="2023-09-15T13:44:48.173" v="11362"/>
-        <pc:sldMkLst>
-          <pc:docMk/>
-          <pc:sldMk cId="3876220526" sldId="288"/>
-        </pc:sldMkLst>
-        <pc:spChg chg="mod">
-          <ac:chgData name="Julia Moeller" userId="0bcb1583-c1a4-48b5-87e6-2cc074d2d571" providerId="ADAL" clId="{C92DF3DE-23A5-4E98-85FA-AAD4EAE96412}" dt="2023-09-15T11:26:51.645" v="9527" actId="20577"/>
-          <ac:spMkLst>
-            <pc:docMk/>
-            <pc:sldMk cId="3876220526" sldId="288"/>
-            <ac:spMk id="2" creationId="{00000000-0000-0000-0000-000000000000}"/>
-          </ac:spMkLst>
-        </pc:spChg>
-        <pc:spChg chg="mod">
-          <ac:chgData name="Julia Moeller" userId="0bcb1583-c1a4-48b5-87e6-2cc074d2d571" providerId="ADAL" clId="{C92DF3DE-23A5-4E98-85FA-AAD4EAE96412}" dt="2023-09-15T11:22:34.434" v="9444" actId="1076"/>
-          <ac:spMkLst>
-            <pc:docMk/>
-            <pc:sldMk cId="3876220526" sldId="288"/>
-            <ac:spMk id="7" creationId="{00000000-0000-0000-0000-000000000000}"/>
-          </ac:spMkLst>
-        </pc:spChg>
-        <pc:spChg chg="del mod">
-          <ac:chgData name="Julia Moeller" userId="0bcb1583-c1a4-48b5-87e6-2cc074d2d571" providerId="ADAL" clId="{C92DF3DE-23A5-4E98-85FA-AAD4EAE96412}" dt="2023-09-15T10:23:44.875" v="8573" actId="478"/>
-          <ac:spMkLst>
-            <pc:docMk/>
-            <pc:sldMk cId="3876220526" sldId="288"/>
-            <ac:spMk id="34" creationId="{00000000-0000-0000-0000-000000000000}"/>
-          </ac:spMkLst>
-        </pc:spChg>
-        <pc:picChg chg="add mod">
-          <ac:chgData name="Julia Moeller" userId="0bcb1583-c1a4-48b5-87e6-2cc074d2d571" providerId="ADAL" clId="{C92DF3DE-23A5-4E98-85FA-AAD4EAE96412}" dt="2023-09-15T11:22:36.741" v="9445" actId="1076"/>
-          <ac:picMkLst>
-            <pc:docMk/>
-            <pc:sldMk cId="3876220526" sldId="288"/>
-            <ac:picMk id="4" creationId="{7AFCB226-FC0B-C1E6-7424-ABDBB8C06CE6}"/>
-          </ac:picMkLst>
-        </pc:picChg>
-        <pc:picChg chg="del">
-          <ac:chgData name="Julia Moeller" userId="0bcb1583-c1a4-48b5-87e6-2cc074d2d571" providerId="ADAL" clId="{C92DF3DE-23A5-4E98-85FA-AAD4EAE96412}" dt="2023-09-15T10:22:38.782" v="8564" actId="478"/>
-          <ac:picMkLst>
-            <pc:docMk/>
-            <pc:sldMk cId="3876220526" sldId="288"/>
-            <ac:picMk id="5" creationId="{00000000-0000-0000-0000-000000000000}"/>
-          </ac:picMkLst>
-        </pc:picChg>
-        <pc:picChg chg="del">
-          <ac:chgData name="Julia Moeller" userId="0bcb1583-c1a4-48b5-87e6-2cc074d2d571" providerId="ADAL" clId="{C92DF3DE-23A5-4E98-85FA-AAD4EAE96412}" dt="2023-09-15T10:23:41.931" v="8570" actId="478"/>
-          <ac:picMkLst>
-            <pc:docMk/>
-            <pc:sldMk cId="3876220526" sldId="288"/>
-            <ac:picMk id="6" creationId="{00000000-0000-0000-0000-000000000000}"/>
-          </ac:picMkLst>
-        </pc:picChg>
-        <pc:cxnChg chg="del">
-          <ac:chgData name="Julia Moeller" userId="0bcb1583-c1a4-48b5-87e6-2cc074d2d571" providerId="ADAL" clId="{C92DF3DE-23A5-4E98-85FA-AAD4EAE96412}" dt="2023-09-15T10:23:43.271" v="8571" actId="478"/>
-          <ac:cxnSpMkLst>
-            <pc:docMk/>
-            <pc:sldMk cId="3876220526" sldId="288"/>
-            <ac:cxnSpMk id="28" creationId="{00000000-0000-0000-0000-000000000000}"/>
-          </ac:cxnSpMkLst>
-        </pc:cxnChg>
-        <pc:cxnChg chg="del">
-          <ac:chgData name="Julia Moeller" userId="0bcb1583-c1a4-48b5-87e6-2cc074d2d571" providerId="ADAL" clId="{C92DF3DE-23A5-4E98-85FA-AAD4EAE96412}" dt="2023-09-15T10:23:45.625" v="8574" actId="478"/>
-          <ac:cxnSpMkLst>
-            <pc:docMk/>
-            <pc:sldMk cId="3876220526" sldId="288"/>
-            <ac:cxnSpMk id="29" creationId="{00000000-0000-0000-0000-000000000000}"/>
-          </ac:cxnSpMkLst>
-        </pc:cxnChg>
-        <pc:extLst>
-          <p:ext xmlns:p="http://schemas.openxmlformats.org/presentationml/2006/main" uri="{D6D511B9-2390-475A-947B-AFAB55BFBCF1}">
-            <pc226:cmChg xmlns:pc226="http://schemas.microsoft.com/office/powerpoint/2022/06/main/command" chg="mod">
-              <pc226:chgData name="Julia Moeller" userId="0bcb1583-c1a4-48b5-87e6-2cc074d2d571" providerId="ADAL" clId="{C92DF3DE-23A5-4E98-85FA-AAD4EAE96412}" dt="2023-09-15T10:47:28.154" v="9134"/>
-              <pc2:cmMkLst xmlns:pc2="http://schemas.microsoft.com/office/powerpoint/2019/9/main/command">
-                <pc:docMk/>
-                <pc:sldMk cId="3876220526" sldId="288"/>
-                <pc2:cmMk id="{BFABE205-A235-4AD3-B321-DF0416A3DF7D}"/>
-              </pc2:cmMkLst>
-            </pc226:cmChg>
-            <pc226:cmChg xmlns:pc226="http://schemas.microsoft.com/office/powerpoint/2022/06/main/command" chg="mod">
-              <pc226:chgData name="Julia Moeller" userId="0bcb1583-c1a4-48b5-87e6-2cc074d2d571" providerId="ADAL" clId="{C92DF3DE-23A5-4E98-85FA-AAD4EAE96412}" dt="2023-09-15T13:44:43.619" v="11360"/>
-              <pc2:cmMkLst xmlns:pc2="http://schemas.microsoft.com/office/powerpoint/2019/9/main/command">
-                <pc:docMk/>
-                <pc:sldMk cId="3876220526" sldId="288"/>
-                <pc2:cmMk id="{0CC9603D-F818-4A69-95AF-592298C8A47E}"/>
-              </pc2:cmMkLst>
-            </pc226:cmChg>
-            <pc226:cmChg xmlns:pc226="http://schemas.microsoft.com/office/powerpoint/2022/06/main/command" chg="mod">
-              <pc226:chgData name="Julia Moeller" userId="0bcb1583-c1a4-48b5-87e6-2cc074d2d571" providerId="ADAL" clId="{C92DF3DE-23A5-4E98-85FA-AAD4EAE96412}" dt="2023-09-15T13:44:48.173" v="11362"/>
-              <pc2:cmMkLst xmlns:pc2="http://schemas.microsoft.com/office/powerpoint/2019/9/main/command">
-                <pc:docMk/>
-                <pc:sldMk cId="3876220526" sldId="288"/>
-                <pc2:cmMk id="{7C7B3B4B-97E8-4993-ADE1-91014A2C128B}"/>
-              </pc2:cmMkLst>
-            </pc226:cmChg>
-            <pc226:cmChg xmlns:pc226="http://schemas.microsoft.com/office/powerpoint/2022/06/main/command" chg="mod">
-              <pc226:chgData name="Julia Moeller" userId="0bcb1583-c1a4-48b5-87e6-2cc074d2d571" providerId="ADAL" clId="{C92DF3DE-23A5-4E98-85FA-AAD4EAE96412}" dt="2023-09-15T10:47:31.922" v="9135"/>
-              <pc2:cmMkLst xmlns:pc2="http://schemas.microsoft.com/office/powerpoint/2019/9/main/command">
-                <pc:docMk/>
-                <pc:sldMk cId="3876220526" sldId="288"/>
-                <pc2:cmMk id="{3F812B51-F373-466F-9150-04AFB3541FD4}"/>
-              </pc2:cmMkLst>
-            </pc226:cmChg>
-            <pc226:cmChg xmlns:pc226="http://schemas.microsoft.com/office/powerpoint/2022/06/main/command" chg="mod">
-              <pc226:chgData name="Julia Moeller" userId="0bcb1583-c1a4-48b5-87e6-2cc074d2d571" providerId="ADAL" clId="{C92DF3DE-23A5-4E98-85FA-AAD4EAE96412}" dt="2023-09-15T13:44:45.470" v="11361"/>
-              <pc2:cmMkLst xmlns:pc2="http://schemas.microsoft.com/office/powerpoint/2019/9/main/command">
-                <pc:docMk/>
-                <pc:sldMk cId="3876220526" sldId="288"/>
-                <pc2:cmMk id="{221E7B97-9418-4413-A077-50BA98B9A235}"/>
-              </pc2:cmMkLst>
-            </pc226:cmChg>
-          </p:ext>
-        </pc:extLst>
-      </pc:sldChg>
-      <pc:sldChg chg="del">
-        <pc:chgData name="Julia Moeller" userId="0bcb1583-c1a4-48b5-87e6-2cc074d2d571" providerId="ADAL" clId="{C92DF3DE-23A5-4E98-85FA-AAD4EAE96412}" dt="2023-09-15T12:27:23.305" v="10188" actId="2696"/>
-        <pc:sldMkLst>
-          <pc:docMk/>
-          <pc:sldMk cId="2896707261" sldId="289"/>
-        </pc:sldMkLst>
-      </pc:sldChg>
-      <pc:sldChg chg="modSp mod modCm">
-        <pc:chgData name="Julia Moeller" userId="0bcb1583-c1a4-48b5-87e6-2cc074d2d571" providerId="ADAL" clId="{C92DF3DE-23A5-4E98-85FA-AAD4EAE96412}" dt="2023-09-15T13:45:06.008" v="11366"/>
-        <pc:sldMkLst>
-          <pc:docMk/>
-          <pc:sldMk cId="181441456" sldId="290"/>
-        </pc:sldMkLst>
-        <pc:spChg chg="mod">
-          <ac:chgData name="Julia Moeller" userId="0bcb1583-c1a4-48b5-87e6-2cc074d2d571" providerId="ADAL" clId="{C92DF3DE-23A5-4E98-85FA-AAD4EAE96412}" dt="2023-09-15T13:31:27.475" v="10934"/>
-          <ac:spMkLst>
-            <pc:docMk/>
-            <pc:sldMk cId="181441456" sldId="290"/>
-            <ac:spMk id="3" creationId="{00000000-0000-0000-0000-000000000000}"/>
-          </ac:spMkLst>
-        </pc:spChg>
-        <pc:extLst>
-          <p:ext xmlns:p="http://schemas.openxmlformats.org/presentationml/2006/main" uri="{D6D511B9-2390-475A-947B-AFAB55BFBCF1}">
-            <pc226:cmChg xmlns:pc226="http://schemas.microsoft.com/office/powerpoint/2022/06/main/command" chg="mod">
-              <pc226:chgData name="Julia Moeller" userId="0bcb1583-c1a4-48b5-87e6-2cc074d2d571" providerId="ADAL" clId="{C92DF3DE-23A5-4E98-85FA-AAD4EAE96412}" dt="2023-09-15T13:45:02.615" v="11364"/>
-              <pc2:cmMkLst xmlns:pc2="http://schemas.microsoft.com/office/powerpoint/2019/9/main/command">
-                <pc:docMk/>
-                <pc:sldMk cId="181441456" sldId="290"/>
-                <pc2:cmMk id="{40253615-0626-43E6-95B5-C4592C6F1EDF}"/>
-              </pc2:cmMkLst>
-            </pc226:cmChg>
-            <pc226:cmChg xmlns:pc226="http://schemas.microsoft.com/office/powerpoint/2022/06/main/command" chg="mod">
-              <pc226:chgData name="Julia Moeller" userId="0bcb1583-c1a4-48b5-87e6-2cc074d2d571" providerId="ADAL" clId="{C92DF3DE-23A5-4E98-85FA-AAD4EAE96412}" dt="2023-09-15T13:45:06.008" v="11366"/>
-              <pc2:cmMkLst xmlns:pc2="http://schemas.microsoft.com/office/powerpoint/2019/9/main/command">
-                <pc:docMk/>
-                <pc:sldMk cId="181441456" sldId="290"/>
-                <pc2:cmMk id="{64F75594-4C3D-4E02-96D0-35C83D844EEB}"/>
-              </pc2:cmMkLst>
-            </pc226:cmChg>
-            <pc226:cmChg xmlns:pc226="http://schemas.microsoft.com/office/powerpoint/2022/06/main/command" chg="mod">
-              <pc226:chgData name="Julia Moeller" userId="0bcb1583-c1a4-48b5-87e6-2cc074d2d571" providerId="ADAL" clId="{C92DF3DE-23A5-4E98-85FA-AAD4EAE96412}" dt="2023-09-15T13:45:04.522" v="11365"/>
-              <pc2:cmMkLst xmlns:pc2="http://schemas.microsoft.com/office/powerpoint/2019/9/main/command">
-                <pc:docMk/>
-                <pc:sldMk cId="181441456" sldId="290"/>
-                <pc2:cmMk id="{61029DBB-C843-4DE9-A3B8-A5FC6BCF7E2E}"/>
-              </pc2:cmMkLst>
-            </pc226:cmChg>
-          </p:ext>
-        </pc:extLst>
-      </pc:sldChg>
-      <pc:sldChg chg="addSp delSp modSp mod modCm">
-        <pc:chgData name="Julia Moeller" userId="0bcb1583-c1a4-48b5-87e6-2cc074d2d571" providerId="ADAL" clId="{C92DF3DE-23A5-4E98-85FA-AAD4EAE96412}" dt="2023-09-15T13:45:17.020" v="11368"/>
-        <pc:sldMkLst>
-          <pc:docMk/>
-          <pc:sldMk cId="901500868" sldId="291"/>
-        </pc:sldMkLst>
-        <pc:spChg chg="mod">
-          <ac:chgData name="Julia Moeller" userId="0bcb1583-c1a4-48b5-87e6-2cc074d2d571" providerId="ADAL" clId="{C92DF3DE-23A5-4E98-85FA-AAD4EAE96412}" dt="2023-09-15T13:30:55.814" v="10929" actId="20577"/>
-          <ac:spMkLst>
-            <pc:docMk/>
-            <pc:sldMk cId="901500868" sldId="291"/>
-            <ac:spMk id="3" creationId="{00000000-0000-0000-0000-000000000000}"/>
-          </ac:spMkLst>
-        </pc:spChg>
-        <pc:spChg chg="del mod">
-          <ac:chgData name="Julia Moeller" userId="0bcb1583-c1a4-48b5-87e6-2cc074d2d571" providerId="ADAL" clId="{C92DF3DE-23A5-4E98-85FA-AAD4EAE96412}" dt="2023-09-15T13:05:39.357" v="10309" actId="478"/>
-          <ac:spMkLst>
-            <pc:docMk/>
-            <pc:sldMk cId="901500868" sldId="291"/>
-            <ac:spMk id="6" creationId="{00000000-0000-0000-0000-000000000000}"/>
-          </ac:spMkLst>
-        </pc:spChg>
-        <pc:spChg chg="add mod">
-          <ac:chgData name="Julia Moeller" userId="0bcb1583-c1a4-48b5-87e6-2cc074d2d571" providerId="ADAL" clId="{C92DF3DE-23A5-4E98-85FA-AAD4EAE96412}" dt="2023-09-15T13:15:08.060" v="10723" actId="14100"/>
-          <ac:spMkLst>
-            <pc:docMk/>
-            <pc:sldMk cId="901500868" sldId="291"/>
-            <ac:spMk id="9" creationId="{9BD03E4B-80AC-7BCE-E297-2BAC06C28495}"/>
-          </ac:spMkLst>
-        </pc:spChg>
-        <pc:spChg chg="del">
-          <ac:chgData name="Julia Moeller" userId="0bcb1583-c1a4-48b5-87e6-2cc074d2d571" providerId="ADAL" clId="{C92DF3DE-23A5-4E98-85FA-AAD4EAE96412}" dt="2023-09-15T13:09:55.252" v="10421" actId="478"/>
-          <ac:spMkLst>
-            <pc:docMk/>
-            <pc:sldMk cId="901500868" sldId="291"/>
-            <ac:spMk id="10" creationId="{00000000-0000-0000-0000-000000000000}"/>
-          </ac:spMkLst>
-        </pc:spChg>
-        <pc:spChg chg="add mod">
-          <ac:chgData name="Julia Moeller" userId="0bcb1583-c1a4-48b5-87e6-2cc074d2d571" providerId="ADAL" clId="{C92DF3DE-23A5-4E98-85FA-AAD4EAE96412}" dt="2023-09-15T13:15:45.189" v="10733" actId="14100"/>
-          <ac:spMkLst>
-            <pc:docMk/>
-            <pc:sldMk cId="901500868" sldId="291"/>
-            <ac:spMk id="12" creationId="{D47F700D-1F47-1A52-BC79-538B93FE662F}"/>
-          </ac:spMkLst>
-        </pc:spChg>
-        <pc:spChg chg="add del mod">
-          <ac:chgData name="Julia Moeller" userId="0bcb1583-c1a4-48b5-87e6-2cc074d2d571" providerId="ADAL" clId="{C92DF3DE-23A5-4E98-85FA-AAD4EAE96412}" dt="2023-09-15T13:16:41.928" v="10736" actId="478"/>
-          <ac:spMkLst>
-            <pc:docMk/>
-            <pc:sldMk cId="901500868" sldId="291"/>
-            <ac:spMk id="13" creationId="{9EDDF475-3D58-4255-3000-35E241EE39F2}"/>
-          </ac:spMkLst>
-        </pc:spChg>
-        <pc:spChg chg="add mod">
-          <ac:chgData name="Julia Moeller" userId="0bcb1583-c1a4-48b5-87e6-2cc074d2d571" providerId="ADAL" clId="{C92DF3DE-23A5-4E98-85FA-AAD4EAE96412}" dt="2023-09-15T13:17:14.806" v="10741" actId="1076"/>
-          <ac:spMkLst>
-            <pc:docMk/>
-            <pc:sldMk cId="901500868" sldId="291"/>
-            <ac:spMk id="14" creationId="{C303C8A2-9F91-4038-103F-3210AF169E24}"/>
-          </ac:spMkLst>
-        </pc:spChg>
-        <pc:spChg chg="del mod">
-          <ac:chgData name="Julia Moeller" userId="0bcb1583-c1a4-48b5-87e6-2cc074d2d571" providerId="ADAL" clId="{C92DF3DE-23A5-4E98-85FA-AAD4EAE96412}" dt="2023-09-15T13:12:41.519" v="10637" actId="478"/>
-          <ac:spMkLst>
-            <pc:docMk/>
-            <pc:sldMk cId="901500868" sldId="291"/>
-            <ac:spMk id="17" creationId="{00000000-0000-0000-0000-000000000000}"/>
-          </ac:spMkLst>
-        </pc:spChg>
-        <pc:picChg chg="del mod">
-          <ac:chgData name="Julia Moeller" userId="0bcb1583-c1a4-48b5-87e6-2cc074d2d571" providerId="ADAL" clId="{C92DF3DE-23A5-4E98-85FA-AAD4EAE96412}" dt="2023-09-15T13:14:19.825" v="10714" actId="478"/>
-          <ac:picMkLst>
-            <pc:docMk/>
-            <pc:sldMk cId="901500868" sldId="291"/>
-            <ac:picMk id="5" creationId="{00000000-0000-0000-0000-000000000000}"/>
-          </ac:picMkLst>
-        </pc:picChg>
-        <pc:picChg chg="add mod">
-          <ac:chgData name="Julia Moeller" userId="0bcb1583-c1a4-48b5-87e6-2cc074d2d571" providerId="ADAL" clId="{C92DF3DE-23A5-4E98-85FA-AAD4EAE96412}" dt="2023-09-15T13:16:47.266" v="10737" actId="1076"/>
-          <ac:picMkLst>
-            <pc:docMk/>
-            <pc:sldMk cId="901500868" sldId="291"/>
-            <ac:picMk id="7" creationId="{2F9F20DB-8302-B53F-64E6-A1062FF609C1}"/>
-          </ac:picMkLst>
-        </pc:picChg>
-        <pc:cxnChg chg="del">
-          <ac:chgData name="Julia Moeller" userId="0bcb1583-c1a4-48b5-87e6-2cc074d2d571" providerId="ADAL" clId="{C92DF3DE-23A5-4E98-85FA-AAD4EAE96412}" dt="2023-09-15T13:06:01.963" v="10329" actId="478"/>
-          <ac:cxnSpMkLst>
-            <pc:docMk/>
-            <pc:sldMk cId="901500868" sldId="291"/>
-            <ac:cxnSpMk id="8" creationId="{00000000-0000-0000-0000-000000000000}"/>
-          </ac:cxnSpMkLst>
-        </pc:cxnChg>
-        <pc:cxnChg chg="del">
-          <ac:chgData name="Julia Moeller" userId="0bcb1583-c1a4-48b5-87e6-2cc074d2d571" providerId="ADAL" clId="{C92DF3DE-23A5-4E98-85FA-AAD4EAE96412}" dt="2023-09-15T13:06:02.902" v="10330" actId="478"/>
-          <ac:cxnSpMkLst>
-            <pc:docMk/>
-            <pc:sldMk cId="901500868" sldId="291"/>
-            <ac:cxnSpMk id="11" creationId="{00000000-0000-0000-0000-000000000000}"/>
-          </ac:cxnSpMkLst>
-        </pc:cxnChg>
-        <pc:extLst>
-          <p:ext xmlns:p="http://schemas.openxmlformats.org/presentationml/2006/main" uri="{D6D511B9-2390-475A-947B-AFAB55BFBCF1}">
-            <pc226:cmChg xmlns:pc226="http://schemas.microsoft.com/office/powerpoint/2022/06/main/command" chg="mod">
-              <pc226:chgData name="Julia Moeller" userId="0bcb1583-c1a4-48b5-87e6-2cc074d2d571" providerId="ADAL" clId="{C92DF3DE-23A5-4E98-85FA-AAD4EAE96412}" dt="2023-09-15T13:45:14.968" v="11367"/>
-              <pc2:cmMkLst xmlns:pc2="http://schemas.microsoft.com/office/powerpoint/2019/9/main/command">
-                <pc:docMk/>
-                <pc:sldMk cId="901500868" sldId="291"/>
-                <pc2:cmMk id="{68A4FC4D-8810-434B-A266-12AA49887732}"/>
-              </pc2:cmMkLst>
-            </pc226:cmChg>
-            <pc226:cmChg xmlns:pc226="http://schemas.microsoft.com/office/powerpoint/2022/06/main/command" chg="mod">
-              <pc226:chgData name="Julia Moeller" userId="0bcb1583-c1a4-48b5-87e6-2cc074d2d571" providerId="ADAL" clId="{C92DF3DE-23A5-4E98-85FA-AAD4EAE96412}" dt="2023-09-15T13:45:17.020" v="11368"/>
-              <pc2:cmMkLst xmlns:pc2="http://schemas.microsoft.com/office/powerpoint/2019/9/main/command">
-                <pc:docMk/>
-                <pc:sldMk cId="901500868" sldId="291"/>
-                <pc2:cmMk id="{D1D4A775-D028-4101-B550-B3DB043E0A55}"/>
-              </pc2:cmMkLst>
-            </pc226:cmChg>
-          </p:ext>
-        </pc:extLst>
-      </pc:sldChg>
-      <pc:sldChg chg="modSp mod">
-        <pc:chgData name="Julia Moeller" userId="0bcb1583-c1a4-48b5-87e6-2cc074d2d571" providerId="ADAL" clId="{C92DF3DE-23A5-4E98-85FA-AAD4EAE96412}" dt="2023-09-15T14:34:32.245" v="11385" actId="14100"/>
-        <pc:sldMkLst>
-          <pc:docMk/>
-          <pc:sldMk cId="3374116860" sldId="292"/>
-        </pc:sldMkLst>
-        <pc:spChg chg="mod">
-          <ac:chgData name="Julia Moeller" userId="0bcb1583-c1a4-48b5-87e6-2cc074d2d571" providerId="ADAL" clId="{C92DF3DE-23A5-4E98-85FA-AAD4EAE96412}" dt="2023-09-15T13:28:37.335" v="10793" actId="20577"/>
-          <ac:spMkLst>
-            <pc:docMk/>
-            <pc:sldMk cId="3374116860" sldId="292"/>
-            <ac:spMk id="2" creationId="{00000000-0000-0000-0000-000000000000}"/>
-          </ac:spMkLst>
-        </pc:spChg>
-        <pc:spChg chg="mod">
-          <ac:chgData name="Julia Moeller" userId="0bcb1583-c1a4-48b5-87e6-2cc074d2d571" providerId="ADAL" clId="{C92DF3DE-23A5-4E98-85FA-AAD4EAE96412}" dt="2023-09-15T13:28:07.541" v="10782" actId="20577"/>
-          <ac:spMkLst>
-            <pc:docMk/>
-            <pc:sldMk cId="3374116860" sldId="292"/>
-            <ac:spMk id="3" creationId="{00000000-0000-0000-0000-000000000000}"/>
-          </ac:spMkLst>
-        </pc:spChg>
-        <pc:spChg chg="mod">
-          <ac:chgData name="Julia Moeller" userId="0bcb1583-c1a4-48b5-87e6-2cc074d2d571" providerId="ADAL" clId="{C92DF3DE-23A5-4E98-85FA-AAD4EAE96412}" dt="2023-09-15T14:34:32.245" v="11385" actId="14100"/>
-          <ac:spMkLst>
-            <pc:docMk/>
-            <pc:sldMk cId="3374116860" sldId="292"/>
-            <ac:spMk id="6" creationId="{00000000-0000-0000-0000-000000000000}"/>
-          </ac:spMkLst>
-        </pc:spChg>
-        <pc:picChg chg="mod">
-          <ac:chgData name="Julia Moeller" userId="0bcb1583-c1a4-48b5-87e6-2cc074d2d571" providerId="ADAL" clId="{C92DF3DE-23A5-4E98-85FA-AAD4EAE96412}" dt="2023-09-15T13:18:09.460" v="10781" actId="1076"/>
-          <ac:picMkLst>
-            <pc:docMk/>
-            <pc:sldMk cId="3374116860" sldId="292"/>
-            <ac:picMk id="5" creationId="{00000000-0000-0000-0000-000000000000}"/>
-          </ac:picMkLst>
-        </pc:picChg>
-      </pc:sldChg>
-      <pc:sldChg chg="modSp mod modCm">
-        <pc:chgData name="Julia Moeller" userId="0bcb1583-c1a4-48b5-87e6-2cc074d2d571" providerId="ADAL" clId="{C92DF3DE-23A5-4E98-85FA-AAD4EAE96412}" dt="2023-09-15T13:45:21.556" v="11369"/>
-        <pc:sldMkLst>
-          <pc:docMk/>
-          <pc:sldMk cId="381035228" sldId="294"/>
-        </pc:sldMkLst>
-        <pc:spChg chg="mod">
-          <ac:chgData name="Julia Moeller" userId="0bcb1583-c1a4-48b5-87e6-2cc074d2d571" providerId="ADAL" clId="{C92DF3DE-23A5-4E98-85FA-AAD4EAE96412}" dt="2023-09-15T13:37:32.532" v="11339" actId="20577"/>
-          <ac:spMkLst>
-            <pc:docMk/>
-            <pc:sldMk cId="381035228" sldId="294"/>
-            <ac:spMk id="3" creationId="{00000000-0000-0000-0000-000000000000}"/>
-          </ac:spMkLst>
-        </pc:spChg>
-        <pc:extLst>
-          <p:ext xmlns:p="http://schemas.openxmlformats.org/presentationml/2006/main" uri="{D6D511B9-2390-475A-947B-AFAB55BFBCF1}">
-            <pc226:cmChg xmlns:pc226="http://schemas.microsoft.com/office/powerpoint/2022/06/main/command" chg="mod">
-              <pc226:chgData name="Julia Moeller" userId="0bcb1583-c1a4-48b5-87e6-2cc074d2d571" providerId="ADAL" clId="{C92DF3DE-23A5-4E98-85FA-AAD4EAE96412}" dt="2023-09-15T13:45:21.556" v="11369"/>
-              <pc2:cmMkLst xmlns:pc2="http://schemas.microsoft.com/office/powerpoint/2019/9/main/command">
-                <pc:docMk/>
-                <pc:sldMk cId="381035228" sldId="294"/>
-                <pc2:cmMk id="{4CC69E5F-71C3-444B-9725-487B26466248}"/>
-              </pc2:cmMkLst>
-            </pc226:cmChg>
-          </p:ext>
-        </pc:extLst>
-      </pc:sldChg>
-      <pc:sldChg chg="modSp mod modCm">
-        <pc:chgData name="Julia Moeller" userId="0bcb1583-c1a4-48b5-87e6-2cc074d2d571" providerId="ADAL" clId="{C92DF3DE-23A5-4E98-85FA-AAD4EAE96412}" dt="2023-09-15T13:45:24.984" v="11370"/>
-        <pc:sldMkLst>
-          <pc:docMk/>
-          <pc:sldMk cId="4004071830" sldId="295"/>
-        </pc:sldMkLst>
-        <pc:spChg chg="mod">
-          <ac:chgData name="Julia Moeller" userId="0bcb1583-c1a4-48b5-87e6-2cc074d2d571" providerId="ADAL" clId="{C92DF3DE-23A5-4E98-85FA-AAD4EAE96412}" dt="2023-09-15T13:37:49.200" v="11340" actId="12"/>
-          <ac:spMkLst>
-            <pc:docMk/>
-            <pc:sldMk cId="4004071830" sldId="295"/>
-            <ac:spMk id="3" creationId="{00000000-0000-0000-0000-000000000000}"/>
-          </ac:spMkLst>
-        </pc:spChg>
-        <pc:extLst>
-          <p:ext xmlns:p="http://schemas.openxmlformats.org/presentationml/2006/main" uri="{D6D511B9-2390-475A-947B-AFAB55BFBCF1}">
-            <pc226:cmChg xmlns:pc226="http://schemas.microsoft.com/office/powerpoint/2022/06/main/command" chg="mod">
-              <pc226:chgData name="Julia Moeller" userId="0bcb1583-c1a4-48b5-87e6-2cc074d2d571" providerId="ADAL" clId="{C92DF3DE-23A5-4E98-85FA-AAD4EAE96412}" dt="2023-09-15T13:45:24.984" v="11370"/>
-              <pc2:cmMkLst xmlns:pc2="http://schemas.microsoft.com/office/powerpoint/2019/9/main/command">
-                <pc:docMk/>
-                <pc:sldMk cId="4004071830" sldId="295"/>
-                <pc2:cmMk id="{0D813420-51BA-454C-A243-C3B31560C9AD}"/>
-              </pc2:cmMkLst>
-            </pc226:cmChg>
-          </p:ext>
-        </pc:extLst>
-      </pc:sldChg>
-      <pc:sldChg chg="modSp mod modCm">
-        <pc:chgData name="Julia Moeller" userId="0bcb1583-c1a4-48b5-87e6-2cc074d2d571" providerId="ADAL" clId="{C92DF3DE-23A5-4E98-85FA-AAD4EAE96412}" dt="2023-09-15T13:44:53.517" v="11363"/>
-        <pc:sldMkLst>
-          <pc:docMk/>
-          <pc:sldMk cId="1722840581" sldId="296"/>
-        </pc:sldMkLst>
-        <pc:spChg chg="mod">
-          <ac:chgData name="Julia Moeller" userId="0bcb1583-c1a4-48b5-87e6-2cc074d2d571" providerId="ADAL" clId="{C92DF3DE-23A5-4E98-85FA-AAD4EAE96412}" dt="2023-09-15T12:27:35.824" v="10199" actId="20577"/>
-          <ac:spMkLst>
-            <pc:docMk/>
-            <pc:sldMk cId="1722840581" sldId="296"/>
-            <ac:spMk id="2" creationId="{00000000-0000-0000-0000-000000000000}"/>
-          </ac:spMkLst>
-        </pc:spChg>
-        <pc:picChg chg="mod">
-          <ac:chgData name="Julia Moeller" userId="0bcb1583-c1a4-48b5-87e6-2cc074d2d571" providerId="ADAL" clId="{C92DF3DE-23A5-4E98-85FA-AAD4EAE96412}" dt="2023-09-15T13:39:43.986" v="11348" actId="1076"/>
-          <ac:picMkLst>
-            <pc:docMk/>
-            <pc:sldMk cId="1722840581" sldId="296"/>
-            <ac:picMk id="5" creationId="{00000000-0000-0000-0000-000000000000}"/>
-          </ac:picMkLst>
-        </pc:picChg>
-        <pc:picChg chg="mod">
-          <ac:chgData name="Julia Moeller" userId="0bcb1583-c1a4-48b5-87e6-2cc074d2d571" providerId="ADAL" clId="{C92DF3DE-23A5-4E98-85FA-AAD4EAE96412}" dt="2023-09-15T13:39:43.986" v="11348" actId="1076"/>
-          <ac:picMkLst>
-            <pc:docMk/>
-            <pc:sldMk cId="1722840581" sldId="296"/>
-            <ac:picMk id="6" creationId="{00000000-0000-0000-0000-000000000000}"/>
-          </ac:picMkLst>
-        </pc:picChg>
-        <pc:picChg chg="mod">
-          <ac:chgData name="Julia Moeller" userId="0bcb1583-c1a4-48b5-87e6-2cc074d2d571" providerId="ADAL" clId="{C92DF3DE-23A5-4E98-85FA-AAD4EAE96412}" dt="2023-09-15T13:39:48.193" v="11349" actId="1076"/>
-          <ac:picMkLst>
-            <pc:docMk/>
-            <pc:sldMk cId="1722840581" sldId="296"/>
-            <ac:picMk id="8" creationId="{00000000-0000-0000-0000-000000000000}"/>
-          </ac:picMkLst>
-        </pc:picChg>
-        <pc:extLst>
-          <p:ext xmlns:p="http://schemas.openxmlformats.org/presentationml/2006/main" uri="{D6D511B9-2390-475A-947B-AFAB55BFBCF1}">
-            <pc226:cmChg xmlns:pc226="http://schemas.microsoft.com/office/powerpoint/2022/06/main/command" chg="mod">
-              <pc226:chgData name="Julia Moeller" userId="0bcb1583-c1a4-48b5-87e6-2cc074d2d571" providerId="ADAL" clId="{C92DF3DE-23A5-4E98-85FA-AAD4EAE96412}" dt="2023-09-15T13:44:53.517" v="11363"/>
-              <pc2:cmMkLst xmlns:pc2="http://schemas.microsoft.com/office/powerpoint/2019/9/main/command">
-                <pc:docMk/>
-                <pc:sldMk cId="1722840581" sldId="296"/>
-                <pc2:cmMk id="{F468DDB2-DF6E-4341-851D-55360D67FD24}"/>
-              </pc2:cmMkLst>
-            </pc226:cmChg>
-          </p:ext>
-        </pc:extLst>
-      </pc:sldChg>
-      <pc:sldChg chg="addSp modSp new mod">
-        <pc:chgData name="Julia Moeller" userId="0bcb1583-c1a4-48b5-87e6-2cc074d2d571" providerId="ADAL" clId="{C92DF3DE-23A5-4E98-85FA-AAD4EAE96412}" dt="2023-09-14T19:15:28.271" v="8152" actId="20577"/>
-        <pc:sldMkLst>
-          <pc:docMk/>
-          <pc:sldMk cId="1551293455" sldId="297"/>
-        </pc:sldMkLst>
-        <pc:spChg chg="mod">
-          <ac:chgData name="Julia Moeller" userId="0bcb1583-c1a4-48b5-87e6-2cc074d2d571" providerId="ADAL" clId="{C92DF3DE-23A5-4E98-85FA-AAD4EAE96412}" dt="2023-09-12T07:52:39.237" v="528" actId="20577"/>
-          <ac:spMkLst>
-            <pc:docMk/>
-            <pc:sldMk cId="1551293455" sldId="297"/>
-            <ac:spMk id="2" creationId="{95A265AA-440A-EFD8-19E5-E64BE8C27779}"/>
-          </ac:spMkLst>
-        </pc:spChg>
-        <pc:spChg chg="mod">
-          <ac:chgData name="Julia Moeller" userId="0bcb1583-c1a4-48b5-87e6-2cc074d2d571" providerId="ADAL" clId="{C92DF3DE-23A5-4E98-85FA-AAD4EAE96412}" dt="2023-09-14T19:15:28.271" v="8152" actId="20577"/>
-          <ac:spMkLst>
-            <pc:docMk/>
-            <pc:sldMk cId="1551293455" sldId="297"/>
-            <ac:spMk id="3" creationId="{E59FB31B-7D1B-9B83-15CF-5A323633BF84}"/>
-          </ac:spMkLst>
-        </pc:spChg>
-        <pc:picChg chg="add mod">
-          <ac:chgData name="Julia Moeller" userId="0bcb1583-c1a4-48b5-87e6-2cc074d2d571" providerId="ADAL" clId="{C92DF3DE-23A5-4E98-85FA-AAD4EAE96412}" dt="2023-09-12T11:46:07.435" v="883" actId="1076"/>
-          <ac:picMkLst>
-            <pc:docMk/>
-            <pc:sldMk cId="1551293455" sldId="297"/>
-            <ac:picMk id="5" creationId="{D7FE9FF9-C604-A434-96A4-6DF7A9B768A1}"/>
-          </ac:picMkLst>
-        </pc:picChg>
-        <pc:picChg chg="add mod">
-          <ac:chgData name="Julia Moeller" userId="0bcb1583-c1a4-48b5-87e6-2cc074d2d571" providerId="ADAL" clId="{C92DF3DE-23A5-4E98-85FA-AAD4EAE96412}" dt="2023-09-12T07:51:46.969" v="524" actId="1076"/>
-          <ac:picMkLst>
-            <pc:docMk/>
-            <pc:sldMk cId="1551293455" sldId="297"/>
-            <ac:picMk id="7" creationId="{7533A57B-8398-C943-AFA2-FB0D454A1C89}"/>
-          </ac:picMkLst>
-        </pc:picChg>
-      </pc:sldChg>
-      <pc:sldChg chg="addSp delSp modSp add mod ord">
-        <pc:chgData name="Julia Moeller" userId="0bcb1583-c1a4-48b5-87e6-2cc074d2d571" providerId="ADAL" clId="{C92DF3DE-23A5-4E98-85FA-AAD4EAE96412}" dt="2023-09-13T14:29:55.965" v="3757" actId="20577"/>
-        <pc:sldMkLst>
-          <pc:docMk/>
-          <pc:sldMk cId="611648881" sldId="298"/>
-        </pc:sldMkLst>
-        <pc:spChg chg="mod">
-          <ac:chgData name="Julia Moeller" userId="0bcb1583-c1a4-48b5-87e6-2cc074d2d571" providerId="ADAL" clId="{C92DF3DE-23A5-4E98-85FA-AAD4EAE96412}" dt="2023-09-13T14:29:55.965" v="3757" actId="20577"/>
-          <ac:spMkLst>
-            <pc:docMk/>
-            <pc:sldMk cId="611648881" sldId="298"/>
-            <ac:spMk id="2" creationId="{00000000-0000-0000-0000-000000000000}"/>
-          </ac:spMkLst>
-        </pc:spChg>
-        <pc:spChg chg="mod">
-          <ac:chgData name="Julia Moeller" userId="0bcb1583-c1a4-48b5-87e6-2cc074d2d571" providerId="ADAL" clId="{C92DF3DE-23A5-4E98-85FA-AAD4EAE96412}" dt="2023-09-13T07:58:45.491" v="2106" actId="20577"/>
-          <ac:spMkLst>
-            <pc:docMk/>
-            <pc:sldMk cId="611648881" sldId="298"/>
-            <ac:spMk id="3" creationId="{00000000-0000-0000-0000-000000000000}"/>
-          </ac:spMkLst>
-        </pc:spChg>
-        <pc:spChg chg="add mod">
-          <ac:chgData name="Julia Moeller" userId="0bcb1583-c1a4-48b5-87e6-2cc074d2d571" providerId="ADAL" clId="{C92DF3DE-23A5-4E98-85FA-AAD4EAE96412}" dt="2023-09-13T06:29:10.411" v="1148" actId="164"/>
-          <ac:spMkLst>
-            <pc:docMk/>
-            <pc:sldMk cId="611648881" sldId="298"/>
-            <ac:spMk id="5" creationId="{863BE274-4D32-B404-CF97-2191418F746E}"/>
-          </ac:spMkLst>
-        </pc:spChg>
-        <pc:spChg chg="del mod">
-          <ac:chgData name="Julia Moeller" userId="0bcb1583-c1a4-48b5-87e6-2cc074d2d571" providerId="ADAL" clId="{C92DF3DE-23A5-4E98-85FA-AAD4EAE96412}" dt="2023-09-13T06:27:00.309" v="1137" actId="478"/>
-          <ac:spMkLst>
-            <pc:docMk/>
-            <pc:sldMk cId="611648881" sldId="298"/>
-            <ac:spMk id="8" creationId="{00000000-0000-0000-0000-000000000000}"/>
-          </ac:spMkLst>
-        </pc:spChg>
-        <pc:spChg chg="del mod">
-          <ac:chgData name="Julia Moeller" userId="0bcb1583-c1a4-48b5-87e6-2cc074d2d571" providerId="ADAL" clId="{C92DF3DE-23A5-4E98-85FA-AAD4EAE96412}" dt="2023-09-13T06:24:51.788" v="1083" actId="478"/>
-          <ac:spMkLst>
-            <pc:docMk/>
-            <pc:sldMk cId="611648881" sldId="298"/>
-            <ac:spMk id="9" creationId="{00000000-0000-0000-0000-000000000000}"/>
-          </ac:spMkLst>
-        </pc:spChg>
-        <pc:spChg chg="del">
-          <ac:chgData name="Julia Moeller" userId="0bcb1583-c1a4-48b5-87e6-2cc074d2d571" providerId="ADAL" clId="{C92DF3DE-23A5-4E98-85FA-AAD4EAE96412}" dt="2023-09-13T06:27:01.418" v="1138" actId="478"/>
-          <ac:spMkLst>
-            <pc:docMk/>
-            <pc:sldMk cId="611648881" sldId="298"/>
-            <ac:spMk id="10" creationId="{00000000-0000-0000-0000-000000000000}"/>
-          </ac:spMkLst>
-        </pc:spChg>
-        <pc:grpChg chg="add mod">
-          <ac:chgData name="Julia Moeller" userId="0bcb1583-c1a4-48b5-87e6-2cc074d2d571" providerId="ADAL" clId="{C92DF3DE-23A5-4E98-85FA-AAD4EAE96412}" dt="2023-09-13T06:56:46.146" v="1467" actId="1076"/>
-          <ac:grpSpMkLst>
-            <pc:docMk/>
-            <pc:sldMk cId="611648881" sldId="298"/>
-            <ac:grpSpMk id="6" creationId="{2B816B54-F62C-CC73-CEB9-E1A0C28A2EC0}"/>
-          </ac:grpSpMkLst>
-        </pc:grpChg>
-        <pc:picChg chg="add mod">
-          <ac:chgData name="Julia Moeller" userId="0bcb1583-c1a4-48b5-87e6-2cc074d2d571" providerId="ADAL" clId="{C92DF3DE-23A5-4E98-85FA-AAD4EAE96412}" dt="2023-09-13T06:29:10.411" v="1148" actId="164"/>
-          <ac:picMkLst>
-            <pc:docMk/>
-            <pc:sldMk cId="611648881" sldId="298"/>
-            <ac:picMk id="4" creationId="{487C797C-4EF2-C30B-08BC-D3764F16EC50}"/>
-          </ac:picMkLst>
-        </pc:picChg>
-        <pc:picChg chg="mod">
-          <ac:chgData name="Julia Moeller" userId="0bcb1583-c1a4-48b5-87e6-2cc074d2d571" providerId="ADAL" clId="{C92DF3DE-23A5-4E98-85FA-AAD4EAE96412}" dt="2023-09-13T06:27:53.189" v="1141" actId="1076"/>
-          <ac:picMkLst>
-            <pc:docMk/>
-            <pc:sldMk cId="611648881" sldId="298"/>
-            <ac:picMk id="11" creationId="{28FA3161-75B7-1AA6-24ED-DD9AF0DDE3E2}"/>
-          </ac:picMkLst>
-        </pc:picChg>
-      </pc:sldChg>
-      <pc:sldChg chg="new del">
-        <pc:chgData name="Julia Moeller" userId="0bcb1583-c1a4-48b5-87e6-2cc074d2d571" providerId="ADAL" clId="{C92DF3DE-23A5-4E98-85FA-AAD4EAE96412}" dt="2023-09-13T06:52:25.486" v="1361" actId="680"/>
-        <pc:sldMkLst>
-          <pc:docMk/>
-          <pc:sldMk cId="2669124872" sldId="299"/>
-        </pc:sldMkLst>
-      </pc:sldChg>
-      <pc:sldChg chg="addSp delSp modSp add mod">
-        <pc:chgData name="Julia Moeller" userId="0bcb1583-c1a4-48b5-87e6-2cc074d2d571" providerId="ADAL" clId="{C92DF3DE-23A5-4E98-85FA-AAD4EAE96412}" dt="2023-09-29T13:32:10.710" v="11412" actId="20577"/>
-        <pc:sldMkLst>
-          <pc:docMk/>
-          <pc:sldMk cId="3454572736" sldId="299"/>
-        </pc:sldMkLst>
-        <pc:spChg chg="mod">
-          <ac:chgData name="Julia Moeller" userId="0bcb1583-c1a4-48b5-87e6-2cc074d2d571" providerId="ADAL" clId="{C92DF3DE-23A5-4E98-85FA-AAD4EAE96412}" dt="2023-09-29T13:31:51.351" v="11409" actId="1076"/>
-          <ac:spMkLst>
-            <pc:docMk/>
-            <pc:sldMk cId="3454572736" sldId="299"/>
-            <ac:spMk id="2" creationId="{00000000-0000-0000-0000-000000000000}"/>
-          </ac:spMkLst>
-        </pc:spChg>
-        <pc:spChg chg="mod">
-          <ac:chgData name="Julia Moeller" userId="0bcb1583-c1a4-48b5-87e6-2cc074d2d571" providerId="ADAL" clId="{C92DF3DE-23A5-4E98-85FA-AAD4EAE96412}" dt="2023-09-29T13:32:10.710" v="11412" actId="20577"/>
-          <ac:spMkLst>
-            <pc:docMk/>
-            <pc:sldMk cId="3454572736" sldId="299"/>
-            <ac:spMk id="3" creationId="{00000000-0000-0000-0000-000000000000}"/>
-          </ac:spMkLst>
-        </pc:spChg>
-        <pc:spChg chg="mod">
-          <ac:chgData name="Julia Moeller" userId="0bcb1583-c1a4-48b5-87e6-2cc074d2d571" providerId="ADAL" clId="{C92DF3DE-23A5-4E98-85FA-AAD4EAE96412}" dt="2023-09-13T07:37:20.199" v="1615"/>
-          <ac:spMkLst>
-            <pc:docMk/>
-            <pc:sldMk cId="3454572736" sldId="299"/>
-            <ac:spMk id="6" creationId="{8B4DA86A-5D22-F18B-80AF-3D8DE525985F}"/>
-          </ac:spMkLst>
-        </pc:spChg>
-        <pc:spChg chg="mod">
-          <ac:chgData name="Julia Moeller" userId="0bcb1583-c1a4-48b5-87e6-2cc074d2d571" providerId="ADAL" clId="{C92DF3DE-23A5-4E98-85FA-AAD4EAE96412}" dt="2023-09-13T07:37:20.199" v="1615"/>
-          <ac:spMkLst>
-            <pc:docMk/>
-            <pc:sldMk cId="3454572736" sldId="299"/>
-            <ac:spMk id="7" creationId="{837F7A1D-0C15-6EC6-53DA-61D319F11145}"/>
-          </ac:spMkLst>
-        </pc:spChg>
-        <pc:spChg chg="del mod">
-          <ac:chgData name="Julia Moeller" userId="0bcb1583-c1a4-48b5-87e6-2cc074d2d571" providerId="ADAL" clId="{C92DF3DE-23A5-4E98-85FA-AAD4EAE96412}" dt="2023-09-13T07:40:23.817" v="1853" actId="478"/>
-          <ac:spMkLst>
-            <pc:docMk/>
-            <pc:sldMk cId="3454572736" sldId="299"/>
-            <ac:spMk id="8" creationId="{00000000-0000-0000-0000-000000000000}"/>
-          </ac:spMkLst>
-        </pc:spChg>
-        <pc:spChg chg="mod">
-          <ac:chgData name="Julia Moeller" userId="0bcb1583-c1a4-48b5-87e6-2cc074d2d571" providerId="ADAL" clId="{C92DF3DE-23A5-4E98-85FA-AAD4EAE96412}" dt="2023-09-13T07:37:20.199" v="1615"/>
-          <ac:spMkLst>
-            <pc:docMk/>
-            <pc:sldMk cId="3454572736" sldId="299"/>
-            <ac:spMk id="10" creationId="{BFACDB6D-76C9-33BC-5D34-100F754155D9}"/>
-          </ac:spMkLst>
-        </pc:spChg>
-        <pc:spChg chg="add mod">
-          <ac:chgData name="Julia Moeller" userId="0bcb1583-c1a4-48b5-87e6-2cc074d2d571" providerId="ADAL" clId="{C92DF3DE-23A5-4E98-85FA-AAD4EAE96412}" dt="2023-09-13T07:37:58.045" v="1623" actId="164"/>
-          <ac:spMkLst>
-            <pc:docMk/>
-            <pc:sldMk cId="3454572736" sldId="299"/>
-            <ac:spMk id="11" creationId="{41014A79-FC2C-E5E4-932F-060A6C6ADC13}"/>
-          </ac:spMkLst>
-        </pc:spChg>
-        <pc:grpChg chg="add mod">
-          <ac:chgData name="Julia Moeller" userId="0bcb1583-c1a4-48b5-87e6-2cc074d2d571" providerId="ADAL" clId="{C92DF3DE-23A5-4E98-85FA-AAD4EAE96412}" dt="2023-09-13T07:37:58.045" v="1623" actId="164"/>
-          <ac:grpSpMkLst>
-            <pc:docMk/>
-            <pc:sldMk cId="3454572736" sldId="299"/>
-            <ac:grpSpMk id="4" creationId="{47B2C459-D8FF-5021-09E3-E87F133875BA}"/>
-          </ac:grpSpMkLst>
-        </pc:grpChg>
-        <pc:grpChg chg="mod">
-          <ac:chgData name="Julia Moeller" userId="0bcb1583-c1a4-48b5-87e6-2cc074d2d571" providerId="ADAL" clId="{C92DF3DE-23A5-4E98-85FA-AAD4EAE96412}" dt="2023-09-13T07:37:20.199" v="1615"/>
-          <ac:grpSpMkLst>
-            <pc:docMk/>
-            <pc:sldMk cId="3454572736" sldId="299"/>
-            <ac:grpSpMk id="5" creationId="{F6556616-07A2-93C9-B603-4478B0827D16}"/>
-          </ac:grpSpMkLst>
-        </pc:grpChg>
-        <pc:grpChg chg="add mod">
-          <ac:chgData name="Julia Moeller" userId="0bcb1583-c1a4-48b5-87e6-2cc074d2d571" providerId="ADAL" clId="{C92DF3DE-23A5-4E98-85FA-AAD4EAE96412}" dt="2023-09-29T13:31:41.069" v="11407" actId="1076"/>
-          <ac:grpSpMkLst>
-            <pc:docMk/>
-            <pc:sldMk cId="3454572736" sldId="299"/>
-            <ac:grpSpMk id="12" creationId="{FC7B5036-5732-EDF4-3669-2CB26EE012BA}"/>
-          </ac:grpSpMkLst>
-        </pc:grpChg>
-        <pc:picChg chg="mod">
-          <ac:chgData name="Julia Moeller" userId="0bcb1583-c1a4-48b5-87e6-2cc074d2d571" providerId="ADAL" clId="{C92DF3DE-23A5-4E98-85FA-AAD4EAE96412}" dt="2023-09-13T07:37:20.199" v="1615"/>
-          <ac:picMkLst>
-            <pc:docMk/>
-            <pc:sldMk cId="3454572736" sldId="299"/>
-            <ac:picMk id="9" creationId="{F97FE750-50C1-0DCE-842D-B2310103503B}"/>
-          </ac:picMkLst>
-        </pc:picChg>
-        <pc:picChg chg="del">
-          <ac:chgData name="Julia Moeller" userId="0bcb1583-c1a4-48b5-87e6-2cc074d2d571" providerId="ADAL" clId="{C92DF3DE-23A5-4E98-85FA-AAD4EAE96412}" dt="2023-09-13T07:36:42.676" v="1613" actId="478"/>
-          <ac:picMkLst>
-            <pc:docMk/>
-            <pc:sldMk cId="3454572736" sldId="299"/>
-            <ac:picMk id="13" creationId="{0F3122D6-A648-5D79-D9B7-871F19069138}"/>
-          </ac:picMkLst>
-        </pc:picChg>
-        <pc:picChg chg="add mod">
-          <ac:chgData name="Julia Moeller" userId="0bcb1583-c1a4-48b5-87e6-2cc074d2d571" providerId="ADAL" clId="{C92DF3DE-23A5-4E98-85FA-AAD4EAE96412}" dt="2023-09-29T13:31:41.069" v="11407" actId="1076"/>
-          <ac:picMkLst>
-            <pc:docMk/>
-            <pc:sldMk cId="3454572736" sldId="299"/>
-            <ac:picMk id="15" creationId="{5C5B1CB1-6F5E-B43B-96AE-29720F4AB9E4}"/>
-          </ac:picMkLst>
-        </pc:picChg>
-        <pc:cxnChg chg="add del mod">
-          <ac:chgData name="Julia Moeller" userId="0bcb1583-c1a4-48b5-87e6-2cc074d2d571" providerId="ADAL" clId="{C92DF3DE-23A5-4E98-85FA-AAD4EAE96412}" dt="2023-09-13T09:41:10.384" v="2873" actId="478"/>
-          <ac:cxnSpMkLst>
-            <pc:docMk/>
-            <pc:sldMk cId="3454572736" sldId="299"/>
-            <ac:cxnSpMk id="17" creationId="{DE8B4463-F425-184B-C520-14849E272DFD}"/>
-          </ac:cxnSpMkLst>
-        </pc:cxnChg>
-        <pc:cxnChg chg="add del mod">
-          <ac:chgData name="Julia Moeller" userId="0bcb1583-c1a4-48b5-87e6-2cc074d2d571" providerId="ADAL" clId="{C92DF3DE-23A5-4E98-85FA-AAD4EAE96412}" dt="2023-09-13T09:41:11.224" v="2874" actId="478"/>
-          <ac:cxnSpMkLst>
-            <pc:docMk/>
-            <pc:sldMk cId="3454572736" sldId="299"/>
-            <ac:cxnSpMk id="18" creationId="{2CB56C57-EED2-E7C9-1D06-760240EE3ACF}"/>
-          </ac:cxnSpMkLst>
-        </pc:cxnChg>
-        <pc:cxnChg chg="add del mod">
-          <ac:chgData name="Julia Moeller" userId="0bcb1583-c1a4-48b5-87e6-2cc074d2d571" providerId="ADAL" clId="{C92DF3DE-23A5-4E98-85FA-AAD4EAE96412}" dt="2023-09-13T09:55:34.800" v="2918" actId="478"/>
-          <ac:cxnSpMkLst>
-            <pc:docMk/>
-            <pc:sldMk cId="3454572736" sldId="299"/>
-            <ac:cxnSpMk id="21" creationId="{36E2AA13-2001-D74F-3C41-B9EE3F6ECDE3}"/>
-          </ac:cxnSpMkLst>
-        </pc:cxnChg>
-        <pc:cxnChg chg="add mod">
-          <ac:chgData name="Julia Moeller" userId="0bcb1583-c1a4-48b5-87e6-2cc074d2d571" providerId="ADAL" clId="{C92DF3DE-23A5-4E98-85FA-AAD4EAE96412}" dt="2023-09-29T13:31:41.069" v="11407" actId="1076"/>
-          <ac:cxnSpMkLst>
-            <pc:docMk/>
-            <pc:sldMk cId="3454572736" sldId="299"/>
-            <ac:cxnSpMk id="22" creationId="{6B983E33-2A5B-E056-454E-E951B67657D7}"/>
-          </ac:cxnSpMkLst>
-        </pc:cxnChg>
-        <pc:cxnChg chg="add mod">
-          <ac:chgData name="Julia Moeller" userId="0bcb1583-c1a4-48b5-87e6-2cc074d2d571" providerId="ADAL" clId="{C92DF3DE-23A5-4E98-85FA-AAD4EAE96412}" dt="2023-09-29T13:31:41.069" v="11407" actId="1076"/>
-          <ac:cxnSpMkLst>
-            <pc:docMk/>
-            <pc:sldMk cId="3454572736" sldId="299"/>
-            <ac:cxnSpMk id="27" creationId="{299BD17C-F6A3-CD2D-7EEC-BE789BB598F6}"/>
-          </ac:cxnSpMkLst>
-        </pc:cxnChg>
-        <pc:cxnChg chg="add mod">
-          <ac:chgData name="Julia Moeller" userId="0bcb1583-c1a4-48b5-87e6-2cc074d2d571" providerId="ADAL" clId="{C92DF3DE-23A5-4E98-85FA-AAD4EAE96412}" dt="2023-09-29T13:31:41.069" v="11407" actId="1076"/>
-          <ac:cxnSpMkLst>
-            <pc:docMk/>
-            <pc:sldMk cId="3454572736" sldId="299"/>
-            <ac:cxnSpMk id="30" creationId="{E90F102F-7ED1-1852-9D68-292315A01050}"/>
-          </ac:cxnSpMkLst>
-        </pc:cxnChg>
-        <pc:cxnChg chg="add del mod">
-          <ac:chgData name="Julia Moeller" userId="0bcb1583-c1a4-48b5-87e6-2cc074d2d571" providerId="ADAL" clId="{C92DF3DE-23A5-4E98-85FA-AAD4EAE96412}" dt="2023-09-13T09:55:35.781" v="2919" actId="478"/>
-          <ac:cxnSpMkLst>
-            <pc:docMk/>
-            <pc:sldMk cId="3454572736" sldId="299"/>
-            <ac:cxnSpMk id="33" creationId="{E610C825-4C4F-5C6D-7ED5-102B2DA1EC44}"/>
-          </ac:cxnSpMkLst>
-        </pc:cxnChg>
-        <pc:cxnChg chg="add mod">
-          <ac:chgData name="Julia Moeller" userId="0bcb1583-c1a4-48b5-87e6-2cc074d2d571" providerId="ADAL" clId="{C92DF3DE-23A5-4E98-85FA-AAD4EAE96412}" dt="2023-09-29T13:31:41.069" v="11407" actId="1076"/>
-          <ac:cxnSpMkLst>
-            <pc:docMk/>
-            <pc:sldMk cId="3454572736" sldId="299"/>
-            <ac:cxnSpMk id="56" creationId="{96C2AAC5-8D67-A5E6-157D-F5C04DE22C77}"/>
-          </ac:cxnSpMkLst>
-        </pc:cxnChg>
-        <pc:cxnChg chg="add mod">
-          <ac:chgData name="Julia Moeller" userId="0bcb1583-c1a4-48b5-87e6-2cc074d2d571" providerId="ADAL" clId="{C92DF3DE-23A5-4E98-85FA-AAD4EAE96412}" dt="2023-09-29T13:31:41.069" v="11407" actId="1076"/>
-          <ac:cxnSpMkLst>
-            <pc:docMk/>
-            <pc:sldMk cId="3454572736" sldId="299"/>
-            <ac:cxnSpMk id="57" creationId="{29B1B824-B37A-022B-4E03-C760DFAF1E2E}"/>
-          </ac:cxnSpMkLst>
-        </pc:cxnChg>
-      </pc:sldChg>
-      <pc:sldChg chg="addSp delSp modSp add mod">
-        <pc:chgData name="Julia Moeller" userId="0bcb1583-c1a4-48b5-87e6-2cc074d2d571" providerId="ADAL" clId="{C92DF3DE-23A5-4E98-85FA-AAD4EAE96412}" dt="2023-09-14T11:44:14.202" v="5541" actId="167"/>
-        <pc:sldMkLst>
-          <pc:docMk/>
-          <pc:sldMk cId="568039319" sldId="300"/>
-        </pc:sldMkLst>
-        <pc:spChg chg="mod">
-          <ac:chgData name="Julia Moeller" userId="0bcb1583-c1a4-48b5-87e6-2cc074d2d571" providerId="ADAL" clId="{C92DF3DE-23A5-4E98-85FA-AAD4EAE96412}" dt="2023-09-14T11:35:15.442" v="5448" actId="207"/>
-          <ac:spMkLst>
-            <pc:docMk/>
-            <pc:sldMk cId="568039319" sldId="300"/>
-            <ac:spMk id="3" creationId="{00000000-0000-0000-0000-000000000000}"/>
-          </ac:spMkLst>
-        </pc:spChg>
-        <pc:spChg chg="del mod">
-          <ac:chgData name="Julia Moeller" userId="0bcb1583-c1a4-48b5-87e6-2cc074d2d571" providerId="ADAL" clId="{C92DF3DE-23A5-4E98-85FA-AAD4EAE96412}" dt="2023-09-14T10:18:21.717" v="4626" actId="478"/>
-          <ac:spMkLst>
-            <pc:docMk/>
-            <pc:sldMk cId="568039319" sldId="300"/>
-            <ac:spMk id="8" creationId="{00000000-0000-0000-0000-000000000000}"/>
-          </ac:spMkLst>
-        </pc:spChg>
-        <pc:spChg chg="mod topLvl">
-          <ac:chgData name="Julia Moeller" userId="0bcb1583-c1a4-48b5-87e6-2cc074d2d571" providerId="ADAL" clId="{C92DF3DE-23A5-4E98-85FA-AAD4EAE96412}" dt="2023-09-14T10:43:12.726" v="4929" actId="164"/>
-          <ac:spMkLst>
-            <pc:docMk/>
-            <pc:sldMk cId="568039319" sldId="300"/>
-            <ac:spMk id="15" creationId="{C74ADD94-7739-5B9A-8C70-2C9AC321EBD7}"/>
-          </ac:spMkLst>
-        </pc:spChg>
-        <pc:spChg chg="mod">
-          <ac:chgData name="Julia Moeller" userId="0bcb1583-c1a4-48b5-87e6-2cc074d2d571" providerId="ADAL" clId="{C92DF3DE-23A5-4E98-85FA-AAD4EAE96412}" dt="2023-09-14T10:42:51.335" v="4928" actId="14100"/>
-          <ac:spMkLst>
-            <pc:docMk/>
-            <pc:sldMk cId="568039319" sldId="300"/>
-            <ac:spMk id="17" creationId="{16398475-76CA-523A-2483-E8602D6DEBE1}"/>
-          </ac:spMkLst>
-        </pc:spChg>
-        <pc:spChg chg="mod">
-          <ac:chgData name="Julia Moeller" userId="0bcb1583-c1a4-48b5-87e6-2cc074d2d571" providerId="ADAL" clId="{C92DF3DE-23A5-4E98-85FA-AAD4EAE96412}" dt="2023-09-14T10:42:22.815" v="4919" actId="14100"/>
-          <ac:spMkLst>
-            <pc:docMk/>
-            <pc:sldMk cId="568039319" sldId="300"/>
-            <ac:spMk id="18" creationId="{B75D499A-D65B-6DE7-A2E4-7B5517704BDE}"/>
-          </ac:spMkLst>
-        </pc:spChg>
-        <pc:spChg chg="del mod">
-          <ac:chgData name="Julia Moeller" userId="0bcb1583-c1a4-48b5-87e6-2cc074d2d571" providerId="ADAL" clId="{C92DF3DE-23A5-4E98-85FA-AAD4EAE96412}" dt="2023-09-14T10:42:30.215" v="4920" actId="478"/>
-          <ac:spMkLst>
-            <pc:docMk/>
-            <pc:sldMk cId="568039319" sldId="300"/>
-            <ac:spMk id="20" creationId="{42299CDD-2B50-C35B-4BAA-BC9B66F2563B}"/>
-          </ac:spMkLst>
-        </pc:spChg>
-        <pc:grpChg chg="del mod">
-          <ac:chgData name="Julia Moeller" userId="0bcb1583-c1a4-48b5-87e6-2cc074d2d571" providerId="ADAL" clId="{C92DF3DE-23A5-4E98-85FA-AAD4EAE96412}" dt="2023-09-14T10:33:43.592" v="4680" actId="478"/>
-          <ac:grpSpMkLst>
-            <pc:docMk/>
-            <pc:sldMk cId="568039319" sldId="300"/>
-            <ac:grpSpMk id="7" creationId="{00000000-0000-0000-0000-000000000000}"/>
-          </ac:grpSpMkLst>
-        </pc:grpChg>
-        <pc:grpChg chg="add del mod">
-          <ac:chgData name="Julia Moeller" userId="0bcb1583-c1a4-48b5-87e6-2cc074d2d571" providerId="ADAL" clId="{C92DF3DE-23A5-4E98-85FA-AAD4EAE96412}" dt="2023-09-14T10:42:00.611" v="4915" actId="165"/>
-          <ac:grpSpMkLst>
-            <pc:docMk/>
-            <pc:sldMk cId="568039319" sldId="300"/>
-            <ac:grpSpMk id="13" creationId="{ED52D83A-D561-7DD5-6163-65D334D93D21}"/>
-          </ac:grpSpMkLst>
-        </pc:grpChg>
-        <pc:grpChg chg="add del mod topLvl">
-          <ac:chgData name="Julia Moeller" userId="0bcb1583-c1a4-48b5-87e6-2cc074d2d571" providerId="ADAL" clId="{C92DF3DE-23A5-4E98-85FA-AAD4EAE96412}" dt="2023-09-14T10:43:12.726" v="4929" actId="164"/>
-          <ac:grpSpMkLst>
-            <pc:docMk/>
-            <pc:sldMk cId="568039319" sldId="300"/>
-            <ac:grpSpMk id="14" creationId="{2E171E69-C298-3AAF-8A1E-9AA48E2DED0D}"/>
-          </ac:grpSpMkLst>
-        </pc:grpChg>
-        <pc:grpChg chg="del mod">
-          <ac:chgData name="Julia Moeller" userId="0bcb1583-c1a4-48b5-87e6-2cc074d2d571" providerId="ADAL" clId="{C92DF3DE-23A5-4E98-85FA-AAD4EAE96412}" dt="2023-09-14T10:41:49.687" v="4913" actId="478"/>
-          <ac:grpSpMkLst>
-            <pc:docMk/>
-            <pc:sldMk cId="568039319" sldId="300"/>
-            <ac:grpSpMk id="16" creationId="{CC105ED5-385E-C7C8-C884-F60174CC702F}"/>
-          </ac:grpSpMkLst>
-        </pc:grpChg>
-        <pc:grpChg chg="add mod">
-          <ac:chgData name="Julia Moeller" userId="0bcb1583-c1a4-48b5-87e6-2cc074d2d571" providerId="ADAL" clId="{C92DF3DE-23A5-4E98-85FA-AAD4EAE96412}" dt="2023-09-14T11:34:27.876" v="5371" actId="1076"/>
-          <ac:grpSpMkLst>
-            <pc:docMk/>
-            <pc:sldMk cId="568039319" sldId="300"/>
-            <ac:grpSpMk id="21" creationId="{0B98D2B8-9996-D2A0-01C6-D067803C3D24}"/>
-          </ac:grpSpMkLst>
-        </pc:grpChg>
-        <pc:grpChg chg="add mod ord">
-          <ac:chgData name="Julia Moeller" userId="0bcb1583-c1a4-48b5-87e6-2cc074d2d571" providerId="ADAL" clId="{C92DF3DE-23A5-4E98-85FA-AAD4EAE96412}" dt="2023-09-14T11:44:14.202" v="5541" actId="167"/>
-          <ac:grpSpMkLst>
-            <pc:docMk/>
-            <pc:sldMk cId="568039319" sldId="300"/>
-            <ac:grpSpMk id="43" creationId="{FDAE714F-FC46-AB9D-081C-9ED85856237A}"/>
-          </ac:grpSpMkLst>
-        </pc:grpChg>
-        <pc:picChg chg="add del mod">
-          <ac:chgData name="Julia Moeller" userId="0bcb1583-c1a4-48b5-87e6-2cc074d2d571" providerId="ADAL" clId="{C92DF3DE-23A5-4E98-85FA-AAD4EAE96412}" dt="2023-09-14T10:35:05.436" v="4722" actId="478"/>
-          <ac:picMkLst>
-            <pc:docMk/>
-            <pc:sldMk cId="568039319" sldId="300"/>
-            <ac:picMk id="9" creationId="{96444C2D-4D90-28BB-49D2-65FDB9C45E2B}"/>
-          </ac:picMkLst>
-        </pc:picChg>
-        <pc:picChg chg="add mod">
-          <ac:chgData name="Julia Moeller" userId="0bcb1583-c1a4-48b5-87e6-2cc074d2d571" providerId="ADAL" clId="{C92DF3DE-23A5-4E98-85FA-AAD4EAE96412}" dt="2023-09-14T11:43:54.965" v="5540" actId="164"/>
-          <ac:picMkLst>
-            <pc:docMk/>
-            <pc:sldMk cId="568039319" sldId="300"/>
-            <ac:picMk id="11" creationId="{A8026EE5-C6B2-2DEA-3259-76B7935A96A8}"/>
-          </ac:picMkLst>
-        </pc:picChg>
-        <pc:picChg chg="add mod">
-          <ac:chgData name="Julia Moeller" userId="0bcb1583-c1a4-48b5-87e6-2cc074d2d571" providerId="ADAL" clId="{C92DF3DE-23A5-4E98-85FA-AAD4EAE96412}" dt="2023-09-14T10:43:12.726" v="4929" actId="164"/>
-          <ac:picMkLst>
-            <pc:docMk/>
-            <pc:sldMk cId="568039319" sldId="300"/>
-            <ac:picMk id="12" creationId="{E3C2601A-45FA-F2FF-0AFB-592993499D0E}"/>
-          </ac:picMkLst>
-        </pc:picChg>
-        <pc:picChg chg="del mod">
-          <ac:chgData name="Julia Moeller" userId="0bcb1583-c1a4-48b5-87e6-2cc074d2d571" providerId="ADAL" clId="{C92DF3DE-23A5-4E98-85FA-AAD4EAE96412}" dt="2023-09-14T10:41:49.687" v="4913" actId="478"/>
-          <ac:picMkLst>
-            <pc:docMk/>
-            <pc:sldMk cId="568039319" sldId="300"/>
-            <ac:picMk id="19" creationId="{4FCE8AC4-35C5-C9D2-2298-DFAC88796245}"/>
-          </ac:picMkLst>
-        </pc:picChg>
-        <pc:picChg chg="add mod modCrop">
-          <ac:chgData name="Julia Moeller" userId="0bcb1583-c1a4-48b5-87e6-2cc074d2d571" providerId="ADAL" clId="{C92DF3DE-23A5-4E98-85FA-AAD4EAE96412}" dt="2023-09-14T11:43:54.965" v="5540" actId="164"/>
-          <ac:picMkLst>
-            <pc:docMk/>
-            <pc:sldMk cId="568039319" sldId="300"/>
-            <ac:picMk id="42" creationId="{307C9033-E290-8946-01EF-19E8DF9F2432}"/>
-          </ac:picMkLst>
-        </pc:picChg>
-        <pc:cxnChg chg="add mod">
-          <ac:chgData name="Julia Moeller" userId="0bcb1583-c1a4-48b5-87e6-2cc074d2d571" providerId="ADAL" clId="{C92DF3DE-23A5-4E98-85FA-AAD4EAE96412}" dt="2023-09-14T11:34:27.876" v="5371" actId="1076"/>
-          <ac:cxnSpMkLst>
-            <pc:docMk/>
-            <pc:sldMk cId="568039319" sldId="300"/>
-            <ac:cxnSpMk id="22" creationId="{DAB46467-AB1E-66A6-653C-510795D26CC3}"/>
-          </ac:cxnSpMkLst>
-        </pc:cxnChg>
-        <pc:cxnChg chg="add mod">
-          <ac:chgData name="Julia Moeller" userId="0bcb1583-c1a4-48b5-87e6-2cc074d2d571" providerId="ADAL" clId="{C92DF3DE-23A5-4E98-85FA-AAD4EAE96412}" dt="2023-09-14T11:34:27.876" v="5371" actId="1076"/>
-          <ac:cxnSpMkLst>
-            <pc:docMk/>
-            <pc:sldMk cId="568039319" sldId="300"/>
-            <ac:cxnSpMk id="23" creationId="{4A6A15AC-3FFA-E970-9020-C0C0540D512E}"/>
-          </ac:cxnSpMkLst>
-        </pc:cxnChg>
-        <pc:cxnChg chg="add mod">
-          <ac:chgData name="Julia Moeller" userId="0bcb1583-c1a4-48b5-87e6-2cc074d2d571" providerId="ADAL" clId="{C92DF3DE-23A5-4E98-85FA-AAD4EAE96412}" dt="2023-09-14T11:34:27.876" v="5371" actId="1076"/>
-          <ac:cxnSpMkLst>
-            <pc:docMk/>
-            <pc:sldMk cId="568039319" sldId="300"/>
-            <ac:cxnSpMk id="24" creationId="{09D1B4B0-05A0-84B7-ACD7-79F292C18CA4}"/>
-          </ac:cxnSpMkLst>
-        </pc:cxnChg>
-        <pc:cxnChg chg="add del mod">
-          <ac:chgData name="Julia Moeller" userId="0bcb1583-c1a4-48b5-87e6-2cc074d2d571" providerId="ADAL" clId="{C92DF3DE-23A5-4E98-85FA-AAD4EAE96412}" dt="2023-09-14T10:46:28.224" v="4953" actId="478"/>
-          <ac:cxnSpMkLst>
-            <pc:docMk/>
-            <pc:sldMk cId="568039319" sldId="300"/>
-            <ac:cxnSpMk id="35" creationId="{FAB37631-52CE-0C6C-D87F-B400F9A0DD81}"/>
-          </ac:cxnSpMkLst>
-        </pc:cxnChg>
-        <pc:cxnChg chg="add mod">
-          <ac:chgData name="Julia Moeller" userId="0bcb1583-c1a4-48b5-87e6-2cc074d2d571" providerId="ADAL" clId="{C92DF3DE-23A5-4E98-85FA-AAD4EAE96412}" dt="2023-09-14T11:34:27.876" v="5371" actId="1076"/>
-          <ac:cxnSpMkLst>
-            <pc:docMk/>
-            <pc:sldMk cId="568039319" sldId="300"/>
-            <ac:cxnSpMk id="36" creationId="{B2796A24-3E87-1A64-A0E3-405C8F88E5C1}"/>
-          </ac:cxnSpMkLst>
-        </pc:cxnChg>
-      </pc:sldChg>
-      <pc:sldChg chg="addSp delSp modSp add mod">
-        <pc:chgData name="Julia Moeller" userId="0bcb1583-c1a4-48b5-87e6-2cc074d2d571" providerId="ADAL" clId="{C92DF3DE-23A5-4E98-85FA-AAD4EAE96412}" dt="2023-09-14T18:57:19.465" v="7723" actId="14100"/>
-        <pc:sldMkLst>
-          <pc:docMk/>
-          <pc:sldMk cId="3090311843" sldId="301"/>
-        </pc:sldMkLst>
-        <pc:spChg chg="mod">
-          <ac:chgData name="Julia Moeller" userId="0bcb1583-c1a4-48b5-87e6-2cc074d2d571" providerId="ADAL" clId="{C92DF3DE-23A5-4E98-85FA-AAD4EAE96412}" dt="2023-09-14T13:23:10.858" v="6426" actId="20577"/>
-          <ac:spMkLst>
-            <pc:docMk/>
-            <pc:sldMk cId="3090311843" sldId="301"/>
-            <ac:spMk id="2" creationId="{00000000-0000-0000-0000-000000000000}"/>
-          </ac:spMkLst>
-        </pc:spChg>
-        <pc:spChg chg="add mod">
-          <ac:chgData name="Julia Moeller" userId="0bcb1583-c1a4-48b5-87e6-2cc074d2d571" providerId="ADAL" clId="{C92DF3DE-23A5-4E98-85FA-AAD4EAE96412}" dt="2023-09-14T18:57:19.465" v="7723" actId="14100"/>
-          <ac:spMkLst>
-            <pc:docMk/>
-            <pc:sldMk cId="3090311843" sldId="301"/>
-            <ac:spMk id="3" creationId="{04655EE7-38F4-5C8C-65CB-D543F16EF2C3}"/>
-          </ac:spMkLst>
-        </pc:spChg>
-        <pc:spChg chg="del">
-          <ac:chgData name="Julia Moeller" userId="0bcb1583-c1a4-48b5-87e6-2cc074d2d571" providerId="ADAL" clId="{C92DF3DE-23A5-4E98-85FA-AAD4EAE96412}" dt="2023-09-14T18:25:24.977" v="6970" actId="478"/>
-          <ac:spMkLst>
-            <pc:docMk/>
-            <pc:sldMk cId="3090311843" sldId="301"/>
-            <ac:spMk id="21" creationId="{00000000-0000-0000-0000-000000000000}"/>
-          </ac:spMkLst>
-        </pc:spChg>
-        <pc:spChg chg="del mod">
-          <ac:chgData name="Julia Moeller" userId="0bcb1583-c1a4-48b5-87e6-2cc074d2d571" providerId="ADAL" clId="{C92DF3DE-23A5-4E98-85FA-AAD4EAE96412}" dt="2023-09-14T18:25:28.949" v="6975" actId="478"/>
-          <ac:spMkLst>
-            <pc:docMk/>
-            <pc:sldMk cId="3090311843" sldId="301"/>
-            <ac:spMk id="27" creationId="{00000000-0000-0000-0000-000000000000}"/>
-          </ac:spMkLst>
-        </pc:spChg>
-        <pc:spChg chg="del">
-          <ac:chgData name="Julia Moeller" userId="0bcb1583-c1a4-48b5-87e6-2cc074d2d571" providerId="ADAL" clId="{C92DF3DE-23A5-4E98-85FA-AAD4EAE96412}" dt="2023-09-14T18:31:56.758" v="7588" actId="478"/>
-          <ac:spMkLst>
-            <pc:docMk/>
-            <pc:sldMk cId="3090311843" sldId="301"/>
-            <ac:spMk id="28" creationId="{00000000-0000-0000-0000-000000000000}"/>
-          </ac:spMkLst>
-        </pc:spChg>
-        <pc:grpChg chg="del">
-          <ac:chgData name="Julia Moeller" userId="0bcb1583-c1a4-48b5-87e6-2cc074d2d571" providerId="ADAL" clId="{C92DF3DE-23A5-4E98-85FA-AAD4EAE96412}" dt="2023-09-14T18:25:21.737" v="6969" actId="478"/>
-          <ac:grpSpMkLst>
-            <pc:docMk/>
-            <pc:sldMk cId="3090311843" sldId="301"/>
-            <ac:grpSpMk id="19" creationId="{00000000-0000-0000-0000-000000000000}"/>
-          </ac:grpSpMkLst>
-        </pc:grpChg>
-        <pc:grpChg chg="del">
-          <ac:chgData name="Julia Moeller" userId="0bcb1583-c1a4-48b5-87e6-2cc074d2d571" providerId="ADAL" clId="{C92DF3DE-23A5-4E98-85FA-AAD4EAE96412}" dt="2023-09-14T18:31:26.307" v="7548" actId="478"/>
-          <ac:grpSpMkLst>
-            <pc:docMk/>
-            <pc:sldMk cId="3090311843" sldId="301"/>
-            <ac:grpSpMk id="25" creationId="{00000000-0000-0000-0000-000000000000}"/>
-          </ac:grpSpMkLst>
-        </pc:grpChg>
-        <pc:picChg chg="add mod">
-          <ac:chgData name="Julia Moeller" userId="0bcb1583-c1a4-48b5-87e6-2cc074d2d571" providerId="ADAL" clId="{C92DF3DE-23A5-4E98-85FA-AAD4EAE96412}" dt="2023-09-14T18:32:49.529" v="7598" actId="1076"/>
-          <ac:picMkLst>
-            <pc:docMk/>
-            <pc:sldMk cId="3090311843" sldId="301"/>
-            <ac:picMk id="6" creationId="{BEB8F971-AA3F-BB9A-A722-08B551343B8A}"/>
-          </ac:picMkLst>
-        </pc:picChg>
-        <pc:cxnChg chg="del">
-          <ac:chgData name="Julia Moeller" userId="0bcb1583-c1a4-48b5-87e6-2cc074d2d571" providerId="ADAL" clId="{C92DF3DE-23A5-4E98-85FA-AAD4EAE96412}" dt="2023-09-14T18:25:25.613" v="6971" actId="478"/>
-          <ac:cxnSpMkLst>
-            <pc:docMk/>
-            <pc:sldMk cId="3090311843" sldId="301"/>
-            <ac:cxnSpMk id="20" creationId="{00000000-0000-0000-0000-000000000000}"/>
-          </ac:cxnSpMkLst>
-        </pc:cxnChg>
-        <pc:cxnChg chg="del">
-          <ac:chgData name="Julia Moeller" userId="0bcb1583-c1a4-48b5-87e6-2cc074d2d571" providerId="ADAL" clId="{C92DF3DE-23A5-4E98-85FA-AAD4EAE96412}" dt="2023-09-14T18:25:27.132" v="6973" actId="478"/>
-          <ac:cxnSpMkLst>
-            <pc:docMk/>
-            <pc:sldMk cId="3090311843" sldId="301"/>
-            <ac:cxnSpMk id="26" creationId="{00000000-0000-0000-0000-000000000000}"/>
-          </ac:cxnSpMkLst>
-        </pc:cxnChg>
-      </pc:sldChg>
-      <pc:sldChg chg="addSp delSp modSp add mod">
-        <pc:chgData name="Julia Moeller" userId="0bcb1583-c1a4-48b5-87e6-2cc074d2d571" providerId="ADAL" clId="{C92DF3DE-23A5-4E98-85FA-AAD4EAE96412}" dt="2023-09-15T11:45:17.418" v="9911" actId="20577"/>
-        <pc:sldMkLst>
-          <pc:docMk/>
-          <pc:sldMk cId="3693208738" sldId="302"/>
-        </pc:sldMkLst>
-        <pc:spChg chg="mod">
-          <ac:chgData name="Julia Moeller" userId="0bcb1583-c1a4-48b5-87e6-2cc074d2d571" providerId="ADAL" clId="{C92DF3DE-23A5-4E98-85FA-AAD4EAE96412}" dt="2023-09-15T11:27:09.263" v="9530" actId="20577"/>
-          <ac:spMkLst>
-            <pc:docMk/>
-            <pc:sldMk cId="3693208738" sldId="302"/>
-            <ac:spMk id="2" creationId="{00000000-0000-0000-0000-000000000000}"/>
-          </ac:spMkLst>
-        </pc:spChg>
-        <pc:spChg chg="mod">
-          <ac:chgData name="Julia Moeller" userId="0bcb1583-c1a4-48b5-87e6-2cc074d2d571" providerId="ADAL" clId="{C92DF3DE-23A5-4E98-85FA-AAD4EAE96412}" dt="2023-09-15T11:45:17.418" v="9911" actId="20577"/>
-          <ac:spMkLst>
-            <pc:docMk/>
-            <pc:sldMk cId="3693208738" sldId="302"/>
-            <ac:spMk id="7" creationId="{00000000-0000-0000-0000-000000000000}"/>
-          </ac:spMkLst>
-        </pc:spChg>
-        <pc:picChg chg="del">
-          <ac:chgData name="Julia Moeller" userId="0bcb1583-c1a4-48b5-87e6-2cc074d2d571" providerId="ADAL" clId="{C92DF3DE-23A5-4E98-85FA-AAD4EAE96412}" dt="2023-09-15T11:08:11.910" v="9139" actId="478"/>
-          <ac:picMkLst>
-            <pc:docMk/>
-            <pc:sldMk cId="3693208738" sldId="302"/>
-            <ac:picMk id="4" creationId="{7AFCB226-FC0B-C1E6-7424-ABDBB8C06CE6}"/>
-          </ac:picMkLst>
-        </pc:picChg>
-        <pc:picChg chg="add mod modCrop">
-          <ac:chgData name="Julia Moeller" userId="0bcb1583-c1a4-48b5-87e6-2cc074d2d571" providerId="ADAL" clId="{C92DF3DE-23A5-4E98-85FA-AAD4EAE96412}" dt="2023-09-15T11:27:32.196" v="9534" actId="1076"/>
-          <ac:picMkLst>
-            <pc:docMk/>
-            <pc:sldMk cId="3693208738" sldId="302"/>
-            <ac:picMk id="5" creationId="{73409FDC-B862-1C9D-3021-E20FC2A4A6F4}"/>
-          </ac:picMkLst>
-        </pc:picChg>
-        <pc:picChg chg="add del mod">
-          <ac:chgData name="Julia Moeller" userId="0bcb1583-c1a4-48b5-87e6-2cc074d2d571" providerId="ADAL" clId="{C92DF3DE-23A5-4E98-85FA-AAD4EAE96412}" dt="2023-09-15T11:27:16.602" v="9531" actId="478"/>
-          <ac:picMkLst>
-            <pc:docMk/>
-            <pc:sldMk cId="3693208738" sldId="302"/>
-            <ac:picMk id="8" creationId="{C2B0BADF-49C8-8434-B952-085266FF23F5}"/>
-          </ac:picMkLst>
-        </pc:picChg>
-      </pc:sldChg>
-      <pc:sldChg chg="addSp delSp modSp add mod">
-        <pc:chgData name="Julia Moeller" userId="0bcb1583-c1a4-48b5-87e6-2cc074d2d571" providerId="ADAL" clId="{C92DF3DE-23A5-4E98-85FA-AAD4EAE96412}" dt="2023-09-15T11:26:07.167" v="9517" actId="20577"/>
-        <pc:sldMkLst>
-          <pc:docMk/>
-          <pc:sldMk cId="739751023" sldId="303"/>
-        </pc:sldMkLst>
-        <pc:spChg chg="mod">
-          <ac:chgData name="Julia Moeller" userId="0bcb1583-c1a4-48b5-87e6-2cc074d2d571" providerId="ADAL" clId="{C92DF3DE-23A5-4E98-85FA-AAD4EAE96412}" dt="2023-09-15T11:21:06.311" v="9387" actId="20577"/>
-          <ac:spMkLst>
-            <pc:docMk/>
-            <pc:sldMk cId="739751023" sldId="303"/>
-            <ac:spMk id="2" creationId="{00000000-0000-0000-0000-000000000000}"/>
-          </ac:spMkLst>
-        </pc:spChg>
-        <pc:spChg chg="mod">
-          <ac:chgData name="Julia Moeller" userId="0bcb1583-c1a4-48b5-87e6-2cc074d2d571" providerId="ADAL" clId="{C92DF3DE-23A5-4E98-85FA-AAD4EAE96412}" dt="2023-09-15T11:26:07.167" v="9517" actId="20577"/>
-          <ac:spMkLst>
-            <pc:docMk/>
-            <pc:sldMk cId="739751023" sldId="303"/>
-            <ac:spMk id="7" creationId="{00000000-0000-0000-0000-000000000000}"/>
-          </ac:spMkLst>
-        </pc:spChg>
-        <pc:grpChg chg="add mod">
-          <ac:chgData name="Julia Moeller" userId="0bcb1583-c1a4-48b5-87e6-2cc074d2d571" providerId="ADAL" clId="{C92DF3DE-23A5-4E98-85FA-AAD4EAE96412}" dt="2023-09-15T11:24:04.404" v="9505" actId="1076"/>
-          <ac:grpSpMkLst>
-            <pc:docMk/>
-            <pc:sldMk cId="739751023" sldId="303"/>
-            <ac:grpSpMk id="8" creationId="{88E539B8-9932-21A3-20A7-89791E5FA3A7}"/>
-          </ac:grpSpMkLst>
-        </pc:grpChg>
-        <pc:picChg chg="del">
-          <ac:chgData name="Julia Moeller" userId="0bcb1583-c1a4-48b5-87e6-2cc074d2d571" providerId="ADAL" clId="{C92DF3DE-23A5-4E98-85FA-AAD4EAE96412}" dt="2023-09-15T11:21:11.287" v="9388" actId="478"/>
-          <ac:picMkLst>
-            <pc:docMk/>
-            <pc:sldMk cId="739751023" sldId="303"/>
-            <ac:picMk id="4" creationId="{7AFCB226-FC0B-C1E6-7424-ABDBB8C06CE6}"/>
-          </ac:picMkLst>
-        </pc:picChg>
-        <pc:picChg chg="add mod modCrop">
-          <ac:chgData name="Julia Moeller" userId="0bcb1583-c1a4-48b5-87e6-2cc074d2d571" providerId="ADAL" clId="{C92DF3DE-23A5-4E98-85FA-AAD4EAE96412}" dt="2023-09-15T11:22:20.210" v="9438" actId="164"/>
-          <ac:picMkLst>
-            <pc:docMk/>
-            <pc:sldMk cId="739751023" sldId="303"/>
-            <ac:picMk id="5" creationId="{C5E8A892-39CD-0666-6951-59396D8AF258}"/>
-          </ac:picMkLst>
-        </pc:picChg>
-        <pc:picChg chg="add mod modCrop">
-          <ac:chgData name="Julia Moeller" userId="0bcb1583-c1a4-48b5-87e6-2cc074d2d571" providerId="ADAL" clId="{C92DF3DE-23A5-4E98-85FA-AAD4EAE96412}" dt="2023-09-15T11:22:20.210" v="9438" actId="164"/>
-          <ac:picMkLst>
-            <pc:docMk/>
-            <pc:sldMk cId="739751023" sldId="303"/>
-            <ac:picMk id="6" creationId="{0661134F-B56B-C12A-BCB3-9B02FFE3A642}"/>
-          </ac:picMkLst>
-        </pc:picChg>
-      </pc:sldChg>
-      <pc:sldChg chg="addSp delSp modSp add mod">
-        <pc:chgData name="Julia Moeller" userId="0bcb1583-c1a4-48b5-87e6-2cc074d2d571" providerId="ADAL" clId="{C92DF3DE-23A5-4E98-85FA-AAD4EAE96412}" dt="2023-09-15T11:44:34.362" v="9857" actId="208"/>
-        <pc:sldMkLst>
-          <pc:docMk/>
-          <pc:sldMk cId="3748744909" sldId="304"/>
-        </pc:sldMkLst>
-        <pc:spChg chg="mod">
-          <ac:chgData name="Julia Moeller" userId="0bcb1583-c1a4-48b5-87e6-2cc074d2d571" providerId="ADAL" clId="{C92DF3DE-23A5-4E98-85FA-AAD4EAE96412}" dt="2023-09-15T11:26:32.551" v="9526" actId="20577"/>
-          <ac:spMkLst>
-            <pc:docMk/>
-            <pc:sldMk cId="3748744909" sldId="304"/>
-            <ac:spMk id="2" creationId="{00000000-0000-0000-0000-000000000000}"/>
-          </ac:spMkLst>
-        </pc:spChg>
-        <pc:spChg chg="add mod">
-          <ac:chgData name="Julia Moeller" userId="0bcb1583-c1a4-48b5-87e6-2cc074d2d571" providerId="ADAL" clId="{C92DF3DE-23A5-4E98-85FA-AAD4EAE96412}" dt="2023-09-15T11:44:34.362" v="9857" actId="208"/>
-          <ac:spMkLst>
-            <pc:docMk/>
-            <pc:sldMk cId="3748744909" sldId="304"/>
-            <ac:spMk id="3" creationId="{84476C02-F104-D65B-69B3-E0E1E1997F09}"/>
-          </ac:spMkLst>
-        </pc:spChg>
-        <pc:spChg chg="mod">
-          <ac:chgData name="Julia Moeller" userId="0bcb1583-c1a4-48b5-87e6-2cc074d2d571" providerId="ADAL" clId="{C92DF3DE-23A5-4E98-85FA-AAD4EAE96412}" dt="2023-09-15T11:41:36.730" v="9843" actId="1076"/>
-          <ac:spMkLst>
-            <pc:docMk/>
-            <pc:sldMk cId="3748744909" sldId="304"/>
-            <ac:spMk id="7" creationId="{00000000-0000-0000-0000-000000000000}"/>
-          </ac:spMkLst>
-        </pc:spChg>
-        <pc:grpChg chg="add mod">
-          <ac:chgData name="Julia Moeller" userId="0bcb1583-c1a4-48b5-87e6-2cc074d2d571" providerId="ADAL" clId="{C92DF3DE-23A5-4E98-85FA-AAD4EAE96412}" dt="2023-09-15T11:43:45.132" v="9855" actId="1076"/>
-          <ac:grpSpMkLst>
-            <pc:docMk/>
-            <pc:sldMk cId="3748744909" sldId="304"/>
-            <ac:grpSpMk id="4" creationId="{6A8634EF-A84B-C32D-E78D-6BC08E5D5C29}"/>
-          </ac:grpSpMkLst>
-        </pc:grpChg>
-        <pc:picChg chg="del">
-          <ac:chgData name="Julia Moeller" userId="0bcb1583-c1a4-48b5-87e6-2cc074d2d571" providerId="ADAL" clId="{C92DF3DE-23A5-4E98-85FA-AAD4EAE96412}" dt="2023-09-15T11:39:22.564" v="9689" actId="478"/>
-          <ac:picMkLst>
-            <pc:docMk/>
-            <pc:sldMk cId="3748744909" sldId="304"/>
-            <ac:picMk id="5" creationId="{73409FDC-B862-1C9D-3021-E20FC2A4A6F4}"/>
-          </ac:picMkLst>
-        </pc:picChg>
-        <pc:picChg chg="mod">
-          <ac:chgData name="Julia Moeller" userId="0bcb1583-c1a4-48b5-87e6-2cc074d2d571" providerId="ADAL" clId="{C92DF3DE-23A5-4E98-85FA-AAD4EAE96412}" dt="2023-09-15T11:43:31.546" v="9853" actId="164"/>
-          <ac:picMkLst>
-            <pc:docMk/>
-            <pc:sldMk cId="3748744909" sldId="304"/>
-            <ac:picMk id="8" creationId="{C2B0BADF-49C8-8434-B952-085266FF23F5}"/>
-          </ac:picMkLst>
-        </pc:picChg>
-      </pc:sldChg>
-      <pc:sldChg chg="addSp delSp modSp add mod ord">
-        <pc:chgData name="Julia Moeller" userId="0bcb1583-c1a4-48b5-87e6-2cc074d2d571" providerId="ADAL" clId="{C92DF3DE-23A5-4E98-85FA-AAD4EAE96412}" dt="2023-09-15T11:51:21.229" v="10187" actId="1076"/>
-        <pc:sldMkLst>
-          <pc:docMk/>
-          <pc:sldMk cId="2480934087" sldId="305"/>
-        </pc:sldMkLst>
-        <pc:spChg chg="mod">
-          <ac:chgData name="Julia Moeller" userId="0bcb1583-c1a4-48b5-87e6-2cc074d2d571" providerId="ADAL" clId="{C92DF3DE-23A5-4E98-85FA-AAD4EAE96412}" dt="2023-09-15T11:47:07.204" v="9932" actId="20577"/>
-          <ac:spMkLst>
-            <pc:docMk/>
-            <pc:sldMk cId="2480934087" sldId="305"/>
-            <ac:spMk id="2" creationId="{00000000-0000-0000-0000-000000000000}"/>
-          </ac:spMkLst>
-        </pc:spChg>
-        <pc:spChg chg="mod">
-          <ac:chgData name="Julia Moeller" userId="0bcb1583-c1a4-48b5-87e6-2cc074d2d571" providerId="ADAL" clId="{C92DF3DE-23A5-4E98-85FA-AAD4EAE96412}" dt="2023-09-15T11:51:18.123" v="10186" actId="20577"/>
-          <ac:spMkLst>
-            <pc:docMk/>
-            <pc:sldMk cId="2480934087" sldId="305"/>
-            <ac:spMk id="7" creationId="{00000000-0000-0000-0000-000000000000}"/>
-          </ac:spMkLst>
-        </pc:spChg>
-        <pc:picChg chg="add mod">
-          <ac:chgData name="Julia Moeller" userId="0bcb1583-c1a4-48b5-87e6-2cc074d2d571" providerId="ADAL" clId="{C92DF3DE-23A5-4E98-85FA-AAD4EAE96412}" dt="2023-09-15T11:51:21.229" v="10187" actId="1076"/>
-          <ac:picMkLst>
-            <pc:docMk/>
-            <pc:sldMk cId="2480934087" sldId="305"/>
-            <ac:picMk id="4" creationId="{C790A434-D294-E5AD-FEA3-81A1E1D32266}"/>
-          </ac:picMkLst>
-        </pc:picChg>
-        <pc:picChg chg="del">
-          <ac:chgData name="Julia Moeller" userId="0bcb1583-c1a4-48b5-87e6-2cc074d2d571" providerId="ADAL" clId="{C92DF3DE-23A5-4E98-85FA-AAD4EAE96412}" dt="2023-09-15T11:47:14.973" v="9938" actId="478"/>
-          <ac:picMkLst>
-            <pc:docMk/>
-            <pc:sldMk cId="2480934087" sldId="305"/>
-            <ac:picMk id="5" creationId="{73409FDC-B862-1C9D-3021-E20FC2A4A6F4}"/>
-          </ac:picMkLst>
-        </pc:picChg>
-      </pc:sldChg>
-    </pc:docChg>
-  </pc:docChgLst>
-  <pc:docChgLst>
-    <pc:chgData name="Matthew Forbes" userId="89e49754-86d5-48d1-b7fe-89645bb93558" providerId="ADAL" clId="{5B4AF71D-E8A2-44E5-B28F-FFEBF84B54E3}"/>
-    <pc:docChg chg="undo custSel modSld">
-      <pc:chgData name="Matthew Forbes" userId="89e49754-86d5-48d1-b7fe-89645bb93558" providerId="ADAL" clId="{5B4AF71D-E8A2-44E5-B28F-FFEBF84B54E3}" dt="2023-09-19T11:22:55.487" v="4" actId="20577"/>
-      <pc:docMkLst>
-        <pc:docMk/>
-      </pc:docMkLst>
-      <pc:sldChg chg="modSp mod">
-        <pc:chgData name="Matthew Forbes" userId="89e49754-86d5-48d1-b7fe-89645bb93558" providerId="ADAL" clId="{5B4AF71D-E8A2-44E5-B28F-FFEBF84B54E3}" dt="2023-09-19T10:34:32.194" v="0" actId="33524"/>
-        <pc:sldMkLst>
-          <pc:docMk/>
-          <pc:sldMk cId="3345530997" sldId="259"/>
-        </pc:sldMkLst>
-        <pc:spChg chg="mod">
-          <ac:chgData name="Matthew Forbes" userId="89e49754-86d5-48d1-b7fe-89645bb93558" providerId="ADAL" clId="{5B4AF71D-E8A2-44E5-B28F-FFEBF84B54E3}" dt="2023-09-19T10:34:32.194" v="0" actId="33524"/>
-          <ac:spMkLst>
-            <pc:docMk/>
-            <pc:sldMk cId="3345530997" sldId="259"/>
-            <ac:spMk id="3" creationId="{00000000-0000-0000-0000-000000000000}"/>
-          </ac:spMkLst>
-        </pc:spChg>
-      </pc:sldChg>
-      <pc:sldChg chg="modSp mod">
-        <pc:chgData name="Matthew Forbes" userId="89e49754-86d5-48d1-b7fe-89645bb93558" providerId="ADAL" clId="{5B4AF71D-E8A2-44E5-B28F-FFEBF84B54E3}" dt="2023-09-19T10:42:59.312" v="1" actId="20577"/>
-        <pc:sldMkLst>
-          <pc:docMk/>
-          <pc:sldMk cId="1311594560" sldId="269"/>
-        </pc:sldMkLst>
-        <pc:spChg chg="mod">
-          <ac:chgData name="Matthew Forbes" userId="89e49754-86d5-48d1-b7fe-89645bb93558" providerId="ADAL" clId="{5B4AF71D-E8A2-44E5-B28F-FFEBF84B54E3}" dt="2023-09-19T10:42:59.312" v="1" actId="20577"/>
-          <ac:spMkLst>
-            <pc:docMk/>
-            <pc:sldMk cId="1311594560" sldId="269"/>
-            <ac:spMk id="3" creationId="{00000000-0000-0000-0000-000000000000}"/>
-          </ac:spMkLst>
-        </pc:spChg>
-      </pc:sldChg>
-      <pc:sldChg chg="modSp mod">
-        <pc:chgData name="Matthew Forbes" userId="89e49754-86d5-48d1-b7fe-89645bb93558" providerId="ADAL" clId="{5B4AF71D-E8A2-44E5-B28F-FFEBF84B54E3}" dt="2023-09-19T11:22:55.487" v="4" actId="20577"/>
-        <pc:sldMkLst>
-          <pc:docMk/>
-          <pc:sldMk cId="2337627130" sldId="282"/>
-        </pc:sldMkLst>
-        <pc:spChg chg="mod">
-          <ac:chgData name="Matthew Forbes" userId="89e49754-86d5-48d1-b7fe-89645bb93558" providerId="ADAL" clId="{5B4AF71D-E8A2-44E5-B28F-FFEBF84B54E3}" dt="2023-09-19T11:22:55.487" v="4" actId="20577"/>
-          <ac:spMkLst>
-            <pc:docMk/>
-            <pc:sldMk cId="2337627130" sldId="282"/>
-            <ac:spMk id="4" creationId="{7F52414C-28D4-C7DD-E2FB-48994F99345C}"/>
-          </ac:spMkLst>
-        </pc:spChg>
-      </pc:sldChg>
-      <pc:sldChg chg="modSp mod">
-        <pc:chgData name="Matthew Forbes" userId="89e49754-86d5-48d1-b7fe-89645bb93558" providerId="ADAL" clId="{5B4AF71D-E8A2-44E5-B28F-FFEBF84B54E3}" dt="2023-09-19T10:44:28.044" v="3" actId="1076"/>
-        <pc:sldMkLst>
-          <pc:docMk/>
-          <pc:sldMk cId="3454572736" sldId="299"/>
-        </pc:sldMkLst>
-        <pc:cxnChg chg="mod">
-          <ac:chgData name="Matthew Forbes" userId="89e49754-86d5-48d1-b7fe-89645bb93558" providerId="ADAL" clId="{5B4AF71D-E8A2-44E5-B28F-FFEBF84B54E3}" dt="2023-09-19T10:44:28.044" v="3" actId="1076"/>
-          <ac:cxnSpMkLst>
-            <pc:docMk/>
-            <pc:sldMk cId="3454572736" sldId="299"/>
-            <ac:cxnSpMk id="30" creationId="{E90F102F-7ED1-1852-9D68-292315A01050}"/>
-          </ac:cxnSpMkLst>
-        </pc:cxnChg>
-      </pc:sldChg>
-    </pc:docChg>
-  </pc:docChgLst>
-  <pc:docChgLst>
-    <pc:chgData name="Julia Moeller" userId="S::julia.moeller@phs.scot::0bcb1583-c1a4-48b5-87e6-2cc074d2d571" providerId="AD" clId="Web-{7E309218-6D18-4C22-8DBB-CA09B9323150}"/>
-    <pc:docChg chg="modSld">
-      <pc:chgData name="Julia Moeller" userId="S::julia.moeller@phs.scot::0bcb1583-c1a4-48b5-87e6-2cc074d2d571" providerId="AD" clId="Web-{7E309218-6D18-4C22-8DBB-CA09B9323150}" dt="2023-09-15T14:04:34.702" v="29" actId="20577"/>
-      <pc:docMkLst>
-        <pc:docMk/>
-      </pc:docMkLst>
-      <pc:sldChg chg="modSp">
-        <pc:chgData name="Julia Moeller" userId="S::julia.moeller@phs.scot::0bcb1583-c1a4-48b5-87e6-2cc074d2d571" providerId="AD" clId="Web-{7E309218-6D18-4C22-8DBB-CA09B9323150}" dt="2023-09-15T14:04:34.702" v="29" actId="20577"/>
-        <pc:sldMkLst>
-          <pc:docMk/>
-          <pc:sldMk cId="901500868" sldId="291"/>
-        </pc:sldMkLst>
-        <pc:spChg chg="mod">
-          <ac:chgData name="Julia Moeller" userId="S::julia.moeller@phs.scot::0bcb1583-c1a4-48b5-87e6-2cc074d2d571" providerId="AD" clId="Web-{7E309218-6D18-4C22-8DBB-CA09B9323150}" dt="2023-09-15T14:04:34.702" v="29" actId="20577"/>
-          <ac:spMkLst>
-            <pc:docMk/>
-            <pc:sldMk cId="901500868" sldId="291"/>
-            <ac:spMk id="3" creationId="{00000000-0000-0000-0000-000000000000}"/>
-          </ac:spMkLst>
-        </pc:spChg>
-      </pc:sldChg>
-    </pc:docChg>
-  </pc:docChgLst>
-</pc:chgInfo>
 </file>
 
 <file path=ppt/comments/modernComment_102_DBC4908C.xml><?xml version="1.0" encoding="utf-8"?>
@@ -4073,7 +1081,7 @@
           <a:p>
             <a:fld id="{C6578090-76F4-463B-B573-B85062C8A08E}" type="datetimeFigureOut">
               <a:rPr lang="en-GB" smtClean="0"/>
-              <a:t>29/09/2023</a:t>
+              <a:t>27/10/2023</a:t>
             </a:fld>
             <a:endParaRPr lang="en-GB"/>
           </a:p>
@@ -9310,7 +6318,7 @@
         </p:spPr>
         <p:txBody>
           <a:bodyPr vert="horz" lIns="0" tIns="45720" rIns="0" bIns="45720" rtlCol="0">
-            <a:normAutofit lnSpcReduction="10000"/>
+            <a:normAutofit/>
           </a:bodyPr>
           <a:lstStyle>
             <a:lvl1pPr marL="91440" indent="-91440" algn="l" defTabSz="914400" rtl="0" eaLnBrk="1" latinLnBrk="0" hangingPunct="1">
@@ -9679,8 +6687,21 @@
                   <a:schemeClr val="tx1"/>
                 </a:solidFill>
               </a:rPr>
-              <a:t> will be used to access the value. In this case the gender column of the dataset.</a:t>
-            </a:r>
+              <a:t> unique ID assigned </a:t>
+            </a:r>
+            <a:r>
+              <a:rPr lang="en-GB">
+                <a:solidFill>
+                  <a:schemeClr val="tx1"/>
+                </a:solidFill>
+              </a:rPr>
+              <a:t>to widget.</a:t>
+            </a:r>
+            <a:endParaRPr lang="en-GB" dirty="0">
+              <a:solidFill>
+                <a:schemeClr val="tx1"/>
+              </a:solidFill>
+            </a:endParaRPr>
           </a:p>
           <a:p>
             <a:pPr marL="470408" lvl="1" indent="-177800">
@@ -12193,7 +9214,7 @@
             <p:nvPr/>
           </p:nvPicPr>
           <p:blipFill>
-            <a:blip r:embed="rId4">
+            <a:blip r:embed="rId4" cstate="print">
               <a:extLst>
                 <a:ext uri="{28A0092B-C50C-407E-A947-70E740481C1C}">
                   <a14:useLocalDpi xmlns:a14="http://schemas.microsoft.com/office/drawing/2010/main" val="0"/>
@@ -18837,9 +15858,14 @@
             <p:ph idx="1"/>
           </p:nvPr>
         </p:nvSpPr>
-        <p:spPr/>
+        <p:spPr>
+          <a:xfrm>
+            <a:off x="838200" y="1512555"/>
+            <a:ext cx="10515600" cy="4351338"/>
+          </a:xfrm>
+        </p:spPr>
         <p:txBody>
-          <a:bodyPr>
+          <a:bodyPr vert="horz" lIns="91440" tIns="45720" rIns="91440" bIns="45720" rtlCol="0" anchor="t">
             <a:normAutofit/>
           </a:bodyPr>
           <a:lstStyle/>
@@ -18868,55 +15894,98 @@
           <a:p>
             <a:pPr lvl="1"/>
             <a:r>
-              <a:rPr lang="en-GB" sz="1800" dirty="0"/>
+              <a:rPr lang="en-GB" sz="1800" dirty="0">
+                <a:latin typeface="Arial"/>
+                <a:cs typeface="Arial"/>
+              </a:rPr>
               <a:t>Swap your </a:t>
             </a:r>
             <a:r>
-              <a:rPr lang="en-GB" sz="1800" dirty="0" err="1"/>
+              <a:rPr lang="en-GB" sz="1800" dirty="0" err="1">
+                <a:latin typeface="Arial"/>
+                <a:cs typeface="Arial"/>
+              </a:rPr>
               <a:t>fluidRow</a:t>
             </a:r>
             <a:r>
-              <a:rPr lang="en-GB" sz="1800" dirty="0"/>
+              <a:rPr lang="en-GB" sz="1800" dirty="0">
+                <a:latin typeface="Arial"/>
+                <a:cs typeface="Arial"/>
+              </a:rPr>
               <a:t>() and column() grid layouts for something else such as </a:t>
             </a:r>
             <a:r>
-              <a:rPr lang="en-GB" sz="1800" dirty="0" err="1"/>
+              <a:rPr lang="en-GB" sz="1800" dirty="0" err="1">
+                <a:latin typeface="Arial"/>
+                <a:cs typeface="Arial"/>
+              </a:rPr>
               <a:t>sidebarLayout</a:t>
             </a:r>
             <a:r>
-              <a:rPr lang="en-GB" sz="1800" dirty="0"/>
+              <a:rPr lang="en-GB" sz="1800" dirty="0">
+                <a:latin typeface="Arial"/>
+                <a:cs typeface="Arial"/>
+              </a:rPr>
               <a:t>(), </a:t>
             </a:r>
             <a:r>
-              <a:rPr lang="en-GB" sz="1800" dirty="0" err="1"/>
+              <a:rPr lang="en-GB" sz="1800" dirty="0" err="1">
+                <a:latin typeface="Arial"/>
+                <a:cs typeface="Arial"/>
+              </a:rPr>
               <a:t>sidebarPanel</a:t>
             </a:r>
             <a:r>
-              <a:rPr lang="en-GB" sz="1800" dirty="0"/>
+              <a:rPr lang="en-GB" sz="1800" dirty="0">
+                <a:latin typeface="Arial"/>
+                <a:cs typeface="Arial"/>
+              </a:rPr>
               <a:t>() and </a:t>
             </a:r>
             <a:r>
-              <a:rPr lang="en-GB" sz="1800" dirty="0" err="1"/>
+              <a:rPr lang="en-GB" sz="1800" dirty="0" err="1">
+                <a:latin typeface="Arial"/>
+                <a:cs typeface="Arial"/>
+              </a:rPr>
               <a:t>mainPanel</a:t>
             </a:r>
             <a:r>
-              <a:rPr lang="en-GB" sz="1800" dirty="0"/>
-              <a:t>() to see how the layout changes. </a:t>
+              <a:rPr lang="en-GB" sz="1800" dirty="0">
+                <a:latin typeface="Arial"/>
+                <a:cs typeface="Arial"/>
+              </a:rPr>
+              <a:t>() to see how the layout changes. </a:t>
             </a:r>
           </a:p>
           <a:p>
             <a:pPr lvl="1"/>
             <a:r>
-              <a:rPr lang="en-GB" sz="1800" dirty="0"/>
-              <a:t>Add new tabs with different charts. </a:t>
-            </a:r>
+              <a:rPr lang="en-GB" sz="1800" dirty="0">
+                <a:latin typeface="Arial"/>
+                <a:cs typeface="Arial"/>
+              </a:rPr>
+              <a:t>Add new tabs with different charts. </a:t>
+            </a:r>
+            <a:endParaRPr lang="en-GB" sz="1800" dirty="0"/>
           </a:p>
           <a:p>
             <a:pPr lvl="1"/>
             <a:r>
-              <a:rPr lang="en-GB" sz="1800" dirty="0"/>
-              <a:t>Attempt to make a similar dashboard for a whole new dataset. </a:t>
-            </a:r>
+              <a:rPr lang="en-GB" sz="1800" dirty="0">
+                <a:latin typeface="Arial"/>
+                <a:cs typeface="Arial"/>
+              </a:rPr>
+              <a:t>Attempt to make a similar dashboard for a whole new dataset. </a:t>
+            </a:r>
+            <a:r>
+              <a:rPr lang="en-GB" sz="1800" dirty="0">
+                <a:latin typeface="Arial"/>
+                <a:cs typeface="Arial"/>
+                <a:hlinkClick r:id="rId3"/>
+              </a:rPr>
+              <a:t>rfordatascience/tidytuesday: Official repo for the #tidytuesday project (github.com)</a:t>
+            </a:r>
+            <a:endParaRPr lang="en-GB" sz="1800" dirty="0"/>
           </a:p>
         </p:txBody>
       </p:sp>
@@ -18993,7 +16062,9 @@
         </p:nvSpPr>
         <p:spPr/>
         <p:txBody>
-          <a:bodyPr/>
+          <a:bodyPr vert="horz" lIns="91440" tIns="45720" rIns="91440" bIns="45720" rtlCol="0" anchor="t">
+            <a:normAutofit/>
+          </a:bodyPr>
           <a:lstStyle/>
           <a:p>
             <a:r>
@@ -19021,14 +16092,11 @@
           </a:p>
           <a:p>
             <a:r>
-              <a:rPr lang="en-GB" dirty="0"/>
-              <a:t> Data downloads</a:t>
-            </a:r>
-          </a:p>
-          <a:p>
-            <a:r>
-              <a:rPr lang="en-GB" dirty="0"/>
-              <a:t> Deploying an app</a:t>
+              <a:rPr lang="en-GB" dirty="0">
+                <a:latin typeface="Arial"/>
+                <a:cs typeface="Arial"/>
+              </a:rPr>
+              <a:t> Data downloads</a:t>
             </a:r>
           </a:p>
           <a:p>
@@ -19616,7 +16684,7 @@
           <p:nvPr/>
         </p:nvPicPr>
         <p:blipFill>
-          <a:blip r:embed="rId3">
+          <a:blip r:embed="rId3" cstate="print">
             <a:extLst>
               <a:ext uri="{28A0092B-C50C-407E-A947-70E740481C1C}">
                 <a14:useLocalDpi xmlns:a14="http://schemas.microsoft.com/office/drawing/2010/main" val="0"/>
@@ -20669,15 +17737,15 @@
 <file path=customXml/itemProps3.xml><?xml version="1.0" encoding="utf-8"?>
 <ds:datastoreItem xmlns:ds="http://schemas.openxmlformats.org/officeDocument/2006/customXml" ds:itemID="{4C73297F-598B-4DCB-BCE9-E508A25225E1}">
   <ds:schemaRefs>
+    <ds:schemaRef ds:uri="http://schemas.microsoft.com/office/infopath/2007/PartnerControls"/>
+    <ds:schemaRef ds:uri="e155261d-e7be-4e14-8f3f-074943e30468"/>
+    <ds:schemaRef ds:uri="http://purl.org/dc/dcmitype/"/>
+    <ds:schemaRef ds:uri="9777d510-7a84-4d86-adcc-ed6491094c98"/>
     <ds:schemaRef ds:uri="http://schemas.microsoft.com/office/2006/documentManagement/types"/>
+    <ds:schemaRef ds:uri="http://purl.org/dc/terms/"/>
+    <ds:schemaRef ds:uri="http://schemas.openxmlformats.org/package/2006/metadata/core-properties"/>
     <ds:schemaRef ds:uri="http://schemas.microsoft.com/office/2006/metadata/properties"/>
-    <ds:schemaRef ds:uri="9777d510-7a84-4d86-adcc-ed6491094c98"/>
-    <ds:schemaRef ds:uri="http://schemas.openxmlformats.org/package/2006/metadata/core-properties"/>
-    <ds:schemaRef ds:uri="e155261d-e7be-4e14-8f3f-074943e30468"/>
     <ds:schemaRef ds:uri="http://www.w3.org/XML/1998/namespace"/>
-    <ds:schemaRef ds:uri="http://purl.org/dc/dcmitype/"/>
-    <ds:schemaRef ds:uri="http://schemas.microsoft.com/office/infopath/2007/PartnerControls"/>
-    <ds:schemaRef ds:uri="http://purl.org/dc/terms/"/>
     <ds:schemaRef ds:uri="http://purl.org/dc/elements/1.1/"/>
   </ds:schemaRefs>
 </ds:datastoreItem>

</xml_diff>